<commit_message>
MAJ README et ppt
</commit_message>
<xml_diff>
--- a/formation_Angular.pptx
+++ b/formation_Angular.pptx
@@ -5,7 +5,7 @@
     <p:sldMasterId id="2147483732" r:id="rId1"/>
   </p:sldMasterIdLst>
   <p:notesMasterIdLst>
-    <p:notesMasterId r:id="rId26"/>
+    <p:notesMasterId r:id="rId23"/>
   </p:notesMasterIdLst>
   <p:sldIdLst>
     <p:sldId id="256" r:id="rId2"/>
@@ -28,10 +28,7 @@
     <p:sldId id="279" r:id="rId19"/>
     <p:sldId id="266" r:id="rId20"/>
     <p:sldId id="278" r:id="rId21"/>
-    <p:sldId id="261" r:id="rId22"/>
-    <p:sldId id="269" r:id="rId23"/>
-    <p:sldId id="270" r:id="rId24"/>
-    <p:sldId id="268" r:id="rId25"/>
+    <p:sldId id="268" r:id="rId22"/>
   </p:sldIdLst>
   <p:sldSz cx="9144000" cy="6858000" type="screen4x3"/>
   <p:notesSz cx="6858000" cy="9144000"/>
@@ -763,6 +760,90 @@
 </p:notes>
 </file>
 
+<file path=ppt/notesSlides/notesSlide12.xml><?xml version="1.0" encoding="utf-8"?>
+<p:notes xmlns:a="http://schemas.openxmlformats.org/drawingml/2006/main" xmlns:r="http://schemas.openxmlformats.org/officeDocument/2006/relationships" xmlns:p="http://schemas.openxmlformats.org/presentationml/2006/main">
+  <p:cSld>
+    <p:spTree>
+      <p:nvGrpSpPr>
+        <p:cNvPr id="1" name=""/>
+        <p:cNvGrpSpPr/>
+        <p:nvPr/>
+      </p:nvGrpSpPr>
+      <p:grpSpPr>
+        <a:xfrm>
+          <a:off x="0" y="0"/>
+          <a:ext cx="0" cy="0"/>
+          <a:chOff x="0" y="0"/>
+          <a:chExt cx="0" cy="0"/>
+        </a:xfrm>
+      </p:grpSpPr>
+      <p:sp>
+        <p:nvSpPr>
+          <p:cNvPr id="2" name="Espace réservé de l'image des diapositives 1"/>
+          <p:cNvSpPr>
+            <a:spLocks noGrp="1" noRot="1" noChangeAspect="1"/>
+          </p:cNvSpPr>
+          <p:nvPr>
+            <p:ph type="sldImg"/>
+          </p:nvPr>
+        </p:nvSpPr>
+        <p:spPr/>
+      </p:sp>
+      <p:sp>
+        <p:nvSpPr>
+          <p:cNvPr id="3" name="Espace réservé des commentaires 2"/>
+          <p:cNvSpPr>
+            <a:spLocks noGrp="1"/>
+          </p:cNvSpPr>
+          <p:nvPr>
+            <p:ph type="body" idx="1"/>
+          </p:nvPr>
+        </p:nvSpPr>
+        <p:spPr/>
+        <p:txBody>
+          <a:bodyPr/>
+          <a:lstStyle/>
+          <a:p>
+            <a:endParaRPr lang="fr-FR" dirty="0"/>
+          </a:p>
+        </p:txBody>
+      </p:sp>
+      <p:sp>
+        <p:nvSpPr>
+          <p:cNvPr id="4" name="Espace réservé du numéro de diapositive 3"/>
+          <p:cNvSpPr>
+            <a:spLocks noGrp="1"/>
+          </p:cNvSpPr>
+          <p:nvPr>
+            <p:ph type="sldNum" sz="quarter" idx="10"/>
+          </p:nvPr>
+        </p:nvSpPr>
+        <p:spPr/>
+        <p:txBody>
+          <a:bodyPr/>
+          <a:lstStyle/>
+          <a:p>
+            <a:fld id="{FD0CA3AA-443A-466C-BF59-FB6574BB11C3}" type="slidenum">
+              <a:rPr lang="fr-FR" smtClean="0"/>
+              <a:t>21</a:t>
+            </a:fld>
+            <a:endParaRPr lang="fr-FR"/>
+          </a:p>
+        </p:txBody>
+      </p:sp>
+    </p:spTree>
+    <p:extLst>
+      <p:ext uri="{BB962C8B-B14F-4D97-AF65-F5344CB8AC3E}">
+        <p14:creationId xmlns:p14="http://schemas.microsoft.com/office/powerpoint/2010/main" val="4185764342"/>
+      </p:ext>
+    </p:extLst>
+  </p:cSld>
+  <p:clrMapOvr>
+    <a:masterClrMapping/>
+  </p:clrMapOvr>
+</p:notes>
+</file>
+
 <file path=ppt/notesSlides/notesSlide2.xml><?xml version="1.0" encoding="utf-8"?>
 <p:notes xmlns:a="http://schemas.openxmlformats.org/drawingml/2006/main" xmlns:r="http://schemas.openxmlformats.org/officeDocument/2006/relationships" xmlns:p="http://schemas.openxmlformats.org/presentationml/2006/main">
   <p:cSld>
@@ -1156,11 +1237,7 @@
             </a:r>
             <a:r>
               <a:rPr lang="fr-FR" dirty="0" smtClean="0"/>
-              <a:t>http://es6-features.org/#</a:t>
-            </a:r>
-            <a:r>
-              <a:rPr lang="fr-FR" dirty="0" smtClean="0"/>
-              <a:t>Constants</a:t>
+              <a:t>http://es6-features.org/#Constants</a:t>
             </a:r>
           </a:p>
           <a:p>
@@ -16457,7 +16534,7 @@
         </p:blipFill>
         <p:spPr>
           <a:xfrm>
-            <a:off x="1043608" y="5445224"/>
+            <a:off x="1331640" y="5445224"/>
             <a:ext cx="1008112" cy="1008112"/>
           </a:xfrm>
           <a:prstGeom prst="rect">
@@ -17132,11 +17209,7 @@
           <a:p>
             <a:r>
               <a:rPr lang="fr-FR" dirty="0" smtClean="0"/>
-              <a:t>Ajouter un </a:t>
-            </a:r>
-            <a:r>
-              <a:rPr lang="fr-FR" dirty="0" smtClean="0"/>
-              <a:t>model </a:t>
+              <a:t>Ajouter un model </a:t>
             </a:r>
             <a:r>
               <a:rPr lang="fr-FR" dirty="0" err="1" smtClean="0"/>
@@ -17196,11 +17269,7 @@
           <a:p>
             <a:r>
               <a:rPr lang="fr-FR" dirty="0" smtClean="0"/>
-              <a:t>TP </a:t>
-            </a:r>
-            <a:r>
-              <a:rPr lang="fr-FR" dirty="0" smtClean="0"/>
-              <a:t>Provider</a:t>
+              <a:t>TP Provider</a:t>
             </a:r>
             <a:endParaRPr lang="fr-FR" dirty="0"/>
           </a:p>
@@ -17384,17 +17453,8 @@
           <a:p>
             <a:r>
               <a:rPr lang="fr-FR" dirty="0" smtClean="0"/>
-              <a:t>Créer </a:t>
-            </a:r>
-            <a:r>
-              <a:rPr lang="fr-FR" dirty="0" smtClean="0"/>
-              <a:t>une </a:t>
-            </a:r>
-            <a:r>
-              <a:rPr lang="fr-FR" dirty="0" smtClean="0"/>
-              <a:t>classe Pipe avec le générateur</a:t>
-            </a:r>
-            <a:endParaRPr lang="fr-FR" dirty="0" smtClean="0"/>
+              <a:t>Créer une classe Pipe avec le générateur</a:t>
+            </a:r>
           </a:p>
           <a:p>
             <a:r>
@@ -17405,15 +17465,7 @@
           <a:p>
             <a:r>
               <a:rPr lang="fr-FR" dirty="0" smtClean="0"/>
-              <a:t>Afficher </a:t>
-            </a:r>
-            <a:r>
-              <a:rPr lang="fr-FR" dirty="0" smtClean="0"/>
-              <a:t>la liste des </a:t>
-            </a:r>
-            <a:r>
-              <a:rPr lang="fr-FR" dirty="0" smtClean="0"/>
-              <a:t>étudiants avec le pipe de tri</a:t>
+              <a:t>Afficher la liste des étudiants avec le pipe de tri</a:t>
             </a:r>
           </a:p>
           <a:p>
@@ -17731,12 +17783,24 @@
           <a:lstStyle/>
           <a:p>
             <a:r>
+              <a:rPr lang="fr-FR" dirty="0" err="1" smtClean="0"/>
+              <a:t>Editer</a:t>
+            </a:r>
+            <a:r>
+              <a:rPr lang="fr-FR" dirty="0" smtClean="0"/>
+              <a:t> les </a:t>
+            </a:r>
+            <a:r>
               <a:rPr lang="fr-FR" dirty="0"/>
-              <a:t>Ajouter les routes de </a:t>
+              <a:t>routes de </a:t>
             </a:r>
             <a:r>
               <a:rPr lang="fr-FR" dirty="0" smtClean="0"/>
-              <a:t>bases au module </a:t>
+              <a:t>base </a:t>
+            </a:r>
+            <a:r>
+              <a:rPr lang="fr-FR" dirty="0" smtClean="0"/>
+              <a:t>au module </a:t>
             </a:r>
             <a:r>
               <a:rPr lang="fr-FR" dirty="0" err="1" smtClean="0"/>
@@ -17780,7 +17844,15 @@
           <a:p>
             <a:r>
               <a:rPr lang="fr-FR" dirty="0" smtClean="0"/>
-              <a:t>Gérer le passage de paramètre entre deux routes en asynchrone</a:t>
+              <a:t>Gérer le passage de </a:t>
+            </a:r>
+            <a:r>
+              <a:rPr lang="fr-FR" dirty="0" smtClean="0"/>
+              <a:t>paramètres </a:t>
+            </a:r>
+            <a:r>
+              <a:rPr lang="fr-FR" dirty="0" smtClean="0"/>
+              <a:t>entre deux routes en asynchrone</a:t>
             </a:r>
             <a:endParaRPr lang="fr-FR" dirty="0"/>
           </a:p>
@@ -18212,323 +18284,6 @@
 </file>
 
 <file path=ppt/slides/slide21.xml><?xml version="1.0" encoding="utf-8"?>
-<p:sld xmlns:a="http://schemas.openxmlformats.org/drawingml/2006/main" xmlns:r="http://schemas.openxmlformats.org/officeDocument/2006/relationships" xmlns:p="http://schemas.openxmlformats.org/presentationml/2006/main" show="0">
-  <p:cSld>
-    <p:spTree>
-      <p:nvGrpSpPr>
-        <p:cNvPr id="1" name=""/>
-        <p:cNvGrpSpPr/>
-        <p:nvPr/>
-      </p:nvGrpSpPr>
-      <p:grpSpPr>
-        <a:xfrm>
-          <a:off x="0" y="0"/>
-          <a:ext cx="0" cy="0"/>
-          <a:chOff x="0" y="0"/>
-          <a:chExt cx="0" cy="0"/>
-        </a:xfrm>
-      </p:grpSpPr>
-      <p:sp>
-        <p:nvSpPr>
-          <p:cNvPr id="3" name="Espace réservé du contenu 2"/>
-          <p:cNvSpPr>
-            <a:spLocks noGrp="1"/>
-          </p:cNvSpPr>
-          <p:nvPr>
-            <p:ph idx="1"/>
-          </p:nvPr>
-        </p:nvSpPr>
-        <p:spPr>
-          <a:xfrm>
-            <a:off x="395536" y="2636912"/>
-            <a:ext cx="8229600" cy="3445843"/>
-          </a:xfrm>
-        </p:spPr>
-        <p:txBody>
-          <a:bodyPr/>
-          <a:lstStyle/>
-          <a:p>
-            <a:r>
-              <a:rPr lang="fr-FR" dirty="0" err="1" smtClean="0"/>
-              <a:t>AngularJS’s</a:t>
-            </a:r>
-            <a:r>
-              <a:rPr lang="fr-FR" dirty="0" smtClean="0"/>
-              <a:t> $Watch : Un timeout (Digest Cycle) vérifie tous les </a:t>
-            </a:r>
-            <a:r>
-              <a:rPr lang="fr-FR" dirty="0" err="1" smtClean="0"/>
-              <a:t>databindings</a:t>
-            </a:r>
-            <a:endParaRPr lang="fr-FR" dirty="0" smtClean="0"/>
-          </a:p>
-          <a:p>
-            <a:r>
-              <a:rPr lang="fr-FR" dirty="0" err="1" smtClean="0"/>
-              <a:t>Angular’s</a:t>
-            </a:r>
-            <a:r>
-              <a:rPr lang="fr-FR" dirty="0" smtClean="0"/>
-              <a:t> </a:t>
-            </a:r>
-            <a:r>
-              <a:rPr lang="fr-FR" dirty="0" err="1" smtClean="0"/>
-              <a:t>ChangeDetectorRef</a:t>
-            </a:r>
-            <a:r>
-              <a:rPr lang="fr-FR" dirty="0" smtClean="0"/>
-              <a:t> : Chaque composant a une classe </a:t>
-            </a:r>
-            <a:r>
-              <a:rPr lang="fr-FR" dirty="0" err="1" smtClean="0"/>
-              <a:t>ChangeDetectorRef</a:t>
-            </a:r>
-            <a:r>
-              <a:rPr lang="fr-FR" dirty="0" smtClean="0"/>
-              <a:t> qui permet de gérer (activer/désactiver/suspendre) la vérification au niveau d’un composant et de ses enfants</a:t>
-            </a:r>
-            <a:endParaRPr lang="fr-FR" dirty="0"/>
-          </a:p>
-        </p:txBody>
-      </p:sp>
-      <p:sp>
-        <p:nvSpPr>
-          <p:cNvPr id="2" name="Titre 1"/>
-          <p:cNvSpPr>
-            <a:spLocks noGrp="1"/>
-          </p:cNvSpPr>
-          <p:nvPr>
-            <p:ph type="title"/>
-          </p:nvPr>
-        </p:nvSpPr>
-        <p:spPr/>
-        <p:txBody>
-          <a:bodyPr/>
-          <a:lstStyle/>
-          <a:p>
-            <a:r>
-              <a:rPr lang="fr-FR" dirty="0" smtClean="0"/>
-              <a:t>Change </a:t>
-            </a:r>
-            <a:r>
-              <a:rPr lang="fr-FR" dirty="0" err="1" smtClean="0"/>
-              <a:t>Detection</a:t>
-            </a:r>
-            <a:endParaRPr lang="fr-FR" dirty="0"/>
-          </a:p>
-        </p:txBody>
-      </p:sp>
-    </p:spTree>
-    <p:extLst>
-      <p:ext uri="{BB962C8B-B14F-4D97-AF65-F5344CB8AC3E}">
-        <p14:creationId xmlns:p14="http://schemas.microsoft.com/office/powerpoint/2010/main" val="459256215"/>
-      </p:ext>
-    </p:extLst>
-  </p:cSld>
-  <p:clrMapOvr>
-    <a:masterClrMapping/>
-  </p:clrMapOvr>
-  <mc:AlternateContent xmlns:mc="http://schemas.openxmlformats.org/markup-compatibility/2006" xmlns:p14="http://schemas.microsoft.com/office/powerpoint/2010/main">
-    <mc:Choice Requires="p14">
-      <p:transition spd="slow" p14:dur="2000"/>
-    </mc:Choice>
-    <mc:Fallback xmlns="">
-      <p:transition spd="slow"/>
-    </mc:Fallback>
-  </mc:AlternateContent>
-  <p:timing>
-    <p:tnLst>
-      <p:par>
-        <p:cTn id="1" dur="indefinite" restart="never" nodeType="tmRoot"/>
-      </p:par>
-    </p:tnLst>
-  </p:timing>
-</p:sld>
-</file>
-
-<file path=ppt/slides/slide22.xml><?xml version="1.0" encoding="utf-8"?>
-<p:sld xmlns:a="http://schemas.openxmlformats.org/drawingml/2006/main" xmlns:r="http://schemas.openxmlformats.org/officeDocument/2006/relationships" xmlns:p="http://schemas.openxmlformats.org/presentationml/2006/main" show="0">
-  <p:cSld>
-    <p:spTree>
-      <p:nvGrpSpPr>
-        <p:cNvPr id="1" name=""/>
-        <p:cNvGrpSpPr/>
-        <p:nvPr/>
-      </p:nvGrpSpPr>
-      <p:grpSpPr>
-        <a:xfrm>
-          <a:off x="0" y="0"/>
-          <a:ext cx="0" cy="0"/>
-          <a:chOff x="0" y="0"/>
-          <a:chExt cx="0" cy="0"/>
-        </a:xfrm>
-      </p:grpSpPr>
-      <p:sp>
-        <p:nvSpPr>
-          <p:cNvPr id="3" name="Espace réservé du contenu 2"/>
-          <p:cNvSpPr>
-            <a:spLocks noGrp="1"/>
-          </p:cNvSpPr>
-          <p:nvPr>
-            <p:ph idx="1"/>
-          </p:nvPr>
-        </p:nvSpPr>
-        <p:spPr/>
-        <p:txBody>
-          <a:bodyPr/>
-          <a:lstStyle/>
-          <a:p>
-            <a:r>
-              <a:rPr lang="fr-FR" dirty="0" smtClean="0"/>
-              <a:t>…</a:t>
-            </a:r>
-            <a:endParaRPr lang="fr-FR" dirty="0"/>
-          </a:p>
-        </p:txBody>
-      </p:sp>
-      <p:sp>
-        <p:nvSpPr>
-          <p:cNvPr id="2" name="Titre 1"/>
-          <p:cNvSpPr>
-            <a:spLocks noGrp="1"/>
-          </p:cNvSpPr>
-          <p:nvPr>
-            <p:ph type="title"/>
-          </p:nvPr>
-        </p:nvSpPr>
-        <p:spPr/>
-        <p:txBody>
-          <a:bodyPr/>
-          <a:lstStyle/>
-          <a:p>
-            <a:r>
-              <a:rPr lang="fr-FR" dirty="0" smtClean="0"/>
-              <a:t>TU</a:t>
-            </a:r>
-            <a:endParaRPr lang="fr-FR" dirty="0"/>
-          </a:p>
-        </p:txBody>
-      </p:sp>
-    </p:spTree>
-    <p:extLst>
-      <p:ext uri="{BB962C8B-B14F-4D97-AF65-F5344CB8AC3E}">
-        <p14:creationId xmlns:p14="http://schemas.microsoft.com/office/powerpoint/2010/main" val="3193692409"/>
-      </p:ext>
-    </p:extLst>
-  </p:cSld>
-  <p:clrMapOvr>
-    <a:masterClrMapping/>
-  </p:clrMapOvr>
-  <mc:AlternateContent xmlns:mc="http://schemas.openxmlformats.org/markup-compatibility/2006" xmlns:p14="http://schemas.microsoft.com/office/powerpoint/2010/main">
-    <mc:Choice Requires="p14">
-      <p:transition spd="slow" p14:dur="2000"/>
-    </mc:Choice>
-    <mc:Fallback xmlns="">
-      <p:transition spd="slow"/>
-    </mc:Fallback>
-  </mc:AlternateContent>
-  <p:timing>
-    <p:tnLst>
-      <p:par>
-        <p:cTn id="1" dur="indefinite" restart="never" nodeType="tmRoot"/>
-      </p:par>
-    </p:tnLst>
-  </p:timing>
-</p:sld>
-</file>
-
-<file path=ppt/slides/slide23.xml><?xml version="1.0" encoding="utf-8"?>
-<p:sld xmlns:a="http://schemas.openxmlformats.org/drawingml/2006/main" xmlns:r="http://schemas.openxmlformats.org/officeDocument/2006/relationships" xmlns:p="http://schemas.openxmlformats.org/presentationml/2006/main" show="0">
-  <p:cSld>
-    <p:spTree>
-      <p:nvGrpSpPr>
-        <p:cNvPr id="1" name=""/>
-        <p:cNvGrpSpPr/>
-        <p:nvPr/>
-      </p:nvGrpSpPr>
-      <p:grpSpPr>
-        <a:xfrm>
-          <a:off x="0" y="0"/>
-          <a:ext cx="0" cy="0"/>
-          <a:chOff x="0" y="0"/>
-          <a:chExt cx="0" cy="0"/>
-        </a:xfrm>
-      </p:grpSpPr>
-      <p:sp>
-        <p:nvSpPr>
-          <p:cNvPr id="3" name="Espace réservé du contenu 2"/>
-          <p:cNvSpPr>
-            <a:spLocks noGrp="1"/>
-          </p:cNvSpPr>
-          <p:nvPr>
-            <p:ph idx="1"/>
-          </p:nvPr>
-        </p:nvSpPr>
-        <p:spPr/>
-        <p:txBody>
-          <a:bodyPr/>
-          <a:lstStyle/>
-          <a:p>
-            <a:r>
-              <a:rPr lang="fr-FR" dirty="0" smtClean="0"/>
-              <a:t>…</a:t>
-            </a:r>
-            <a:endParaRPr lang="fr-FR" dirty="0"/>
-          </a:p>
-        </p:txBody>
-      </p:sp>
-      <p:sp>
-        <p:nvSpPr>
-          <p:cNvPr id="2" name="Titre 1"/>
-          <p:cNvSpPr>
-            <a:spLocks noGrp="1"/>
-          </p:cNvSpPr>
-          <p:nvPr>
-            <p:ph type="title"/>
-          </p:nvPr>
-        </p:nvSpPr>
-        <p:spPr/>
-        <p:txBody>
-          <a:bodyPr/>
-          <a:lstStyle/>
-          <a:p>
-            <a:r>
-              <a:rPr lang="fr-FR" dirty="0" smtClean="0"/>
-              <a:t>e2e</a:t>
-            </a:r>
-            <a:endParaRPr lang="fr-FR" dirty="0"/>
-          </a:p>
-        </p:txBody>
-      </p:sp>
-    </p:spTree>
-    <p:extLst>
-      <p:ext uri="{BB962C8B-B14F-4D97-AF65-F5344CB8AC3E}">
-        <p14:creationId xmlns:p14="http://schemas.microsoft.com/office/powerpoint/2010/main" val="2854940141"/>
-      </p:ext>
-    </p:extLst>
-  </p:cSld>
-  <p:clrMapOvr>
-    <a:masterClrMapping/>
-  </p:clrMapOvr>
-  <mc:AlternateContent xmlns:mc="http://schemas.openxmlformats.org/markup-compatibility/2006" xmlns:p14="http://schemas.microsoft.com/office/powerpoint/2010/main">
-    <mc:Choice Requires="p14">
-      <p:transition spd="slow" p14:dur="2000"/>
-    </mc:Choice>
-    <mc:Fallback xmlns="">
-      <p:transition spd="slow"/>
-    </mc:Fallback>
-  </mc:AlternateContent>
-  <p:timing>
-    <p:tnLst>
-      <p:par>
-        <p:cTn id="1" dur="indefinite" restart="never" nodeType="tmRoot"/>
-      </p:par>
-    </p:tnLst>
-  </p:timing>
-</p:sld>
-</file>
-
-<file path=ppt/slides/slide24.xml><?xml version="1.0" encoding="utf-8"?>
 <p:sld xmlns:a="http://schemas.openxmlformats.org/drawingml/2006/main" xmlns:r="http://schemas.openxmlformats.org/officeDocument/2006/relationships" xmlns:p="http://schemas.openxmlformats.org/presentationml/2006/main">
   <p:cSld>
     <p:spTree>
@@ -18574,13 +18329,13 @@
             </a:r>
             <a:r>
               <a:rPr lang="fr-FR" dirty="0">
-                <a:hlinkClick r:id="rId2"/>
+                <a:hlinkClick r:id="rId3"/>
               </a:rPr>
               <a:t>https://</a:t>
             </a:r>
             <a:r>
               <a:rPr lang="fr-FR" dirty="0" smtClean="0">
-                <a:hlinkClick r:id="rId2"/>
+                <a:hlinkClick r:id="rId3"/>
               </a:rPr>
               <a:t>angular.io/guide/styleguide</a:t>
             </a:r>

</xml_diff>

<commit_message>
Module de routing terminé
</commit_message>
<xml_diff>
--- a/formation_Angular.pptx
+++ b/formation_Angular.pptx
@@ -129,6 +129,22 @@
       </a:defRPr>
     </a:lvl9pPr>
   </p:defaultTextStyle>
+  <p:extLst>
+    <p:ext uri="{EFAFB233-063F-42B5-8137-9DF3F51BA10A}">
+      <p15:sldGuideLst xmlns:p15="http://schemas.microsoft.com/office/powerpoint/2012/main">
+        <p15:guide id="1" orient="horz" pos="2160">
+          <p15:clr>
+            <a:srgbClr val="A4A3A4"/>
+          </p15:clr>
+        </p15:guide>
+        <p15:guide id="2" pos="2880">
+          <p15:clr>
+            <a:srgbClr val="A4A3A4"/>
+          </p15:clr>
+        </p15:guide>
+      </p15:sldGuideLst>
+    </p:ext>
+  </p:extLst>
 </p:presentation>
 </file>
 
@@ -214,7 +230,7 @@
           <a:p>
             <a:fld id="{060E997E-A64A-414F-A106-86024763E701}" type="datetimeFigureOut">
               <a:rPr lang="fr-FR" smtClean="0"/>
-              <a:t>30/05/2018</a:t>
+              <a:t>31/05/2018</a:t>
             </a:fld>
             <a:endParaRPr lang="fr-FR"/>
           </a:p>
@@ -526,6 +542,14 @@
           <a:bodyPr/>
           <a:lstStyle/>
           <a:p>
+            <a:r>
+              <a:rPr lang="fr-FR" dirty="0" smtClean="0"/>
+              <a:t>Expérience VIVARTE : FW </a:t>
+            </a:r>
+            <a:r>
+              <a:rPr lang="fr-FR" dirty="0" err="1" smtClean="0"/>
+              <a:t>JQuery</a:t>
+            </a:r>
             <a:endParaRPr lang="fr-FR" dirty="0"/>
           </a:p>
         </p:txBody>
@@ -610,34 +634,29 @@
           <a:bodyPr/>
           <a:lstStyle/>
           <a:p>
-            <a:r>
-              <a:rPr lang="fr-FR" dirty="0" err="1" smtClean="0"/>
-              <a:t>ng</a:t>
-            </a:r>
+            <a:pPr marL="0" marR="0" indent="0" algn="l" defTabSz="914400" rtl="0" eaLnBrk="1" fontAlgn="auto" latinLnBrk="0" hangingPunct="1">
+              <a:lnSpc>
+                <a:spcPct val="100000"/>
+              </a:lnSpc>
+              <a:spcBef>
+                <a:spcPts val="0"/>
+              </a:spcBef>
+              <a:spcAft>
+                <a:spcPts val="0"/>
+              </a:spcAft>
+              <a:buClrTx/>
+              <a:buSzTx/>
+              <a:buFontTx/>
+              <a:buNone/>
+              <a:tabLst/>
+              <a:defRPr/>
+            </a:pPr>
             <a:r>
               <a:rPr lang="fr-FR" dirty="0" smtClean="0"/>
-              <a:t> </a:t>
-            </a:r>
-            <a:r>
-              <a:rPr lang="fr-FR" dirty="0" err="1" smtClean="0"/>
-              <a:t>generate</a:t>
-            </a:r>
-            <a:r>
-              <a:rPr lang="fr-FR" dirty="0" smtClean="0"/>
-              <a:t> module </a:t>
-            </a:r>
-            <a:r>
-              <a:rPr lang="fr-FR" dirty="0" err="1" smtClean="0"/>
-              <a:t>core</a:t>
-            </a:r>
-            <a:r>
-              <a:rPr lang="fr-FR" dirty="0" smtClean="0"/>
-              <a:t> --</a:t>
-            </a:r>
-            <a:r>
-              <a:rPr lang="fr-FR" dirty="0" err="1" smtClean="0"/>
-              <a:t>routing</a:t>
-            </a:r>
+              <a:t>Ordre de déclaration des routes crucial </a:t>
+            </a:r>
+          </a:p>
+          <a:p>
             <a:endParaRPr lang="fr-FR" dirty="0"/>
           </a:p>
         </p:txBody>
@@ -659,7 +678,7 @@
           <a:p>
             <a:fld id="{FD0CA3AA-443A-466C-BF59-FB6574BB11C3}" type="slidenum">
               <a:rPr lang="fr-FR" smtClean="0"/>
-              <a:t>13</a:t>
+              <a:t>12</a:t>
             </a:fld>
             <a:endParaRPr lang="fr-FR"/>
           </a:p>
@@ -668,7 +687,7 @@
     </p:spTree>
     <p:extLst>
       <p:ext uri="{BB962C8B-B14F-4D97-AF65-F5344CB8AC3E}">
-        <p14:creationId xmlns:p14="http://schemas.microsoft.com/office/powerpoint/2010/main" val="3528251478"/>
+        <p14:creationId xmlns:p14="http://schemas.microsoft.com/office/powerpoint/2010/main" val="3388767870"/>
       </p:ext>
     </p:extLst>
   </p:cSld>
@@ -722,6 +741,34 @@
           <a:bodyPr/>
           <a:lstStyle/>
           <a:p>
+            <a:r>
+              <a:rPr lang="fr-FR" dirty="0" err="1" smtClean="0"/>
+              <a:t>ng</a:t>
+            </a:r>
+            <a:r>
+              <a:rPr lang="fr-FR" dirty="0" smtClean="0"/>
+              <a:t> </a:t>
+            </a:r>
+            <a:r>
+              <a:rPr lang="fr-FR" dirty="0" err="1" smtClean="0"/>
+              <a:t>generate</a:t>
+            </a:r>
+            <a:r>
+              <a:rPr lang="fr-FR" dirty="0" smtClean="0"/>
+              <a:t> module </a:t>
+            </a:r>
+            <a:r>
+              <a:rPr lang="fr-FR" dirty="0" err="1" smtClean="0"/>
+              <a:t>core</a:t>
+            </a:r>
+            <a:r>
+              <a:rPr lang="fr-FR" dirty="0" smtClean="0"/>
+              <a:t> --</a:t>
+            </a:r>
+            <a:r>
+              <a:rPr lang="fr-FR" dirty="0" err="1" smtClean="0"/>
+              <a:t>routing</a:t>
+            </a:r>
             <a:endParaRPr lang="fr-FR" dirty="0"/>
           </a:p>
         </p:txBody>
@@ -743,7 +790,7 @@
           <a:p>
             <a:fld id="{FD0CA3AA-443A-466C-BF59-FB6574BB11C3}" type="slidenum">
               <a:rPr lang="fr-FR" smtClean="0"/>
-              <a:t>14</a:t>
+              <a:t>13</a:t>
             </a:fld>
             <a:endParaRPr lang="fr-FR"/>
           </a:p>
@@ -752,7 +799,7 @@
     </p:spTree>
     <p:extLst>
       <p:ext uri="{BB962C8B-B14F-4D97-AF65-F5344CB8AC3E}">
-        <p14:creationId xmlns:p14="http://schemas.microsoft.com/office/powerpoint/2010/main" val="3207704278"/>
+        <p14:creationId xmlns:p14="http://schemas.microsoft.com/office/powerpoint/2010/main" val="3528251478"/>
       </p:ext>
     </p:extLst>
   </p:cSld>
@@ -806,34 +853,6 @@
           <a:bodyPr/>
           <a:lstStyle/>
           <a:p>
-            <a:r>
-              <a:rPr lang="fr-FR" dirty="0" err="1" smtClean="0"/>
-              <a:t>ng</a:t>
-            </a:r>
-            <a:r>
-              <a:rPr lang="fr-FR" dirty="0" smtClean="0"/>
-              <a:t> </a:t>
-            </a:r>
-            <a:r>
-              <a:rPr lang="fr-FR" dirty="0" err="1" smtClean="0"/>
-              <a:t>generate</a:t>
-            </a:r>
-            <a:r>
-              <a:rPr lang="fr-FR" dirty="0" smtClean="0"/>
-              <a:t> provider service/</a:t>
-            </a:r>
-            <a:r>
-              <a:rPr lang="fr-FR" dirty="0" err="1" smtClean="0"/>
-              <a:t>core</a:t>
-            </a:r>
-            <a:r>
-              <a:rPr lang="fr-FR" dirty="0" smtClean="0"/>
-              <a:t>/</a:t>
-            </a:r>
-            <a:r>
-              <a:rPr lang="fr-FR" dirty="0" err="1" smtClean="0"/>
-              <a:t>student</a:t>
-            </a:r>
             <a:endParaRPr lang="fr-FR" dirty="0"/>
           </a:p>
         </p:txBody>
@@ -855,7 +874,7 @@
           <a:p>
             <a:fld id="{FD0CA3AA-443A-466C-BF59-FB6574BB11C3}" type="slidenum">
               <a:rPr lang="fr-FR" smtClean="0"/>
-              <a:t>15</a:t>
+              <a:t>14</a:t>
             </a:fld>
             <a:endParaRPr lang="fr-FR"/>
           </a:p>
@@ -864,7 +883,7 @@
     </p:spTree>
     <p:extLst>
       <p:ext uri="{BB962C8B-B14F-4D97-AF65-F5344CB8AC3E}">
-        <p14:creationId xmlns:p14="http://schemas.microsoft.com/office/powerpoint/2010/main" val="3836970229"/>
+        <p14:creationId xmlns:p14="http://schemas.microsoft.com/office/powerpoint/2010/main" val="3207704278"/>
       </p:ext>
     </p:extLst>
   </p:cSld>
@@ -920,29 +939,19 @@
           <a:p>
             <a:r>
               <a:rPr lang="fr-FR" dirty="0" err="1" smtClean="0"/>
-              <a:t>Ng</a:t>
-            </a:r>
-            <a:r>
-              <a:rPr lang="fr-FR" dirty="0" smtClean="0"/>
-              <a:t> g module </a:t>
-            </a:r>
-            <a:r>
-              <a:rPr lang="fr-FR" dirty="0" err="1" smtClean="0"/>
-              <a:t>shared</a:t>
+              <a:t>ng</a:t>
             </a:r>
             <a:r>
               <a:rPr lang="fr-FR" dirty="0" smtClean="0"/>
               <a:t> </a:t>
             </a:r>
-          </a:p>
-          <a:p>
             <a:r>
               <a:rPr lang="fr-FR" dirty="0" err="1" smtClean="0"/>
-              <a:t>ng</a:t>
+              <a:t>generate</a:t>
             </a:r>
             <a:r>
               <a:rPr lang="fr-FR" dirty="0" smtClean="0"/>
-              <a:t> g pipe </a:t>
+              <a:t> provider service/</a:t>
             </a:r>
             <a:r>
               <a:rPr lang="fr-FR" dirty="0" err="1" smtClean="0"/>
@@ -950,11 +959,11 @@
             </a:r>
             <a:r>
               <a:rPr lang="fr-FR" dirty="0" smtClean="0"/>
-              <a:t>/pipe/</a:t>
+              <a:t>/</a:t>
             </a:r>
             <a:r>
               <a:rPr lang="fr-FR" dirty="0" err="1" smtClean="0"/>
-              <a:t>orderBy</a:t>
+              <a:t>student</a:t>
             </a:r>
             <a:endParaRPr lang="fr-FR" dirty="0"/>
           </a:p>
@@ -977,7 +986,7 @@
           <a:p>
             <a:fld id="{FD0CA3AA-443A-466C-BF59-FB6574BB11C3}" type="slidenum">
               <a:rPr lang="fr-FR" smtClean="0"/>
-              <a:t>17</a:t>
+              <a:t>15</a:t>
             </a:fld>
             <a:endParaRPr lang="fr-FR"/>
           </a:p>
@@ -986,7 +995,7 @@
     </p:spTree>
     <p:extLst>
       <p:ext uri="{BB962C8B-B14F-4D97-AF65-F5344CB8AC3E}">
-        <p14:creationId xmlns:p14="http://schemas.microsoft.com/office/powerpoint/2010/main" val="2840317410"/>
+        <p14:creationId xmlns:p14="http://schemas.microsoft.com/office/powerpoint/2010/main" val="3836970229"/>
       </p:ext>
     </p:extLst>
   </p:cSld>
@@ -1041,1250 +1050,43 @@
           <a:lstStyle/>
           <a:p>
             <a:r>
-              <a:rPr lang="fr-FR" sz="1200" b="0" kern="1200" dirty="0" err="1" smtClean="0">
-                <a:solidFill>
-                  <a:schemeClr val="tx1"/>
-                </a:solidFill>
-                <a:effectLst/>
-                <a:latin typeface="+mn-lt"/>
-                <a:ea typeface="+mn-ea"/>
-                <a:cs typeface="+mn-cs"/>
-              </a:rPr>
-              <a:t>intercept</a:t>
-            </a:r>
-            <a:r>
-              <a:rPr lang="fr-FR" sz="1200" b="0" kern="1200" dirty="0" smtClean="0">
-                <a:solidFill>
-                  <a:schemeClr val="tx1"/>
-                </a:solidFill>
-                <a:effectLst/>
-                <a:latin typeface="+mn-lt"/>
-                <a:ea typeface="+mn-ea"/>
-                <a:cs typeface="+mn-cs"/>
-              </a:rPr>
-              <a:t>(</a:t>
-            </a:r>
-            <a:r>
-              <a:rPr lang="fr-FR" sz="1200" b="0" kern="1200" dirty="0" err="1" smtClean="0">
-                <a:solidFill>
-                  <a:schemeClr val="tx1"/>
-                </a:solidFill>
-                <a:effectLst/>
-                <a:latin typeface="+mn-lt"/>
-                <a:ea typeface="+mn-ea"/>
-                <a:cs typeface="+mn-cs"/>
-              </a:rPr>
-              <a:t>req</a:t>
-            </a:r>
-            <a:r>
-              <a:rPr lang="fr-FR" sz="1200" b="0" kern="1200" dirty="0" smtClean="0">
-                <a:solidFill>
-                  <a:schemeClr val="tx1"/>
-                </a:solidFill>
-                <a:effectLst/>
-                <a:latin typeface="+mn-lt"/>
-                <a:ea typeface="+mn-ea"/>
-                <a:cs typeface="+mn-cs"/>
-              </a:rPr>
-              <a:t>: </a:t>
-            </a:r>
-            <a:r>
-              <a:rPr lang="fr-FR" sz="1200" b="0" kern="1200" dirty="0" err="1" smtClean="0">
-                <a:solidFill>
-                  <a:schemeClr val="tx1"/>
-                </a:solidFill>
-                <a:effectLst/>
-                <a:latin typeface="+mn-lt"/>
-                <a:ea typeface="+mn-ea"/>
-                <a:cs typeface="+mn-cs"/>
-              </a:rPr>
-              <a:t>HttpRequest</a:t>
-            </a:r>
-            <a:r>
-              <a:rPr lang="fr-FR" sz="1200" b="0" kern="1200" dirty="0" smtClean="0">
-                <a:solidFill>
-                  <a:schemeClr val="tx1"/>
-                </a:solidFill>
-                <a:effectLst/>
-                <a:latin typeface="+mn-lt"/>
-                <a:ea typeface="+mn-ea"/>
-                <a:cs typeface="+mn-cs"/>
-              </a:rPr>
-              <a:t>&lt;</a:t>
-            </a:r>
-            <a:r>
-              <a:rPr lang="fr-FR" sz="1200" b="0" kern="1200" dirty="0" err="1" smtClean="0">
-                <a:solidFill>
-                  <a:schemeClr val="tx1"/>
-                </a:solidFill>
-                <a:effectLst/>
-                <a:latin typeface="+mn-lt"/>
-                <a:ea typeface="+mn-ea"/>
-                <a:cs typeface="+mn-cs"/>
-              </a:rPr>
-              <a:t>any</a:t>
-            </a:r>
-            <a:r>
-              <a:rPr lang="fr-FR" sz="1200" b="0" kern="1200" dirty="0" smtClean="0">
-                <a:solidFill>
-                  <a:schemeClr val="tx1"/>
-                </a:solidFill>
-                <a:effectLst/>
-                <a:latin typeface="+mn-lt"/>
-                <a:ea typeface="+mn-ea"/>
-                <a:cs typeface="+mn-cs"/>
-              </a:rPr>
-              <a:t>&gt;, </a:t>
-            </a:r>
-            <a:r>
-              <a:rPr lang="fr-FR" sz="1200" b="0" kern="1200" dirty="0" err="1" smtClean="0">
-                <a:solidFill>
-                  <a:schemeClr val="tx1"/>
-                </a:solidFill>
-                <a:effectLst/>
-                <a:latin typeface="+mn-lt"/>
-                <a:ea typeface="+mn-ea"/>
-                <a:cs typeface="+mn-cs"/>
-              </a:rPr>
-              <a:t>next</a:t>
-            </a:r>
-            <a:r>
-              <a:rPr lang="fr-FR" sz="1200" b="0" kern="1200" dirty="0" smtClean="0">
-                <a:solidFill>
-                  <a:schemeClr val="tx1"/>
-                </a:solidFill>
-                <a:effectLst/>
-                <a:latin typeface="+mn-lt"/>
-                <a:ea typeface="+mn-ea"/>
-                <a:cs typeface="+mn-cs"/>
-              </a:rPr>
-              <a:t>: </a:t>
-            </a:r>
-            <a:r>
-              <a:rPr lang="fr-FR" sz="1200" b="0" kern="1200" dirty="0" err="1" smtClean="0">
-                <a:solidFill>
-                  <a:schemeClr val="tx1"/>
-                </a:solidFill>
-                <a:effectLst/>
-                <a:latin typeface="+mn-lt"/>
-                <a:ea typeface="+mn-ea"/>
-                <a:cs typeface="+mn-cs"/>
-              </a:rPr>
-              <a:t>HttpHandler</a:t>
-            </a:r>
-            <a:r>
-              <a:rPr lang="fr-FR" sz="1200" b="0" kern="1200" dirty="0" smtClean="0">
-                <a:solidFill>
-                  <a:schemeClr val="tx1"/>
-                </a:solidFill>
-                <a:effectLst/>
-                <a:latin typeface="+mn-lt"/>
-                <a:ea typeface="+mn-ea"/>
-                <a:cs typeface="+mn-cs"/>
-              </a:rPr>
-              <a:t>): Observable&lt;</a:t>
-            </a:r>
-            <a:r>
-              <a:rPr lang="fr-FR" sz="1200" b="0" kern="1200" dirty="0" err="1" smtClean="0">
-                <a:solidFill>
-                  <a:schemeClr val="tx1"/>
-                </a:solidFill>
-                <a:effectLst/>
-                <a:latin typeface="+mn-lt"/>
-                <a:ea typeface="+mn-ea"/>
-                <a:cs typeface="+mn-cs"/>
-              </a:rPr>
-              <a:t>HttpEvent</a:t>
-            </a:r>
-            <a:r>
-              <a:rPr lang="fr-FR" sz="1200" b="0" kern="1200" dirty="0" smtClean="0">
-                <a:solidFill>
-                  <a:schemeClr val="tx1"/>
-                </a:solidFill>
-                <a:effectLst/>
-                <a:latin typeface="+mn-lt"/>
-                <a:ea typeface="+mn-ea"/>
-                <a:cs typeface="+mn-cs"/>
-              </a:rPr>
-              <a:t>&lt;</a:t>
-            </a:r>
-            <a:r>
-              <a:rPr lang="fr-FR" sz="1200" b="0" kern="1200" dirty="0" err="1" smtClean="0">
-                <a:solidFill>
-                  <a:schemeClr val="tx1"/>
-                </a:solidFill>
-                <a:effectLst/>
-                <a:latin typeface="+mn-lt"/>
-                <a:ea typeface="+mn-ea"/>
-                <a:cs typeface="+mn-cs"/>
-              </a:rPr>
-              <a:t>any</a:t>
-            </a:r>
-            <a:r>
-              <a:rPr lang="fr-FR" sz="1200" b="0" kern="1200" dirty="0" smtClean="0">
-                <a:solidFill>
-                  <a:schemeClr val="tx1"/>
-                </a:solidFill>
-                <a:effectLst/>
-                <a:latin typeface="+mn-lt"/>
-                <a:ea typeface="+mn-ea"/>
-                <a:cs typeface="+mn-cs"/>
-              </a:rPr>
-              <a:t>&gt;&gt; {</a:t>
-            </a:r>
-          </a:p>
-          <a:p>
-            <a:r>
-              <a:rPr lang="fr-FR" sz="1200" b="0" kern="1200" dirty="0" err="1" smtClean="0">
-                <a:solidFill>
-                  <a:schemeClr val="tx1"/>
-                </a:solidFill>
-                <a:effectLst/>
-                <a:latin typeface="+mn-lt"/>
-                <a:ea typeface="+mn-ea"/>
-                <a:cs typeface="+mn-cs"/>
-              </a:rPr>
-              <a:t>const</a:t>
-            </a:r>
-            <a:r>
-              <a:rPr lang="fr-FR" sz="1200" b="0" kern="1200" dirty="0" smtClean="0">
-                <a:solidFill>
-                  <a:schemeClr val="tx1"/>
-                </a:solidFill>
-                <a:effectLst/>
-                <a:latin typeface="+mn-lt"/>
-                <a:ea typeface="+mn-ea"/>
-                <a:cs typeface="+mn-cs"/>
-              </a:rPr>
+              <a:rPr lang="fr-FR" dirty="0" err="1" smtClean="0"/>
+              <a:t>Ng</a:t>
+            </a:r>
+            <a:r>
+              <a:rPr lang="fr-FR" dirty="0" smtClean="0"/>
+              <a:t> g module </a:t>
+            </a:r>
+            <a:r>
+              <a:rPr lang="fr-FR" dirty="0" err="1" smtClean="0"/>
+              <a:t>shared</a:t>
+            </a:r>
+            <a:r>
+              <a:rPr lang="fr-FR" dirty="0" smtClean="0"/>
               <a:t> </a:t>
             </a:r>
-            <a:r>
-              <a:rPr lang="fr-FR" sz="1200" b="0" kern="1200" dirty="0" err="1" smtClean="0">
-                <a:solidFill>
-                  <a:schemeClr val="tx1"/>
-                </a:solidFill>
-                <a:effectLst/>
-                <a:latin typeface="+mn-lt"/>
-                <a:ea typeface="+mn-ea"/>
-                <a:cs typeface="+mn-cs"/>
-              </a:rPr>
-              <a:t>noCache</a:t>
-            </a:r>
-            <a:r>
-              <a:rPr lang="fr-FR" sz="1200" b="0" kern="1200" dirty="0" smtClean="0">
-                <a:solidFill>
-                  <a:schemeClr val="tx1"/>
-                </a:solidFill>
-                <a:effectLst/>
-                <a:latin typeface="+mn-lt"/>
-                <a:ea typeface="+mn-ea"/>
-                <a:cs typeface="+mn-cs"/>
-              </a:rPr>
-              <a:t> = </a:t>
-            </a:r>
-            <a:r>
-              <a:rPr lang="fr-FR" sz="1200" b="0" kern="1200" dirty="0" err="1" smtClean="0">
-                <a:solidFill>
-                  <a:schemeClr val="tx1"/>
-                </a:solidFill>
-                <a:effectLst/>
-                <a:latin typeface="+mn-lt"/>
-                <a:ea typeface="+mn-ea"/>
-                <a:cs typeface="+mn-cs"/>
-              </a:rPr>
-              <a:t>req.params.get</a:t>
-            </a:r>
-            <a:r>
-              <a:rPr lang="fr-FR" sz="1200" b="0" kern="1200" dirty="0" smtClean="0">
-                <a:solidFill>
-                  <a:schemeClr val="tx1"/>
-                </a:solidFill>
-                <a:effectLst/>
-                <a:latin typeface="+mn-lt"/>
-                <a:ea typeface="+mn-ea"/>
-                <a:cs typeface="+mn-cs"/>
-              </a:rPr>
-              <a:t>('</a:t>
-            </a:r>
-            <a:r>
-              <a:rPr lang="fr-FR" sz="1200" b="0" kern="1200" dirty="0" err="1" smtClean="0">
-                <a:solidFill>
-                  <a:schemeClr val="tx1"/>
-                </a:solidFill>
-                <a:effectLst/>
-                <a:latin typeface="+mn-lt"/>
-                <a:ea typeface="+mn-ea"/>
-                <a:cs typeface="+mn-cs"/>
-              </a:rPr>
-              <a:t>noCache</a:t>
-            </a:r>
-            <a:r>
-              <a:rPr lang="fr-FR" sz="1200" b="0" kern="1200" dirty="0" smtClean="0">
-                <a:solidFill>
-                  <a:schemeClr val="tx1"/>
-                </a:solidFill>
-                <a:effectLst/>
-                <a:latin typeface="+mn-lt"/>
-                <a:ea typeface="+mn-ea"/>
-                <a:cs typeface="+mn-cs"/>
-              </a:rPr>
-              <a:t>') === '</a:t>
-            </a:r>
-            <a:r>
-              <a:rPr lang="fr-FR" sz="1200" b="0" kern="1200" dirty="0" err="1" smtClean="0">
-                <a:solidFill>
-                  <a:schemeClr val="tx1"/>
-                </a:solidFill>
-                <a:effectLst/>
-                <a:latin typeface="+mn-lt"/>
-                <a:ea typeface="+mn-ea"/>
-                <a:cs typeface="+mn-cs"/>
-              </a:rPr>
-              <a:t>true</a:t>
-            </a:r>
-            <a:r>
-              <a:rPr lang="fr-FR" sz="1200" b="0" kern="1200" dirty="0" smtClean="0">
-                <a:solidFill>
-                  <a:schemeClr val="tx1"/>
-                </a:solidFill>
-                <a:effectLst/>
-                <a:latin typeface="+mn-lt"/>
-                <a:ea typeface="+mn-ea"/>
-                <a:cs typeface="+mn-cs"/>
-              </a:rPr>
-              <a:t>';</a:t>
-            </a:r>
-          </a:p>
-          <a:p>
-            <a:r>
-              <a:rPr lang="fr-FR" sz="1200" b="0" kern="1200" dirty="0" err="1" smtClean="0">
-                <a:solidFill>
-                  <a:schemeClr val="tx1"/>
-                </a:solidFill>
-                <a:effectLst/>
-                <a:latin typeface="+mn-lt"/>
-                <a:ea typeface="+mn-ea"/>
-                <a:cs typeface="+mn-cs"/>
-              </a:rPr>
-              <a:t>const</a:t>
-            </a:r>
-            <a:r>
-              <a:rPr lang="fr-FR" sz="1200" b="0" kern="1200" dirty="0" smtClean="0">
-                <a:solidFill>
-                  <a:schemeClr val="tx1"/>
-                </a:solidFill>
-                <a:effectLst/>
-                <a:latin typeface="+mn-lt"/>
-                <a:ea typeface="+mn-ea"/>
-                <a:cs typeface="+mn-cs"/>
-              </a:rPr>
-              <a:t> </a:t>
-            </a:r>
-            <a:r>
-              <a:rPr lang="fr-FR" sz="1200" b="0" kern="1200" dirty="0" err="1" smtClean="0">
-                <a:solidFill>
-                  <a:schemeClr val="tx1"/>
-                </a:solidFill>
-                <a:effectLst/>
-                <a:latin typeface="+mn-lt"/>
-                <a:ea typeface="+mn-ea"/>
-                <a:cs typeface="+mn-cs"/>
-              </a:rPr>
-              <a:t>noErrorModal</a:t>
-            </a:r>
-            <a:r>
-              <a:rPr lang="fr-FR" sz="1200" b="0" kern="1200" dirty="0" smtClean="0">
-                <a:solidFill>
-                  <a:schemeClr val="tx1"/>
-                </a:solidFill>
-                <a:effectLst/>
-                <a:latin typeface="+mn-lt"/>
-                <a:ea typeface="+mn-ea"/>
-                <a:cs typeface="+mn-cs"/>
-              </a:rPr>
-              <a:t> = </a:t>
-            </a:r>
-            <a:r>
-              <a:rPr lang="fr-FR" sz="1200" b="0" kern="1200" dirty="0" err="1" smtClean="0">
-                <a:solidFill>
-                  <a:schemeClr val="tx1"/>
-                </a:solidFill>
-                <a:effectLst/>
-                <a:latin typeface="+mn-lt"/>
-                <a:ea typeface="+mn-ea"/>
-                <a:cs typeface="+mn-cs"/>
-              </a:rPr>
-              <a:t>req.params.get</a:t>
-            </a:r>
-            <a:r>
-              <a:rPr lang="fr-FR" sz="1200" b="0" kern="1200" dirty="0" smtClean="0">
-                <a:solidFill>
-                  <a:schemeClr val="tx1"/>
-                </a:solidFill>
-                <a:effectLst/>
-                <a:latin typeface="+mn-lt"/>
-                <a:ea typeface="+mn-ea"/>
-                <a:cs typeface="+mn-cs"/>
-              </a:rPr>
-              <a:t>('</a:t>
-            </a:r>
-            <a:r>
-              <a:rPr lang="fr-FR" sz="1200" b="0" kern="1200" dirty="0" err="1" smtClean="0">
-                <a:solidFill>
-                  <a:schemeClr val="tx1"/>
-                </a:solidFill>
-                <a:effectLst/>
-                <a:latin typeface="+mn-lt"/>
-                <a:ea typeface="+mn-ea"/>
-                <a:cs typeface="+mn-cs"/>
-              </a:rPr>
-              <a:t>noErrorModal</a:t>
-            </a:r>
-            <a:r>
-              <a:rPr lang="fr-FR" sz="1200" b="0" kern="1200" dirty="0" smtClean="0">
-                <a:solidFill>
-                  <a:schemeClr val="tx1"/>
-                </a:solidFill>
-                <a:effectLst/>
-                <a:latin typeface="+mn-lt"/>
-                <a:ea typeface="+mn-ea"/>
-                <a:cs typeface="+mn-cs"/>
-              </a:rPr>
-              <a:t>') === '</a:t>
-            </a:r>
-            <a:r>
-              <a:rPr lang="fr-FR" sz="1200" b="0" kern="1200" dirty="0" err="1" smtClean="0">
-                <a:solidFill>
-                  <a:schemeClr val="tx1"/>
-                </a:solidFill>
-                <a:effectLst/>
-                <a:latin typeface="+mn-lt"/>
-                <a:ea typeface="+mn-ea"/>
-                <a:cs typeface="+mn-cs"/>
-              </a:rPr>
-              <a:t>true</a:t>
-            </a:r>
-            <a:r>
-              <a:rPr lang="fr-FR" sz="1200" b="0" kern="1200" dirty="0" smtClean="0">
-                <a:solidFill>
-                  <a:schemeClr val="tx1"/>
-                </a:solidFill>
-                <a:effectLst/>
-                <a:latin typeface="+mn-lt"/>
-                <a:ea typeface="+mn-ea"/>
-                <a:cs typeface="+mn-cs"/>
-              </a:rPr>
-              <a:t>';</a:t>
-            </a:r>
-          </a:p>
-          <a:p>
-            <a:r>
-              <a:rPr lang="fr-FR" sz="1200" b="0" kern="1200" dirty="0" smtClean="0">
-                <a:solidFill>
-                  <a:schemeClr val="tx1"/>
-                </a:solidFill>
-                <a:effectLst/>
-                <a:latin typeface="+mn-lt"/>
-                <a:ea typeface="+mn-ea"/>
-                <a:cs typeface="+mn-cs"/>
-              </a:rPr>
-              <a:t/>
-            </a:r>
-            <a:br>
-              <a:rPr lang="fr-FR" sz="1200" b="0" kern="1200" dirty="0" smtClean="0">
-                <a:solidFill>
-                  <a:schemeClr val="tx1"/>
-                </a:solidFill>
-                <a:effectLst/>
-                <a:latin typeface="+mn-lt"/>
-                <a:ea typeface="+mn-ea"/>
-                <a:cs typeface="+mn-cs"/>
-              </a:rPr>
-            </a:br>
-            <a:r>
-              <a:rPr lang="fr-FR" sz="1200" b="0" kern="1200" dirty="0" err="1" smtClean="0">
-                <a:solidFill>
-                  <a:schemeClr val="tx1"/>
-                </a:solidFill>
-                <a:effectLst/>
-                <a:latin typeface="+mn-lt"/>
-                <a:ea typeface="+mn-ea"/>
-                <a:cs typeface="+mn-cs"/>
-              </a:rPr>
-              <a:t>this.loading.pendingRequests</a:t>
-            </a:r>
-            <a:r>
-              <a:rPr lang="fr-FR" sz="1200" b="0" kern="1200" dirty="0" smtClean="0">
-                <a:solidFill>
-                  <a:schemeClr val="tx1"/>
-                </a:solidFill>
-                <a:effectLst/>
-                <a:latin typeface="+mn-lt"/>
-                <a:ea typeface="+mn-ea"/>
-                <a:cs typeface="+mn-cs"/>
-              </a:rPr>
-              <a:t>++;</a:t>
-            </a:r>
-          </a:p>
-          <a:p>
-            <a:r>
-              <a:rPr lang="fr-FR" sz="1200" b="0" kern="1200" dirty="0" smtClean="0">
-                <a:solidFill>
-                  <a:schemeClr val="tx1"/>
-                </a:solidFill>
-                <a:effectLst/>
-                <a:latin typeface="+mn-lt"/>
-                <a:ea typeface="+mn-ea"/>
-                <a:cs typeface="+mn-cs"/>
-              </a:rPr>
-              <a:t>return </a:t>
-            </a:r>
-            <a:r>
-              <a:rPr lang="fr-FR" sz="1200" b="0" kern="1200" dirty="0" err="1" smtClean="0">
-                <a:solidFill>
-                  <a:schemeClr val="tx1"/>
-                </a:solidFill>
-                <a:effectLst/>
-                <a:latin typeface="+mn-lt"/>
-                <a:ea typeface="+mn-ea"/>
-                <a:cs typeface="+mn-cs"/>
-              </a:rPr>
-              <a:t>next.handle</a:t>
-            </a:r>
-            <a:r>
-              <a:rPr lang="fr-FR" sz="1200" b="0" kern="1200" dirty="0" smtClean="0">
-                <a:solidFill>
-                  <a:schemeClr val="tx1"/>
-                </a:solidFill>
-                <a:effectLst/>
-                <a:latin typeface="+mn-lt"/>
-                <a:ea typeface="+mn-ea"/>
-                <a:cs typeface="+mn-cs"/>
-              </a:rPr>
-              <a:t>(</a:t>
-            </a:r>
-            <a:r>
-              <a:rPr lang="fr-FR" sz="1200" b="0" kern="1200" dirty="0" err="1" smtClean="0">
-                <a:solidFill>
-                  <a:schemeClr val="tx1"/>
-                </a:solidFill>
-                <a:effectLst/>
-                <a:latin typeface="+mn-lt"/>
-                <a:ea typeface="+mn-ea"/>
-                <a:cs typeface="+mn-cs"/>
-              </a:rPr>
-              <a:t>req</a:t>
-            </a:r>
-            <a:r>
-              <a:rPr lang="fr-FR" sz="1200" b="0" kern="1200" dirty="0" smtClean="0">
-                <a:solidFill>
-                  <a:schemeClr val="tx1"/>
-                </a:solidFill>
-                <a:effectLst/>
-                <a:latin typeface="+mn-lt"/>
-                <a:ea typeface="+mn-ea"/>
-                <a:cs typeface="+mn-cs"/>
-              </a:rPr>
-              <a:t>)</a:t>
-            </a:r>
-          </a:p>
-          <a:p>
-            <a:r>
-              <a:rPr lang="fr-FR" sz="1200" b="0" kern="1200" dirty="0" smtClean="0">
-                <a:solidFill>
-                  <a:schemeClr val="tx1"/>
-                </a:solidFill>
-                <a:effectLst/>
-                <a:latin typeface="+mn-lt"/>
-                <a:ea typeface="+mn-ea"/>
-                <a:cs typeface="+mn-cs"/>
-              </a:rPr>
-              <a:t>.timeout(REQUEST_TIMEOUT)</a:t>
-            </a:r>
-          </a:p>
-          <a:p>
-            <a:r>
-              <a:rPr lang="fr-FR" sz="1200" b="0" kern="1200" dirty="0" smtClean="0">
-                <a:solidFill>
-                  <a:schemeClr val="tx1"/>
-                </a:solidFill>
-                <a:effectLst/>
-                <a:latin typeface="+mn-lt"/>
-                <a:ea typeface="+mn-ea"/>
-                <a:cs typeface="+mn-cs"/>
-              </a:rPr>
-              <a:t>.</a:t>
-            </a:r>
-            <a:r>
-              <a:rPr lang="fr-FR" sz="1200" b="0" kern="1200" dirty="0" err="1" smtClean="0">
-                <a:solidFill>
-                  <a:schemeClr val="tx1"/>
-                </a:solidFill>
-                <a:effectLst/>
-                <a:latin typeface="+mn-lt"/>
-                <a:ea typeface="+mn-ea"/>
-                <a:cs typeface="+mn-cs"/>
-              </a:rPr>
-              <a:t>filter</a:t>
-            </a:r>
-            <a:r>
-              <a:rPr lang="fr-FR" sz="1200" b="0" kern="1200" dirty="0" smtClean="0">
-                <a:solidFill>
-                  <a:schemeClr val="tx1"/>
-                </a:solidFill>
-                <a:effectLst/>
-                <a:latin typeface="+mn-lt"/>
-                <a:ea typeface="+mn-ea"/>
-                <a:cs typeface="+mn-cs"/>
-              </a:rPr>
-              <a:t>(</a:t>
-            </a:r>
-            <a:r>
-              <a:rPr lang="fr-FR" sz="1200" b="0" kern="1200" dirty="0" err="1" smtClean="0">
-                <a:solidFill>
-                  <a:schemeClr val="tx1"/>
-                </a:solidFill>
-                <a:effectLst/>
-                <a:latin typeface="+mn-lt"/>
-                <a:ea typeface="+mn-ea"/>
-                <a:cs typeface="+mn-cs"/>
-              </a:rPr>
-              <a:t>result</a:t>
-            </a:r>
-            <a:r>
-              <a:rPr lang="fr-FR" sz="1200" b="0" kern="1200" dirty="0" smtClean="0">
-                <a:solidFill>
-                  <a:schemeClr val="tx1"/>
-                </a:solidFill>
-                <a:effectLst/>
-                <a:latin typeface="+mn-lt"/>
-                <a:ea typeface="+mn-ea"/>
-                <a:cs typeface="+mn-cs"/>
-              </a:rPr>
-              <a:t> =&gt; </a:t>
-            </a:r>
-            <a:r>
-              <a:rPr lang="fr-FR" sz="1200" b="0" kern="1200" dirty="0" err="1" smtClean="0">
-                <a:solidFill>
-                  <a:schemeClr val="tx1"/>
-                </a:solidFill>
-                <a:effectLst/>
-                <a:latin typeface="+mn-lt"/>
-                <a:ea typeface="+mn-ea"/>
-                <a:cs typeface="+mn-cs"/>
-              </a:rPr>
-              <a:t>this.isHttpResponse</a:t>
-            </a:r>
-            <a:r>
-              <a:rPr lang="fr-FR" sz="1200" b="0" kern="1200" dirty="0" smtClean="0">
-                <a:solidFill>
-                  <a:schemeClr val="tx1"/>
-                </a:solidFill>
-                <a:effectLst/>
-                <a:latin typeface="+mn-lt"/>
-                <a:ea typeface="+mn-ea"/>
-                <a:cs typeface="+mn-cs"/>
-              </a:rPr>
-              <a:t>(</a:t>
-            </a:r>
-            <a:r>
-              <a:rPr lang="fr-FR" sz="1200" b="0" kern="1200" dirty="0" err="1" smtClean="0">
-                <a:solidFill>
-                  <a:schemeClr val="tx1"/>
-                </a:solidFill>
-                <a:effectLst/>
-                <a:latin typeface="+mn-lt"/>
-                <a:ea typeface="+mn-ea"/>
-                <a:cs typeface="+mn-cs"/>
-              </a:rPr>
-              <a:t>result</a:t>
-            </a:r>
-            <a:r>
-              <a:rPr lang="fr-FR" sz="1200" b="0" kern="1200" dirty="0" smtClean="0">
-                <a:solidFill>
-                  <a:schemeClr val="tx1"/>
-                </a:solidFill>
-                <a:effectLst/>
-                <a:latin typeface="+mn-lt"/>
-                <a:ea typeface="+mn-ea"/>
-                <a:cs typeface="+mn-cs"/>
-              </a:rPr>
-              <a:t>))</a:t>
-            </a:r>
-          </a:p>
-          <a:p>
-            <a:r>
-              <a:rPr lang="fr-FR" sz="1200" b="0" kern="1200" dirty="0" smtClean="0">
-                <a:solidFill>
-                  <a:schemeClr val="tx1"/>
-                </a:solidFill>
-                <a:effectLst/>
-                <a:latin typeface="+mn-lt"/>
-                <a:ea typeface="+mn-ea"/>
-                <a:cs typeface="+mn-cs"/>
-              </a:rPr>
-              <a:t>.do(</a:t>
-            </a:r>
-            <a:r>
-              <a:rPr lang="fr-FR" sz="1200" b="0" kern="1200" dirty="0" err="1" smtClean="0">
-                <a:solidFill>
-                  <a:schemeClr val="tx1"/>
-                </a:solidFill>
-                <a:effectLst/>
-                <a:latin typeface="+mn-lt"/>
-                <a:ea typeface="+mn-ea"/>
-                <a:cs typeface="+mn-cs"/>
-              </a:rPr>
-              <a:t>result</a:t>
-            </a:r>
-            <a:r>
-              <a:rPr lang="fr-FR" sz="1200" b="0" kern="1200" dirty="0" smtClean="0">
-                <a:solidFill>
-                  <a:schemeClr val="tx1"/>
-                </a:solidFill>
-                <a:effectLst/>
-                <a:latin typeface="+mn-lt"/>
-                <a:ea typeface="+mn-ea"/>
-                <a:cs typeface="+mn-cs"/>
-              </a:rPr>
-              <a:t> =&gt; !</a:t>
-            </a:r>
-            <a:r>
-              <a:rPr lang="fr-FR" sz="1200" b="0" kern="1200" dirty="0" err="1" smtClean="0">
-                <a:solidFill>
-                  <a:schemeClr val="tx1"/>
-                </a:solidFill>
-                <a:effectLst/>
-                <a:latin typeface="+mn-lt"/>
-                <a:ea typeface="+mn-ea"/>
-                <a:cs typeface="+mn-cs"/>
-              </a:rPr>
-              <a:t>noCache</a:t>
-            </a:r>
-            <a:r>
-              <a:rPr lang="fr-FR" sz="1200" b="0" kern="1200" dirty="0" smtClean="0">
-                <a:solidFill>
-                  <a:schemeClr val="tx1"/>
-                </a:solidFill>
-                <a:effectLst/>
-                <a:latin typeface="+mn-lt"/>
-                <a:ea typeface="+mn-ea"/>
-                <a:cs typeface="+mn-cs"/>
-              </a:rPr>
-              <a:t> &amp;&amp; </a:t>
-            </a:r>
-            <a:r>
-              <a:rPr lang="fr-FR" sz="1200" b="0" kern="1200" dirty="0" err="1" smtClean="0">
-                <a:solidFill>
-                  <a:schemeClr val="tx1"/>
-                </a:solidFill>
-                <a:effectLst/>
-                <a:latin typeface="+mn-lt"/>
-                <a:ea typeface="+mn-ea"/>
-                <a:cs typeface="+mn-cs"/>
-              </a:rPr>
-              <a:t>this.cacheRequestResponse</a:t>
-            </a:r>
-            <a:r>
-              <a:rPr lang="fr-FR" sz="1200" b="0" kern="1200" dirty="0" smtClean="0">
-                <a:solidFill>
-                  <a:schemeClr val="tx1"/>
-                </a:solidFill>
-                <a:effectLst/>
-                <a:latin typeface="+mn-lt"/>
-                <a:ea typeface="+mn-ea"/>
-                <a:cs typeface="+mn-cs"/>
-              </a:rPr>
-              <a:t>(req.url, </a:t>
-            </a:r>
-            <a:r>
-              <a:rPr lang="fr-FR" sz="1200" b="0" kern="1200" dirty="0" err="1" smtClean="0">
-                <a:solidFill>
-                  <a:schemeClr val="tx1"/>
-                </a:solidFill>
-                <a:effectLst/>
-                <a:latin typeface="+mn-lt"/>
-                <a:ea typeface="+mn-ea"/>
-                <a:cs typeface="+mn-cs"/>
-              </a:rPr>
-              <a:t>result</a:t>
-            </a:r>
-            <a:r>
-              <a:rPr lang="fr-FR" sz="1200" b="0" kern="1200" dirty="0" smtClean="0">
-                <a:solidFill>
-                  <a:schemeClr val="tx1"/>
-                </a:solidFill>
-                <a:effectLst/>
-                <a:latin typeface="+mn-lt"/>
-                <a:ea typeface="+mn-ea"/>
-                <a:cs typeface="+mn-cs"/>
-              </a:rPr>
-              <a:t> as </a:t>
-            </a:r>
-            <a:r>
-              <a:rPr lang="fr-FR" sz="1200" b="0" kern="1200" dirty="0" err="1" smtClean="0">
-                <a:solidFill>
-                  <a:schemeClr val="tx1"/>
-                </a:solidFill>
-                <a:effectLst/>
-                <a:latin typeface="+mn-lt"/>
-                <a:ea typeface="+mn-ea"/>
-                <a:cs typeface="+mn-cs"/>
-              </a:rPr>
-              <a:t>HttpResponse</a:t>
-            </a:r>
-            <a:r>
-              <a:rPr lang="fr-FR" sz="1200" b="0" kern="1200" dirty="0" smtClean="0">
-                <a:solidFill>
-                  <a:schemeClr val="tx1"/>
-                </a:solidFill>
-                <a:effectLst/>
-                <a:latin typeface="+mn-lt"/>
-                <a:ea typeface="+mn-ea"/>
-                <a:cs typeface="+mn-cs"/>
-              </a:rPr>
-              <a:t>&lt;</a:t>
-            </a:r>
-            <a:r>
-              <a:rPr lang="fr-FR" sz="1200" b="0" kern="1200" dirty="0" err="1" smtClean="0">
-                <a:solidFill>
-                  <a:schemeClr val="tx1"/>
-                </a:solidFill>
-                <a:effectLst/>
-                <a:latin typeface="+mn-lt"/>
-                <a:ea typeface="+mn-ea"/>
-                <a:cs typeface="+mn-cs"/>
-              </a:rPr>
-              <a:t>any</a:t>
-            </a:r>
-            <a:r>
-              <a:rPr lang="fr-FR" sz="1200" b="0" kern="1200" dirty="0" smtClean="0">
-                <a:solidFill>
-                  <a:schemeClr val="tx1"/>
-                </a:solidFill>
-                <a:effectLst/>
-                <a:latin typeface="+mn-lt"/>
-                <a:ea typeface="+mn-ea"/>
-                <a:cs typeface="+mn-cs"/>
-              </a:rPr>
-              <a:t>&gt;))</a:t>
-            </a:r>
-          </a:p>
-          <a:p>
-            <a:r>
-              <a:rPr lang="fr-FR" sz="1200" b="0" kern="1200" dirty="0" smtClean="0">
-                <a:solidFill>
-                  <a:schemeClr val="tx1"/>
-                </a:solidFill>
-                <a:effectLst/>
-                <a:latin typeface="+mn-lt"/>
-                <a:ea typeface="+mn-ea"/>
-                <a:cs typeface="+mn-cs"/>
-              </a:rPr>
-              <a:t>.catch((</a:t>
-            </a:r>
-            <a:r>
-              <a:rPr lang="fr-FR" sz="1200" b="0" kern="1200" dirty="0" err="1" smtClean="0">
-                <a:solidFill>
-                  <a:schemeClr val="tx1"/>
-                </a:solidFill>
-                <a:effectLst/>
-                <a:latin typeface="+mn-lt"/>
-                <a:ea typeface="+mn-ea"/>
-                <a:cs typeface="+mn-cs"/>
-              </a:rPr>
-              <a:t>error</a:t>
-            </a:r>
-            <a:r>
-              <a:rPr lang="fr-FR" sz="1200" b="0" kern="1200" dirty="0" smtClean="0">
-                <a:solidFill>
-                  <a:schemeClr val="tx1"/>
-                </a:solidFill>
-                <a:effectLst/>
-                <a:latin typeface="+mn-lt"/>
-                <a:ea typeface="+mn-ea"/>
-                <a:cs typeface="+mn-cs"/>
-              </a:rPr>
-              <a:t>, </a:t>
-            </a:r>
-            <a:r>
-              <a:rPr lang="fr-FR" sz="1200" b="0" kern="1200" dirty="0" err="1" smtClean="0">
-                <a:solidFill>
-                  <a:schemeClr val="tx1"/>
-                </a:solidFill>
-                <a:effectLst/>
-                <a:latin typeface="+mn-lt"/>
-                <a:ea typeface="+mn-ea"/>
-                <a:cs typeface="+mn-cs"/>
-              </a:rPr>
-              <a:t>caught</a:t>
-            </a:r>
-            <a:r>
-              <a:rPr lang="fr-FR" sz="1200" b="0" kern="1200" dirty="0" smtClean="0">
-                <a:solidFill>
-                  <a:schemeClr val="tx1"/>
-                </a:solidFill>
-                <a:effectLst/>
-                <a:latin typeface="+mn-lt"/>
-                <a:ea typeface="+mn-ea"/>
-                <a:cs typeface="+mn-cs"/>
-              </a:rPr>
-              <a:t>) =&gt; {</a:t>
-            </a:r>
-          </a:p>
-          <a:p>
-            <a:r>
-              <a:rPr lang="fr-FR" sz="1200" b="0" kern="1200" dirty="0" smtClean="0">
-                <a:solidFill>
-                  <a:schemeClr val="tx1"/>
-                </a:solidFill>
-                <a:effectLst/>
-                <a:latin typeface="+mn-lt"/>
-                <a:ea typeface="+mn-ea"/>
-                <a:cs typeface="+mn-cs"/>
-              </a:rPr>
-              <a:t>if (</a:t>
-            </a:r>
-            <a:r>
-              <a:rPr lang="fr-FR" sz="1200" b="0" kern="1200" dirty="0" err="1" smtClean="0">
-                <a:solidFill>
-                  <a:schemeClr val="tx1"/>
-                </a:solidFill>
-                <a:effectLst/>
-                <a:latin typeface="+mn-lt"/>
-                <a:ea typeface="+mn-ea"/>
-                <a:cs typeface="+mn-cs"/>
-              </a:rPr>
-              <a:t>this.isProxyError</a:t>
-            </a:r>
-            <a:r>
-              <a:rPr lang="fr-FR" sz="1200" b="0" kern="1200" dirty="0" smtClean="0">
-                <a:solidFill>
-                  <a:schemeClr val="tx1"/>
-                </a:solidFill>
-                <a:effectLst/>
-                <a:latin typeface="+mn-lt"/>
-                <a:ea typeface="+mn-ea"/>
-                <a:cs typeface="+mn-cs"/>
-              </a:rPr>
-              <a:t>(</a:t>
-            </a:r>
-            <a:r>
-              <a:rPr lang="fr-FR" sz="1200" b="0" kern="1200" dirty="0" err="1" smtClean="0">
-                <a:solidFill>
-                  <a:schemeClr val="tx1"/>
-                </a:solidFill>
-                <a:effectLst/>
-                <a:latin typeface="+mn-lt"/>
-                <a:ea typeface="+mn-ea"/>
-                <a:cs typeface="+mn-cs"/>
-              </a:rPr>
-              <a:t>error</a:t>
-            </a:r>
-            <a:r>
-              <a:rPr lang="fr-FR" sz="1200" b="0" kern="1200" dirty="0" smtClean="0">
-                <a:solidFill>
-                  <a:schemeClr val="tx1"/>
-                </a:solidFill>
-                <a:effectLst/>
-                <a:latin typeface="+mn-lt"/>
-                <a:ea typeface="+mn-ea"/>
-                <a:cs typeface="+mn-cs"/>
-              </a:rPr>
-              <a:t>)) {</a:t>
-            </a:r>
-          </a:p>
-          <a:p>
-            <a:r>
-              <a:rPr lang="fr-FR" sz="1200" b="0" kern="1200" dirty="0" smtClean="0">
-                <a:solidFill>
-                  <a:schemeClr val="tx1"/>
-                </a:solidFill>
-                <a:effectLst/>
-                <a:latin typeface="+mn-lt"/>
-                <a:ea typeface="+mn-ea"/>
-                <a:cs typeface="+mn-cs"/>
-              </a:rPr>
-              <a:t>return </a:t>
-            </a:r>
-            <a:r>
-              <a:rPr lang="fr-FR" sz="1200" b="0" kern="1200" dirty="0" err="1" smtClean="0">
-                <a:solidFill>
-                  <a:schemeClr val="tx1"/>
-                </a:solidFill>
-                <a:effectLst/>
-                <a:latin typeface="+mn-lt"/>
-                <a:ea typeface="+mn-ea"/>
-                <a:cs typeface="+mn-cs"/>
-              </a:rPr>
-              <a:t>Observable.of</a:t>
-            </a:r>
-            <a:r>
-              <a:rPr lang="fr-FR" sz="1200" b="0" kern="1200" dirty="0" smtClean="0">
-                <a:solidFill>
-                  <a:schemeClr val="tx1"/>
-                </a:solidFill>
-                <a:effectLst/>
-                <a:latin typeface="+mn-lt"/>
-                <a:ea typeface="+mn-ea"/>
-                <a:cs typeface="+mn-cs"/>
-              </a:rPr>
-              <a:t>(</a:t>
-            </a:r>
-            <a:r>
-              <a:rPr lang="fr-FR" sz="1200" b="0" kern="1200" dirty="0" err="1" smtClean="0">
-                <a:solidFill>
-                  <a:schemeClr val="tx1"/>
-                </a:solidFill>
-                <a:effectLst/>
-                <a:latin typeface="+mn-lt"/>
-                <a:ea typeface="+mn-ea"/>
-                <a:cs typeface="+mn-cs"/>
-              </a:rPr>
-              <a:t>this.inFlightResponse</a:t>
-            </a:r>
-            <a:r>
-              <a:rPr lang="fr-FR" sz="1200" b="0" kern="1200" dirty="0" smtClean="0">
-                <a:solidFill>
-                  <a:schemeClr val="tx1"/>
-                </a:solidFill>
-                <a:effectLst/>
-                <a:latin typeface="+mn-lt"/>
-                <a:ea typeface="+mn-ea"/>
-                <a:cs typeface="+mn-cs"/>
-              </a:rPr>
-              <a:t>(req.url, </a:t>
-            </a:r>
-            <a:r>
-              <a:rPr lang="fr-FR" sz="1200" b="0" kern="1200" dirty="0" err="1" smtClean="0">
-                <a:solidFill>
-                  <a:schemeClr val="tx1"/>
-                </a:solidFill>
-                <a:effectLst/>
-                <a:latin typeface="+mn-lt"/>
-                <a:ea typeface="+mn-ea"/>
-                <a:cs typeface="+mn-cs"/>
-              </a:rPr>
-              <a:t>error.error</a:t>
-            </a:r>
-            <a:r>
-              <a:rPr lang="fr-FR" sz="1200" b="0" kern="1200" dirty="0" smtClean="0">
-                <a:solidFill>
-                  <a:schemeClr val="tx1"/>
-                </a:solidFill>
-                <a:effectLst/>
-                <a:latin typeface="+mn-lt"/>
-                <a:ea typeface="+mn-ea"/>
-                <a:cs typeface="+mn-cs"/>
-              </a:rPr>
-              <a:t>));</a:t>
-            </a:r>
-          </a:p>
-          <a:p>
-            <a:r>
-              <a:rPr lang="fr-FR" sz="1200" b="0" kern="1200" dirty="0" smtClean="0">
-                <a:solidFill>
-                  <a:schemeClr val="tx1"/>
-                </a:solidFill>
-                <a:effectLst/>
-                <a:latin typeface="+mn-lt"/>
-                <a:ea typeface="+mn-ea"/>
-                <a:cs typeface="+mn-cs"/>
-              </a:rPr>
-              <a:t>} </a:t>
-            </a:r>
-            <a:r>
-              <a:rPr lang="fr-FR" sz="1200" b="0" kern="1200" dirty="0" err="1" smtClean="0">
-                <a:solidFill>
-                  <a:schemeClr val="tx1"/>
-                </a:solidFill>
-                <a:effectLst/>
-                <a:latin typeface="+mn-lt"/>
-                <a:ea typeface="+mn-ea"/>
-                <a:cs typeface="+mn-cs"/>
-              </a:rPr>
-              <a:t>else</a:t>
-            </a:r>
-            <a:r>
-              <a:rPr lang="fr-FR" sz="1200" b="0" kern="1200" dirty="0" smtClean="0">
-                <a:solidFill>
-                  <a:schemeClr val="tx1"/>
-                </a:solidFill>
-                <a:effectLst/>
-                <a:latin typeface="+mn-lt"/>
-                <a:ea typeface="+mn-ea"/>
-                <a:cs typeface="+mn-cs"/>
-              </a:rPr>
-              <a:t> {</a:t>
-            </a:r>
-          </a:p>
-          <a:p>
-            <a:r>
-              <a:rPr lang="fr-FR" sz="1200" b="0" kern="1200" dirty="0" smtClean="0">
-                <a:solidFill>
-                  <a:schemeClr val="tx1"/>
-                </a:solidFill>
-                <a:effectLst/>
-                <a:latin typeface="+mn-lt"/>
-                <a:ea typeface="+mn-ea"/>
-                <a:cs typeface="+mn-cs"/>
-              </a:rPr>
-              <a:t>return </a:t>
-            </a:r>
-            <a:r>
-              <a:rPr lang="fr-FR" sz="1200" b="0" kern="1200" dirty="0" err="1" smtClean="0">
-                <a:solidFill>
-                  <a:schemeClr val="tx1"/>
-                </a:solidFill>
-                <a:effectLst/>
-                <a:latin typeface="+mn-lt"/>
-                <a:ea typeface="+mn-ea"/>
-                <a:cs typeface="+mn-cs"/>
-              </a:rPr>
-              <a:t>this.responseFromCacheOrPresentModal</a:t>
-            </a:r>
-            <a:r>
-              <a:rPr lang="fr-FR" sz="1200" b="0" kern="1200" dirty="0" smtClean="0">
-                <a:solidFill>
-                  <a:schemeClr val="tx1"/>
-                </a:solidFill>
-                <a:effectLst/>
-                <a:latin typeface="+mn-lt"/>
-                <a:ea typeface="+mn-ea"/>
-                <a:cs typeface="+mn-cs"/>
-              </a:rPr>
-              <a:t>(req.url, </a:t>
-            </a:r>
-            <a:r>
-              <a:rPr lang="fr-FR" sz="1200" b="0" kern="1200" dirty="0" err="1" smtClean="0">
-                <a:solidFill>
-                  <a:schemeClr val="tx1"/>
-                </a:solidFill>
-                <a:effectLst/>
-                <a:latin typeface="+mn-lt"/>
-                <a:ea typeface="+mn-ea"/>
-                <a:cs typeface="+mn-cs"/>
-              </a:rPr>
-              <a:t>error</a:t>
-            </a:r>
-            <a:r>
-              <a:rPr lang="fr-FR" sz="1200" b="0" kern="1200" dirty="0" smtClean="0">
-                <a:solidFill>
-                  <a:schemeClr val="tx1"/>
-                </a:solidFill>
-                <a:effectLst/>
-                <a:latin typeface="+mn-lt"/>
-                <a:ea typeface="+mn-ea"/>
-                <a:cs typeface="+mn-cs"/>
-              </a:rPr>
-              <a:t>, </a:t>
-            </a:r>
-            <a:r>
-              <a:rPr lang="fr-FR" sz="1200" b="0" kern="1200" dirty="0" err="1" smtClean="0">
-                <a:solidFill>
-                  <a:schemeClr val="tx1"/>
-                </a:solidFill>
-                <a:effectLst/>
-                <a:latin typeface="+mn-lt"/>
-                <a:ea typeface="+mn-ea"/>
-                <a:cs typeface="+mn-cs"/>
-              </a:rPr>
-              <a:t>noErrorModal</a:t>
-            </a:r>
-            <a:r>
-              <a:rPr lang="fr-FR" sz="1200" b="0" kern="1200" dirty="0" smtClean="0">
-                <a:solidFill>
-                  <a:schemeClr val="tx1"/>
-                </a:solidFill>
-                <a:effectLst/>
-                <a:latin typeface="+mn-lt"/>
-                <a:ea typeface="+mn-ea"/>
-                <a:cs typeface="+mn-cs"/>
-              </a:rPr>
-              <a:t>);</a:t>
-            </a:r>
-          </a:p>
-          <a:p>
-            <a:r>
-              <a:rPr lang="fr-FR" sz="1200" b="0" kern="1200" dirty="0" smtClean="0">
-                <a:solidFill>
-                  <a:schemeClr val="tx1"/>
-                </a:solidFill>
-                <a:effectLst/>
-                <a:latin typeface="+mn-lt"/>
-                <a:ea typeface="+mn-ea"/>
-                <a:cs typeface="+mn-cs"/>
-              </a:rPr>
-              <a:t>}</a:t>
-            </a:r>
-          </a:p>
-          <a:p>
-            <a:r>
-              <a:rPr lang="fr-FR" sz="1200" b="0" kern="1200" dirty="0" smtClean="0">
-                <a:solidFill>
-                  <a:schemeClr val="tx1"/>
-                </a:solidFill>
-                <a:effectLst/>
-                <a:latin typeface="+mn-lt"/>
-                <a:ea typeface="+mn-ea"/>
-                <a:cs typeface="+mn-cs"/>
-              </a:rPr>
-              <a:t>})</a:t>
-            </a:r>
-          </a:p>
-          <a:p>
-            <a:r>
-              <a:rPr lang="fr-FR" sz="1200" b="0" kern="1200" dirty="0" smtClean="0">
-                <a:solidFill>
-                  <a:schemeClr val="tx1"/>
-                </a:solidFill>
-                <a:effectLst/>
-                <a:latin typeface="+mn-lt"/>
-                <a:ea typeface="+mn-ea"/>
-                <a:cs typeface="+mn-cs"/>
-              </a:rPr>
-              <a:t>.do(() =&gt; </a:t>
-            </a:r>
-            <a:r>
-              <a:rPr lang="fr-FR" sz="1200" b="0" kern="1200" dirty="0" err="1" smtClean="0">
-                <a:solidFill>
-                  <a:schemeClr val="tx1"/>
-                </a:solidFill>
-                <a:effectLst/>
-                <a:latin typeface="+mn-lt"/>
-                <a:ea typeface="+mn-ea"/>
-                <a:cs typeface="+mn-cs"/>
-              </a:rPr>
-              <a:t>this.loading.pendingRequests</a:t>
-            </a:r>
-            <a:r>
-              <a:rPr lang="fr-FR" sz="1200" b="0" kern="1200" dirty="0" smtClean="0">
-                <a:solidFill>
-                  <a:schemeClr val="tx1"/>
-                </a:solidFill>
-                <a:effectLst/>
-                <a:latin typeface="+mn-lt"/>
-                <a:ea typeface="+mn-ea"/>
-                <a:cs typeface="+mn-cs"/>
-              </a:rPr>
-              <a:t>--);</a:t>
-            </a:r>
-          </a:p>
-          <a:p>
-            <a:r>
-              <a:rPr lang="fr-FR" sz="1200" b="0" kern="1200" dirty="0" smtClean="0">
-                <a:solidFill>
-                  <a:schemeClr val="tx1"/>
-                </a:solidFill>
-                <a:effectLst/>
-                <a:latin typeface="+mn-lt"/>
-                <a:ea typeface="+mn-ea"/>
-                <a:cs typeface="+mn-cs"/>
-              </a:rPr>
-              <a:t>}</a:t>
-            </a:r>
-          </a:p>
-          <a:p>
+          </a:p>
+          <a:p>
+            <a:r>
+              <a:rPr lang="fr-FR" dirty="0" err="1" smtClean="0"/>
+              <a:t>ng</a:t>
+            </a:r>
+            <a:r>
+              <a:rPr lang="fr-FR" dirty="0" smtClean="0"/>
+              <a:t> g pipe </a:t>
+            </a:r>
+            <a:r>
+              <a:rPr lang="fr-FR" dirty="0" err="1" smtClean="0"/>
+              <a:t>core</a:t>
+            </a:r>
+            <a:r>
+              <a:rPr lang="fr-FR" dirty="0" smtClean="0"/>
+              <a:t>/pipe/</a:t>
+            </a:r>
+            <a:r>
+              <a:rPr lang="fr-FR" dirty="0" err="1" smtClean="0"/>
+              <a:t>orderBy</a:t>
+            </a:r>
             <a:endParaRPr lang="fr-FR" dirty="0"/>
           </a:p>
         </p:txBody>
@@ -2306,6 +1108,1427 @@
           <a:p>
             <a:fld id="{FD0CA3AA-443A-466C-BF59-FB6574BB11C3}" type="slidenum">
               <a:rPr lang="fr-FR" smtClean="0"/>
+              <a:t>17</a:t>
+            </a:fld>
+            <a:endParaRPr lang="fr-FR"/>
+          </a:p>
+        </p:txBody>
+      </p:sp>
+    </p:spTree>
+    <p:extLst>
+      <p:ext uri="{BB962C8B-B14F-4D97-AF65-F5344CB8AC3E}">
+        <p14:creationId xmlns:p14="http://schemas.microsoft.com/office/powerpoint/2010/main" val="2840317410"/>
+      </p:ext>
+    </p:extLst>
+  </p:cSld>
+  <p:clrMapOvr>
+    <a:masterClrMapping/>
+  </p:clrMapOvr>
+</p:notes>
+</file>
+
+<file path=ppt/notesSlides/notesSlide15.xml><?xml version="1.0" encoding="utf-8"?>
+<p:notes xmlns:a="http://schemas.openxmlformats.org/drawingml/2006/main" xmlns:r="http://schemas.openxmlformats.org/officeDocument/2006/relationships" xmlns:p="http://schemas.openxmlformats.org/presentationml/2006/main">
+  <p:cSld>
+    <p:spTree>
+      <p:nvGrpSpPr>
+        <p:cNvPr id="1" name=""/>
+        <p:cNvGrpSpPr/>
+        <p:nvPr/>
+      </p:nvGrpSpPr>
+      <p:grpSpPr>
+        <a:xfrm>
+          <a:off x="0" y="0"/>
+          <a:ext cx="0" cy="0"/>
+          <a:chOff x="0" y="0"/>
+          <a:chExt cx="0" cy="0"/>
+        </a:xfrm>
+      </p:grpSpPr>
+      <p:sp>
+        <p:nvSpPr>
+          <p:cNvPr id="2" name="Espace réservé de l'image des diapositives 1"/>
+          <p:cNvSpPr>
+            <a:spLocks noGrp="1" noRot="1" noChangeAspect="1"/>
+          </p:cNvSpPr>
+          <p:nvPr>
+            <p:ph type="sldImg"/>
+          </p:nvPr>
+        </p:nvSpPr>
+        <p:spPr/>
+      </p:sp>
+      <p:sp>
+        <p:nvSpPr>
+          <p:cNvPr id="3" name="Espace réservé des commentaires 2"/>
+          <p:cNvSpPr>
+            <a:spLocks noGrp="1"/>
+          </p:cNvSpPr>
+          <p:nvPr>
+            <p:ph type="body" idx="1"/>
+          </p:nvPr>
+        </p:nvSpPr>
+        <p:spPr/>
+        <p:txBody>
+          <a:bodyPr/>
+          <a:lstStyle/>
+          <a:p>
+            <a:r>
+              <a:rPr lang="en-US" dirty="0" err="1" smtClean="0"/>
+              <a:t>npm</a:t>
+            </a:r>
+            <a:r>
+              <a:rPr lang="en-US" dirty="0" smtClean="0"/>
+              <a:t> run ng g c core/about</a:t>
+            </a:r>
+            <a:endParaRPr lang="fr-FR" dirty="0"/>
+          </a:p>
+        </p:txBody>
+      </p:sp>
+      <p:sp>
+        <p:nvSpPr>
+          <p:cNvPr id="4" name="Espace réservé du numéro de diapositive 3"/>
+          <p:cNvSpPr>
+            <a:spLocks noGrp="1"/>
+          </p:cNvSpPr>
+          <p:nvPr>
+            <p:ph type="sldNum" sz="quarter" idx="10"/>
+          </p:nvPr>
+        </p:nvSpPr>
+        <p:spPr/>
+        <p:txBody>
+          <a:bodyPr/>
+          <a:lstStyle/>
+          <a:p>
+            <a:fld id="{FD0CA3AA-443A-466C-BF59-FB6574BB11C3}" type="slidenum">
+              <a:rPr lang="fr-FR" smtClean="0"/>
+              <a:t>20</a:t>
+            </a:fld>
+            <a:endParaRPr lang="fr-FR"/>
+          </a:p>
+        </p:txBody>
+      </p:sp>
+    </p:spTree>
+    <p:extLst>
+      <p:ext uri="{BB962C8B-B14F-4D97-AF65-F5344CB8AC3E}">
+        <p14:creationId xmlns:p14="http://schemas.microsoft.com/office/powerpoint/2010/main" val="101353858"/>
+      </p:ext>
+    </p:extLst>
+  </p:cSld>
+  <p:clrMapOvr>
+    <a:masterClrMapping/>
+  </p:clrMapOvr>
+</p:notes>
+</file>
+
+<file path=ppt/notesSlides/notesSlide16.xml><?xml version="1.0" encoding="utf-8"?>
+<p:notes xmlns:a="http://schemas.openxmlformats.org/drawingml/2006/main" xmlns:r="http://schemas.openxmlformats.org/officeDocument/2006/relationships" xmlns:p="http://schemas.openxmlformats.org/presentationml/2006/main">
+  <p:cSld>
+    <p:spTree>
+      <p:nvGrpSpPr>
+        <p:cNvPr id="1" name=""/>
+        <p:cNvGrpSpPr/>
+        <p:nvPr/>
+      </p:nvGrpSpPr>
+      <p:grpSpPr>
+        <a:xfrm>
+          <a:off x="0" y="0"/>
+          <a:ext cx="0" cy="0"/>
+          <a:chOff x="0" y="0"/>
+          <a:chExt cx="0" cy="0"/>
+        </a:xfrm>
+      </p:grpSpPr>
+      <p:sp>
+        <p:nvSpPr>
+          <p:cNvPr id="2" name="Espace réservé de l'image des diapositives 1"/>
+          <p:cNvSpPr>
+            <a:spLocks noGrp="1" noRot="1" noChangeAspect="1"/>
+          </p:cNvSpPr>
+          <p:nvPr>
+            <p:ph type="sldImg"/>
+          </p:nvPr>
+        </p:nvSpPr>
+        <p:spPr/>
+      </p:sp>
+      <p:sp>
+        <p:nvSpPr>
+          <p:cNvPr id="3" name="Espace réservé des commentaires 2"/>
+          <p:cNvSpPr>
+            <a:spLocks noGrp="1"/>
+          </p:cNvSpPr>
+          <p:nvPr>
+            <p:ph type="body" idx="1"/>
+          </p:nvPr>
+        </p:nvSpPr>
+        <p:spPr/>
+        <p:txBody>
+          <a:bodyPr/>
+          <a:lstStyle/>
+          <a:p>
+            <a:r>
+              <a:rPr lang="fr-FR" sz="1200" b="0" kern="1200" dirty="0" err="1" smtClean="0">
+                <a:solidFill>
+                  <a:schemeClr val="tx1"/>
+                </a:solidFill>
+                <a:effectLst/>
+                <a:latin typeface="+mn-lt"/>
+                <a:ea typeface="+mn-ea"/>
+                <a:cs typeface="+mn-cs"/>
+              </a:rPr>
+              <a:t>intercept</a:t>
+            </a:r>
+            <a:r>
+              <a:rPr lang="fr-FR" sz="1200" b="0" kern="1200" dirty="0" smtClean="0">
+                <a:solidFill>
+                  <a:schemeClr val="tx1"/>
+                </a:solidFill>
+                <a:effectLst/>
+                <a:latin typeface="+mn-lt"/>
+                <a:ea typeface="+mn-ea"/>
+                <a:cs typeface="+mn-cs"/>
+              </a:rPr>
+              <a:t>(</a:t>
+            </a:r>
+            <a:r>
+              <a:rPr lang="fr-FR" sz="1200" b="0" kern="1200" dirty="0" err="1" smtClean="0">
+                <a:solidFill>
+                  <a:schemeClr val="tx1"/>
+                </a:solidFill>
+                <a:effectLst/>
+                <a:latin typeface="+mn-lt"/>
+                <a:ea typeface="+mn-ea"/>
+                <a:cs typeface="+mn-cs"/>
+              </a:rPr>
+              <a:t>req</a:t>
+            </a:r>
+            <a:r>
+              <a:rPr lang="fr-FR" sz="1200" b="0" kern="1200" dirty="0" smtClean="0">
+                <a:solidFill>
+                  <a:schemeClr val="tx1"/>
+                </a:solidFill>
+                <a:effectLst/>
+                <a:latin typeface="+mn-lt"/>
+                <a:ea typeface="+mn-ea"/>
+                <a:cs typeface="+mn-cs"/>
+              </a:rPr>
+              <a:t>: </a:t>
+            </a:r>
+            <a:r>
+              <a:rPr lang="fr-FR" sz="1200" b="0" kern="1200" dirty="0" err="1" smtClean="0">
+                <a:solidFill>
+                  <a:schemeClr val="tx1"/>
+                </a:solidFill>
+                <a:effectLst/>
+                <a:latin typeface="+mn-lt"/>
+                <a:ea typeface="+mn-ea"/>
+                <a:cs typeface="+mn-cs"/>
+              </a:rPr>
+              <a:t>HttpRequest</a:t>
+            </a:r>
+            <a:r>
+              <a:rPr lang="fr-FR" sz="1200" b="0" kern="1200" dirty="0" smtClean="0">
+                <a:solidFill>
+                  <a:schemeClr val="tx1"/>
+                </a:solidFill>
+                <a:effectLst/>
+                <a:latin typeface="+mn-lt"/>
+                <a:ea typeface="+mn-ea"/>
+                <a:cs typeface="+mn-cs"/>
+              </a:rPr>
+              <a:t>&lt;</a:t>
+            </a:r>
+            <a:r>
+              <a:rPr lang="fr-FR" sz="1200" b="0" kern="1200" dirty="0" err="1" smtClean="0">
+                <a:solidFill>
+                  <a:schemeClr val="tx1"/>
+                </a:solidFill>
+                <a:effectLst/>
+                <a:latin typeface="+mn-lt"/>
+                <a:ea typeface="+mn-ea"/>
+                <a:cs typeface="+mn-cs"/>
+              </a:rPr>
+              <a:t>any</a:t>
+            </a:r>
+            <a:r>
+              <a:rPr lang="fr-FR" sz="1200" b="0" kern="1200" dirty="0" smtClean="0">
+                <a:solidFill>
+                  <a:schemeClr val="tx1"/>
+                </a:solidFill>
+                <a:effectLst/>
+                <a:latin typeface="+mn-lt"/>
+                <a:ea typeface="+mn-ea"/>
+                <a:cs typeface="+mn-cs"/>
+              </a:rPr>
+              <a:t>&gt;, </a:t>
+            </a:r>
+            <a:r>
+              <a:rPr lang="fr-FR" sz="1200" b="0" kern="1200" dirty="0" err="1" smtClean="0">
+                <a:solidFill>
+                  <a:schemeClr val="tx1"/>
+                </a:solidFill>
+                <a:effectLst/>
+                <a:latin typeface="+mn-lt"/>
+                <a:ea typeface="+mn-ea"/>
+                <a:cs typeface="+mn-cs"/>
+              </a:rPr>
+              <a:t>next</a:t>
+            </a:r>
+            <a:r>
+              <a:rPr lang="fr-FR" sz="1200" b="0" kern="1200" dirty="0" smtClean="0">
+                <a:solidFill>
+                  <a:schemeClr val="tx1"/>
+                </a:solidFill>
+                <a:effectLst/>
+                <a:latin typeface="+mn-lt"/>
+                <a:ea typeface="+mn-ea"/>
+                <a:cs typeface="+mn-cs"/>
+              </a:rPr>
+              <a:t>: </a:t>
+            </a:r>
+            <a:r>
+              <a:rPr lang="fr-FR" sz="1200" b="0" kern="1200" dirty="0" err="1" smtClean="0">
+                <a:solidFill>
+                  <a:schemeClr val="tx1"/>
+                </a:solidFill>
+                <a:effectLst/>
+                <a:latin typeface="+mn-lt"/>
+                <a:ea typeface="+mn-ea"/>
+                <a:cs typeface="+mn-cs"/>
+              </a:rPr>
+              <a:t>HttpHandler</a:t>
+            </a:r>
+            <a:r>
+              <a:rPr lang="fr-FR" sz="1200" b="0" kern="1200" dirty="0" smtClean="0">
+                <a:solidFill>
+                  <a:schemeClr val="tx1"/>
+                </a:solidFill>
+                <a:effectLst/>
+                <a:latin typeface="+mn-lt"/>
+                <a:ea typeface="+mn-ea"/>
+                <a:cs typeface="+mn-cs"/>
+              </a:rPr>
+              <a:t>): Observable&lt;</a:t>
+            </a:r>
+            <a:r>
+              <a:rPr lang="fr-FR" sz="1200" b="0" kern="1200" dirty="0" err="1" smtClean="0">
+                <a:solidFill>
+                  <a:schemeClr val="tx1"/>
+                </a:solidFill>
+                <a:effectLst/>
+                <a:latin typeface="+mn-lt"/>
+                <a:ea typeface="+mn-ea"/>
+                <a:cs typeface="+mn-cs"/>
+              </a:rPr>
+              <a:t>HttpEvent</a:t>
+            </a:r>
+            <a:r>
+              <a:rPr lang="fr-FR" sz="1200" b="0" kern="1200" dirty="0" smtClean="0">
+                <a:solidFill>
+                  <a:schemeClr val="tx1"/>
+                </a:solidFill>
+                <a:effectLst/>
+                <a:latin typeface="+mn-lt"/>
+                <a:ea typeface="+mn-ea"/>
+                <a:cs typeface="+mn-cs"/>
+              </a:rPr>
+              <a:t>&lt;</a:t>
+            </a:r>
+            <a:r>
+              <a:rPr lang="fr-FR" sz="1200" b="0" kern="1200" dirty="0" err="1" smtClean="0">
+                <a:solidFill>
+                  <a:schemeClr val="tx1"/>
+                </a:solidFill>
+                <a:effectLst/>
+                <a:latin typeface="+mn-lt"/>
+                <a:ea typeface="+mn-ea"/>
+                <a:cs typeface="+mn-cs"/>
+              </a:rPr>
+              <a:t>any</a:t>
+            </a:r>
+            <a:r>
+              <a:rPr lang="fr-FR" sz="1200" b="0" kern="1200" dirty="0" smtClean="0">
+                <a:solidFill>
+                  <a:schemeClr val="tx1"/>
+                </a:solidFill>
+                <a:effectLst/>
+                <a:latin typeface="+mn-lt"/>
+                <a:ea typeface="+mn-ea"/>
+                <a:cs typeface="+mn-cs"/>
+              </a:rPr>
+              <a:t>&gt;&gt; {</a:t>
+            </a:r>
+          </a:p>
+          <a:p>
+            <a:r>
+              <a:rPr lang="fr-FR" sz="1200" b="0" kern="1200" dirty="0" err="1" smtClean="0">
+                <a:solidFill>
+                  <a:schemeClr val="tx1"/>
+                </a:solidFill>
+                <a:effectLst/>
+                <a:latin typeface="+mn-lt"/>
+                <a:ea typeface="+mn-ea"/>
+                <a:cs typeface="+mn-cs"/>
+              </a:rPr>
+              <a:t>const</a:t>
+            </a:r>
+            <a:r>
+              <a:rPr lang="fr-FR" sz="1200" b="0" kern="1200" dirty="0" smtClean="0">
+                <a:solidFill>
+                  <a:schemeClr val="tx1"/>
+                </a:solidFill>
+                <a:effectLst/>
+                <a:latin typeface="+mn-lt"/>
+                <a:ea typeface="+mn-ea"/>
+                <a:cs typeface="+mn-cs"/>
+              </a:rPr>
+              <a:t> </a:t>
+            </a:r>
+            <a:r>
+              <a:rPr lang="fr-FR" sz="1200" b="0" kern="1200" dirty="0" err="1" smtClean="0">
+                <a:solidFill>
+                  <a:schemeClr val="tx1"/>
+                </a:solidFill>
+                <a:effectLst/>
+                <a:latin typeface="+mn-lt"/>
+                <a:ea typeface="+mn-ea"/>
+                <a:cs typeface="+mn-cs"/>
+              </a:rPr>
+              <a:t>noCache</a:t>
+            </a:r>
+            <a:r>
+              <a:rPr lang="fr-FR" sz="1200" b="0" kern="1200" dirty="0" smtClean="0">
+                <a:solidFill>
+                  <a:schemeClr val="tx1"/>
+                </a:solidFill>
+                <a:effectLst/>
+                <a:latin typeface="+mn-lt"/>
+                <a:ea typeface="+mn-ea"/>
+                <a:cs typeface="+mn-cs"/>
+              </a:rPr>
+              <a:t> = </a:t>
+            </a:r>
+            <a:r>
+              <a:rPr lang="fr-FR" sz="1200" b="0" kern="1200" dirty="0" err="1" smtClean="0">
+                <a:solidFill>
+                  <a:schemeClr val="tx1"/>
+                </a:solidFill>
+                <a:effectLst/>
+                <a:latin typeface="+mn-lt"/>
+                <a:ea typeface="+mn-ea"/>
+                <a:cs typeface="+mn-cs"/>
+              </a:rPr>
+              <a:t>req.params.get</a:t>
+            </a:r>
+            <a:r>
+              <a:rPr lang="fr-FR" sz="1200" b="0" kern="1200" dirty="0" smtClean="0">
+                <a:solidFill>
+                  <a:schemeClr val="tx1"/>
+                </a:solidFill>
+                <a:effectLst/>
+                <a:latin typeface="+mn-lt"/>
+                <a:ea typeface="+mn-ea"/>
+                <a:cs typeface="+mn-cs"/>
+              </a:rPr>
+              <a:t>('</a:t>
+            </a:r>
+            <a:r>
+              <a:rPr lang="fr-FR" sz="1200" b="0" kern="1200" dirty="0" err="1" smtClean="0">
+                <a:solidFill>
+                  <a:schemeClr val="tx1"/>
+                </a:solidFill>
+                <a:effectLst/>
+                <a:latin typeface="+mn-lt"/>
+                <a:ea typeface="+mn-ea"/>
+                <a:cs typeface="+mn-cs"/>
+              </a:rPr>
+              <a:t>noCache</a:t>
+            </a:r>
+            <a:r>
+              <a:rPr lang="fr-FR" sz="1200" b="0" kern="1200" dirty="0" smtClean="0">
+                <a:solidFill>
+                  <a:schemeClr val="tx1"/>
+                </a:solidFill>
+                <a:effectLst/>
+                <a:latin typeface="+mn-lt"/>
+                <a:ea typeface="+mn-ea"/>
+                <a:cs typeface="+mn-cs"/>
+              </a:rPr>
+              <a:t>') === '</a:t>
+            </a:r>
+            <a:r>
+              <a:rPr lang="fr-FR" sz="1200" b="0" kern="1200" dirty="0" err="1" smtClean="0">
+                <a:solidFill>
+                  <a:schemeClr val="tx1"/>
+                </a:solidFill>
+                <a:effectLst/>
+                <a:latin typeface="+mn-lt"/>
+                <a:ea typeface="+mn-ea"/>
+                <a:cs typeface="+mn-cs"/>
+              </a:rPr>
+              <a:t>true</a:t>
+            </a:r>
+            <a:r>
+              <a:rPr lang="fr-FR" sz="1200" b="0" kern="1200" dirty="0" smtClean="0">
+                <a:solidFill>
+                  <a:schemeClr val="tx1"/>
+                </a:solidFill>
+                <a:effectLst/>
+                <a:latin typeface="+mn-lt"/>
+                <a:ea typeface="+mn-ea"/>
+                <a:cs typeface="+mn-cs"/>
+              </a:rPr>
+              <a:t>';</a:t>
+            </a:r>
+          </a:p>
+          <a:p>
+            <a:r>
+              <a:rPr lang="fr-FR" sz="1200" b="0" kern="1200" dirty="0" err="1" smtClean="0">
+                <a:solidFill>
+                  <a:schemeClr val="tx1"/>
+                </a:solidFill>
+                <a:effectLst/>
+                <a:latin typeface="+mn-lt"/>
+                <a:ea typeface="+mn-ea"/>
+                <a:cs typeface="+mn-cs"/>
+              </a:rPr>
+              <a:t>const</a:t>
+            </a:r>
+            <a:r>
+              <a:rPr lang="fr-FR" sz="1200" b="0" kern="1200" dirty="0" smtClean="0">
+                <a:solidFill>
+                  <a:schemeClr val="tx1"/>
+                </a:solidFill>
+                <a:effectLst/>
+                <a:latin typeface="+mn-lt"/>
+                <a:ea typeface="+mn-ea"/>
+                <a:cs typeface="+mn-cs"/>
+              </a:rPr>
+              <a:t> </a:t>
+            </a:r>
+            <a:r>
+              <a:rPr lang="fr-FR" sz="1200" b="0" kern="1200" dirty="0" err="1" smtClean="0">
+                <a:solidFill>
+                  <a:schemeClr val="tx1"/>
+                </a:solidFill>
+                <a:effectLst/>
+                <a:latin typeface="+mn-lt"/>
+                <a:ea typeface="+mn-ea"/>
+                <a:cs typeface="+mn-cs"/>
+              </a:rPr>
+              <a:t>noErrorModal</a:t>
+            </a:r>
+            <a:r>
+              <a:rPr lang="fr-FR" sz="1200" b="0" kern="1200" dirty="0" smtClean="0">
+                <a:solidFill>
+                  <a:schemeClr val="tx1"/>
+                </a:solidFill>
+                <a:effectLst/>
+                <a:latin typeface="+mn-lt"/>
+                <a:ea typeface="+mn-ea"/>
+                <a:cs typeface="+mn-cs"/>
+              </a:rPr>
+              <a:t> = </a:t>
+            </a:r>
+            <a:r>
+              <a:rPr lang="fr-FR" sz="1200" b="0" kern="1200" dirty="0" err="1" smtClean="0">
+                <a:solidFill>
+                  <a:schemeClr val="tx1"/>
+                </a:solidFill>
+                <a:effectLst/>
+                <a:latin typeface="+mn-lt"/>
+                <a:ea typeface="+mn-ea"/>
+                <a:cs typeface="+mn-cs"/>
+              </a:rPr>
+              <a:t>req.params.get</a:t>
+            </a:r>
+            <a:r>
+              <a:rPr lang="fr-FR" sz="1200" b="0" kern="1200" dirty="0" smtClean="0">
+                <a:solidFill>
+                  <a:schemeClr val="tx1"/>
+                </a:solidFill>
+                <a:effectLst/>
+                <a:latin typeface="+mn-lt"/>
+                <a:ea typeface="+mn-ea"/>
+                <a:cs typeface="+mn-cs"/>
+              </a:rPr>
+              <a:t>('</a:t>
+            </a:r>
+            <a:r>
+              <a:rPr lang="fr-FR" sz="1200" b="0" kern="1200" dirty="0" err="1" smtClean="0">
+                <a:solidFill>
+                  <a:schemeClr val="tx1"/>
+                </a:solidFill>
+                <a:effectLst/>
+                <a:latin typeface="+mn-lt"/>
+                <a:ea typeface="+mn-ea"/>
+                <a:cs typeface="+mn-cs"/>
+              </a:rPr>
+              <a:t>noErrorModal</a:t>
+            </a:r>
+            <a:r>
+              <a:rPr lang="fr-FR" sz="1200" b="0" kern="1200" dirty="0" smtClean="0">
+                <a:solidFill>
+                  <a:schemeClr val="tx1"/>
+                </a:solidFill>
+                <a:effectLst/>
+                <a:latin typeface="+mn-lt"/>
+                <a:ea typeface="+mn-ea"/>
+                <a:cs typeface="+mn-cs"/>
+              </a:rPr>
+              <a:t>') === '</a:t>
+            </a:r>
+            <a:r>
+              <a:rPr lang="fr-FR" sz="1200" b="0" kern="1200" dirty="0" err="1" smtClean="0">
+                <a:solidFill>
+                  <a:schemeClr val="tx1"/>
+                </a:solidFill>
+                <a:effectLst/>
+                <a:latin typeface="+mn-lt"/>
+                <a:ea typeface="+mn-ea"/>
+                <a:cs typeface="+mn-cs"/>
+              </a:rPr>
+              <a:t>true</a:t>
+            </a:r>
+            <a:r>
+              <a:rPr lang="fr-FR" sz="1200" b="0" kern="1200" dirty="0" smtClean="0">
+                <a:solidFill>
+                  <a:schemeClr val="tx1"/>
+                </a:solidFill>
+                <a:effectLst/>
+                <a:latin typeface="+mn-lt"/>
+                <a:ea typeface="+mn-ea"/>
+                <a:cs typeface="+mn-cs"/>
+              </a:rPr>
+              <a:t>';</a:t>
+            </a:r>
+          </a:p>
+          <a:p>
+            <a:r>
+              <a:rPr lang="fr-FR" sz="1200" b="0" kern="1200" dirty="0" smtClean="0">
+                <a:solidFill>
+                  <a:schemeClr val="tx1"/>
+                </a:solidFill>
+                <a:effectLst/>
+                <a:latin typeface="+mn-lt"/>
+                <a:ea typeface="+mn-ea"/>
+                <a:cs typeface="+mn-cs"/>
+              </a:rPr>
+              <a:t/>
+            </a:r>
+            <a:br>
+              <a:rPr lang="fr-FR" sz="1200" b="0" kern="1200" dirty="0" smtClean="0">
+                <a:solidFill>
+                  <a:schemeClr val="tx1"/>
+                </a:solidFill>
+                <a:effectLst/>
+                <a:latin typeface="+mn-lt"/>
+                <a:ea typeface="+mn-ea"/>
+                <a:cs typeface="+mn-cs"/>
+              </a:rPr>
+            </a:br>
+            <a:r>
+              <a:rPr lang="fr-FR" sz="1200" b="0" kern="1200" dirty="0" err="1" smtClean="0">
+                <a:solidFill>
+                  <a:schemeClr val="tx1"/>
+                </a:solidFill>
+                <a:effectLst/>
+                <a:latin typeface="+mn-lt"/>
+                <a:ea typeface="+mn-ea"/>
+                <a:cs typeface="+mn-cs"/>
+              </a:rPr>
+              <a:t>this.loading.pendingRequests</a:t>
+            </a:r>
+            <a:r>
+              <a:rPr lang="fr-FR" sz="1200" b="0" kern="1200" dirty="0" smtClean="0">
+                <a:solidFill>
+                  <a:schemeClr val="tx1"/>
+                </a:solidFill>
+                <a:effectLst/>
+                <a:latin typeface="+mn-lt"/>
+                <a:ea typeface="+mn-ea"/>
+                <a:cs typeface="+mn-cs"/>
+              </a:rPr>
+              <a:t>++;</a:t>
+            </a:r>
+          </a:p>
+          <a:p>
+            <a:r>
+              <a:rPr lang="fr-FR" sz="1200" b="0" kern="1200" dirty="0" smtClean="0">
+                <a:solidFill>
+                  <a:schemeClr val="tx1"/>
+                </a:solidFill>
+                <a:effectLst/>
+                <a:latin typeface="+mn-lt"/>
+                <a:ea typeface="+mn-ea"/>
+                <a:cs typeface="+mn-cs"/>
+              </a:rPr>
+              <a:t>return </a:t>
+            </a:r>
+            <a:r>
+              <a:rPr lang="fr-FR" sz="1200" b="0" kern="1200" dirty="0" err="1" smtClean="0">
+                <a:solidFill>
+                  <a:schemeClr val="tx1"/>
+                </a:solidFill>
+                <a:effectLst/>
+                <a:latin typeface="+mn-lt"/>
+                <a:ea typeface="+mn-ea"/>
+                <a:cs typeface="+mn-cs"/>
+              </a:rPr>
+              <a:t>next.handle</a:t>
+            </a:r>
+            <a:r>
+              <a:rPr lang="fr-FR" sz="1200" b="0" kern="1200" dirty="0" smtClean="0">
+                <a:solidFill>
+                  <a:schemeClr val="tx1"/>
+                </a:solidFill>
+                <a:effectLst/>
+                <a:latin typeface="+mn-lt"/>
+                <a:ea typeface="+mn-ea"/>
+                <a:cs typeface="+mn-cs"/>
+              </a:rPr>
+              <a:t>(</a:t>
+            </a:r>
+            <a:r>
+              <a:rPr lang="fr-FR" sz="1200" b="0" kern="1200" dirty="0" err="1" smtClean="0">
+                <a:solidFill>
+                  <a:schemeClr val="tx1"/>
+                </a:solidFill>
+                <a:effectLst/>
+                <a:latin typeface="+mn-lt"/>
+                <a:ea typeface="+mn-ea"/>
+                <a:cs typeface="+mn-cs"/>
+              </a:rPr>
+              <a:t>req</a:t>
+            </a:r>
+            <a:r>
+              <a:rPr lang="fr-FR" sz="1200" b="0" kern="1200" dirty="0" smtClean="0">
+                <a:solidFill>
+                  <a:schemeClr val="tx1"/>
+                </a:solidFill>
+                <a:effectLst/>
+                <a:latin typeface="+mn-lt"/>
+                <a:ea typeface="+mn-ea"/>
+                <a:cs typeface="+mn-cs"/>
+              </a:rPr>
+              <a:t>)</a:t>
+            </a:r>
+          </a:p>
+          <a:p>
+            <a:r>
+              <a:rPr lang="fr-FR" sz="1200" b="0" kern="1200" dirty="0" smtClean="0">
+                <a:solidFill>
+                  <a:schemeClr val="tx1"/>
+                </a:solidFill>
+                <a:effectLst/>
+                <a:latin typeface="+mn-lt"/>
+                <a:ea typeface="+mn-ea"/>
+                <a:cs typeface="+mn-cs"/>
+              </a:rPr>
+              <a:t>.timeout(REQUEST_TIMEOUT)</a:t>
+            </a:r>
+          </a:p>
+          <a:p>
+            <a:r>
+              <a:rPr lang="fr-FR" sz="1200" b="0" kern="1200" dirty="0" smtClean="0">
+                <a:solidFill>
+                  <a:schemeClr val="tx1"/>
+                </a:solidFill>
+                <a:effectLst/>
+                <a:latin typeface="+mn-lt"/>
+                <a:ea typeface="+mn-ea"/>
+                <a:cs typeface="+mn-cs"/>
+              </a:rPr>
+              <a:t>.</a:t>
+            </a:r>
+            <a:r>
+              <a:rPr lang="fr-FR" sz="1200" b="0" kern="1200" dirty="0" err="1" smtClean="0">
+                <a:solidFill>
+                  <a:schemeClr val="tx1"/>
+                </a:solidFill>
+                <a:effectLst/>
+                <a:latin typeface="+mn-lt"/>
+                <a:ea typeface="+mn-ea"/>
+                <a:cs typeface="+mn-cs"/>
+              </a:rPr>
+              <a:t>filter</a:t>
+            </a:r>
+            <a:r>
+              <a:rPr lang="fr-FR" sz="1200" b="0" kern="1200" dirty="0" smtClean="0">
+                <a:solidFill>
+                  <a:schemeClr val="tx1"/>
+                </a:solidFill>
+                <a:effectLst/>
+                <a:latin typeface="+mn-lt"/>
+                <a:ea typeface="+mn-ea"/>
+                <a:cs typeface="+mn-cs"/>
+              </a:rPr>
+              <a:t>(</a:t>
+            </a:r>
+            <a:r>
+              <a:rPr lang="fr-FR" sz="1200" b="0" kern="1200" dirty="0" err="1" smtClean="0">
+                <a:solidFill>
+                  <a:schemeClr val="tx1"/>
+                </a:solidFill>
+                <a:effectLst/>
+                <a:latin typeface="+mn-lt"/>
+                <a:ea typeface="+mn-ea"/>
+                <a:cs typeface="+mn-cs"/>
+              </a:rPr>
+              <a:t>result</a:t>
+            </a:r>
+            <a:r>
+              <a:rPr lang="fr-FR" sz="1200" b="0" kern="1200" dirty="0" smtClean="0">
+                <a:solidFill>
+                  <a:schemeClr val="tx1"/>
+                </a:solidFill>
+                <a:effectLst/>
+                <a:latin typeface="+mn-lt"/>
+                <a:ea typeface="+mn-ea"/>
+                <a:cs typeface="+mn-cs"/>
+              </a:rPr>
+              <a:t> =&gt; </a:t>
+            </a:r>
+            <a:r>
+              <a:rPr lang="fr-FR" sz="1200" b="0" kern="1200" dirty="0" err="1" smtClean="0">
+                <a:solidFill>
+                  <a:schemeClr val="tx1"/>
+                </a:solidFill>
+                <a:effectLst/>
+                <a:latin typeface="+mn-lt"/>
+                <a:ea typeface="+mn-ea"/>
+                <a:cs typeface="+mn-cs"/>
+              </a:rPr>
+              <a:t>this.isHttpResponse</a:t>
+            </a:r>
+            <a:r>
+              <a:rPr lang="fr-FR" sz="1200" b="0" kern="1200" dirty="0" smtClean="0">
+                <a:solidFill>
+                  <a:schemeClr val="tx1"/>
+                </a:solidFill>
+                <a:effectLst/>
+                <a:latin typeface="+mn-lt"/>
+                <a:ea typeface="+mn-ea"/>
+                <a:cs typeface="+mn-cs"/>
+              </a:rPr>
+              <a:t>(</a:t>
+            </a:r>
+            <a:r>
+              <a:rPr lang="fr-FR" sz="1200" b="0" kern="1200" dirty="0" err="1" smtClean="0">
+                <a:solidFill>
+                  <a:schemeClr val="tx1"/>
+                </a:solidFill>
+                <a:effectLst/>
+                <a:latin typeface="+mn-lt"/>
+                <a:ea typeface="+mn-ea"/>
+                <a:cs typeface="+mn-cs"/>
+              </a:rPr>
+              <a:t>result</a:t>
+            </a:r>
+            <a:r>
+              <a:rPr lang="fr-FR" sz="1200" b="0" kern="1200" dirty="0" smtClean="0">
+                <a:solidFill>
+                  <a:schemeClr val="tx1"/>
+                </a:solidFill>
+                <a:effectLst/>
+                <a:latin typeface="+mn-lt"/>
+                <a:ea typeface="+mn-ea"/>
+                <a:cs typeface="+mn-cs"/>
+              </a:rPr>
+              <a:t>))</a:t>
+            </a:r>
+          </a:p>
+          <a:p>
+            <a:r>
+              <a:rPr lang="fr-FR" sz="1200" b="0" kern="1200" dirty="0" smtClean="0">
+                <a:solidFill>
+                  <a:schemeClr val="tx1"/>
+                </a:solidFill>
+                <a:effectLst/>
+                <a:latin typeface="+mn-lt"/>
+                <a:ea typeface="+mn-ea"/>
+                <a:cs typeface="+mn-cs"/>
+              </a:rPr>
+              <a:t>.do(</a:t>
+            </a:r>
+            <a:r>
+              <a:rPr lang="fr-FR" sz="1200" b="0" kern="1200" dirty="0" err="1" smtClean="0">
+                <a:solidFill>
+                  <a:schemeClr val="tx1"/>
+                </a:solidFill>
+                <a:effectLst/>
+                <a:latin typeface="+mn-lt"/>
+                <a:ea typeface="+mn-ea"/>
+                <a:cs typeface="+mn-cs"/>
+              </a:rPr>
+              <a:t>result</a:t>
+            </a:r>
+            <a:r>
+              <a:rPr lang="fr-FR" sz="1200" b="0" kern="1200" dirty="0" smtClean="0">
+                <a:solidFill>
+                  <a:schemeClr val="tx1"/>
+                </a:solidFill>
+                <a:effectLst/>
+                <a:latin typeface="+mn-lt"/>
+                <a:ea typeface="+mn-ea"/>
+                <a:cs typeface="+mn-cs"/>
+              </a:rPr>
+              <a:t> =&gt; !</a:t>
+            </a:r>
+            <a:r>
+              <a:rPr lang="fr-FR" sz="1200" b="0" kern="1200" dirty="0" err="1" smtClean="0">
+                <a:solidFill>
+                  <a:schemeClr val="tx1"/>
+                </a:solidFill>
+                <a:effectLst/>
+                <a:latin typeface="+mn-lt"/>
+                <a:ea typeface="+mn-ea"/>
+                <a:cs typeface="+mn-cs"/>
+              </a:rPr>
+              <a:t>noCache</a:t>
+            </a:r>
+            <a:r>
+              <a:rPr lang="fr-FR" sz="1200" b="0" kern="1200" dirty="0" smtClean="0">
+                <a:solidFill>
+                  <a:schemeClr val="tx1"/>
+                </a:solidFill>
+                <a:effectLst/>
+                <a:latin typeface="+mn-lt"/>
+                <a:ea typeface="+mn-ea"/>
+                <a:cs typeface="+mn-cs"/>
+              </a:rPr>
+              <a:t> &amp;&amp; </a:t>
+            </a:r>
+            <a:r>
+              <a:rPr lang="fr-FR" sz="1200" b="0" kern="1200" dirty="0" err="1" smtClean="0">
+                <a:solidFill>
+                  <a:schemeClr val="tx1"/>
+                </a:solidFill>
+                <a:effectLst/>
+                <a:latin typeface="+mn-lt"/>
+                <a:ea typeface="+mn-ea"/>
+                <a:cs typeface="+mn-cs"/>
+              </a:rPr>
+              <a:t>this.cacheRequestResponse</a:t>
+            </a:r>
+            <a:r>
+              <a:rPr lang="fr-FR" sz="1200" b="0" kern="1200" dirty="0" smtClean="0">
+                <a:solidFill>
+                  <a:schemeClr val="tx1"/>
+                </a:solidFill>
+                <a:effectLst/>
+                <a:latin typeface="+mn-lt"/>
+                <a:ea typeface="+mn-ea"/>
+                <a:cs typeface="+mn-cs"/>
+              </a:rPr>
+              <a:t>(req.url, </a:t>
+            </a:r>
+            <a:r>
+              <a:rPr lang="fr-FR" sz="1200" b="0" kern="1200" dirty="0" err="1" smtClean="0">
+                <a:solidFill>
+                  <a:schemeClr val="tx1"/>
+                </a:solidFill>
+                <a:effectLst/>
+                <a:latin typeface="+mn-lt"/>
+                <a:ea typeface="+mn-ea"/>
+                <a:cs typeface="+mn-cs"/>
+              </a:rPr>
+              <a:t>result</a:t>
+            </a:r>
+            <a:r>
+              <a:rPr lang="fr-FR" sz="1200" b="0" kern="1200" dirty="0" smtClean="0">
+                <a:solidFill>
+                  <a:schemeClr val="tx1"/>
+                </a:solidFill>
+                <a:effectLst/>
+                <a:latin typeface="+mn-lt"/>
+                <a:ea typeface="+mn-ea"/>
+                <a:cs typeface="+mn-cs"/>
+              </a:rPr>
+              <a:t> as </a:t>
+            </a:r>
+            <a:r>
+              <a:rPr lang="fr-FR" sz="1200" b="0" kern="1200" dirty="0" err="1" smtClean="0">
+                <a:solidFill>
+                  <a:schemeClr val="tx1"/>
+                </a:solidFill>
+                <a:effectLst/>
+                <a:latin typeface="+mn-lt"/>
+                <a:ea typeface="+mn-ea"/>
+                <a:cs typeface="+mn-cs"/>
+              </a:rPr>
+              <a:t>HttpResponse</a:t>
+            </a:r>
+            <a:r>
+              <a:rPr lang="fr-FR" sz="1200" b="0" kern="1200" dirty="0" smtClean="0">
+                <a:solidFill>
+                  <a:schemeClr val="tx1"/>
+                </a:solidFill>
+                <a:effectLst/>
+                <a:latin typeface="+mn-lt"/>
+                <a:ea typeface="+mn-ea"/>
+                <a:cs typeface="+mn-cs"/>
+              </a:rPr>
+              <a:t>&lt;</a:t>
+            </a:r>
+            <a:r>
+              <a:rPr lang="fr-FR" sz="1200" b="0" kern="1200" dirty="0" err="1" smtClean="0">
+                <a:solidFill>
+                  <a:schemeClr val="tx1"/>
+                </a:solidFill>
+                <a:effectLst/>
+                <a:latin typeface="+mn-lt"/>
+                <a:ea typeface="+mn-ea"/>
+                <a:cs typeface="+mn-cs"/>
+              </a:rPr>
+              <a:t>any</a:t>
+            </a:r>
+            <a:r>
+              <a:rPr lang="fr-FR" sz="1200" b="0" kern="1200" dirty="0" smtClean="0">
+                <a:solidFill>
+                  <a:schemeClr val="tx1"/>
+                </a:solidFill>
+                <a:effectLst/>
+                <a:latin typeface="+mn-lt"/>
+                <a:ea typeface="+mn-ea"/>
+                <a:cs typeface="+mn-cs"/>
+              </a:rPr>
+              <a:t>&gt;))</a:t>
+            </a:r>
+          </a:p>
+          <a:p>
+            <a:r>
+              <a:rPr lang="fr-FR" sz="1200" b="0" kern="1200" dirty="0" smtClean="0">
+                <a:solidFill>
+                  <a:schemeClr val="tx1"/>
+                </a:solidFill>
+                <a:effectLst/>
+                <a:latin typeface="+mn-lt"/>
+                <a:ea typeface="+mn-ea"/>
+                <a:cs typeface="+mn-cs"/>
+              </a:rPr>
+              <a:t>.catch((</a:t>
+            </a:r>
+            <a:r>
+              <a:rPr lang="fr-FR" sz="1200" b="0" kern="1200" dirty="0" err="1" smtClean="0">
+                <a:solidFill>
+                  <a:schemeClr val="tx1"/>
+                </a:solidFill>
+                <a:effectLst/>
+                <a:latin typeface="+mn-lt"/>
+                <a:ea typeface="+mn-ea"/>
+                <a:cs typeface="+mn-cs"/>
+              </a:rPr>
+              <a:t>error</a:t>
+            </a:r>
+            <a:r>
+              <a:rPr lang="fr-FR" sz="1200" b="0" kern="1200" dirty="0" smtClean="0">
+                <a:solidFill>
+                  <a:schemeClr val="tx1"/>
+                </a:solidFill>
+                <a:effectLst/>
+                <a:latin typeface="+mn-lt"/>
+                <a:ea typeface="+mn-ea"/>
+                <a:cs typeface="+mn-cs"/>
+              </a:rPr>
+              <a:t>, </a:t>
+            </a:r>
+            <a:r>
+              <a:rPr lang="fr-FR" sz="1200" b="0" kern="1200" dirty="0" err="1" smtClean="0">
+                <a:solidFill>
+                  <a:schemeClr val="tx1"/>
+                </a:solidFill>
+                <a:effectLst/>
+                <a:latin typeface="+mn-lt"/>
+                <a:ea typeface="+mn-ea"/>
+                <a:cs typeface="+mn-cs"/>
+              </a:rPr>
+              <a:t>caught</a:t>
+            </a:r>
+            <a:r>
+              <a:rPr lang="fr-FR" sz="1200" b="0" kern="1200" dirty="0" smtClean="0">
+                <a:solidFill>
+                  <a:schemeClr val="tx1"/>
+                </a:solidFill>
+                <a:effectLst/>
+                <a:latin typeface="+mn-lt"/>
+                <a:ea typeface="+mn-ea"/>
+                <a:cs typeface="+mn-cs"/>
+              </a:rPr>
+              <a:t>) =&gt; {</a:t>
+            </a:r>
+          </a:p>
+          <a:p>
+            <a:r>
+              <a:rPr lang="fr-FR" sz="1200" b="0" kern="1200" dirty="0" smtClean="0">
+                <a:solidFill>
+                  <a:schemeClr val="tx1"/>
+                </a:solidFill>
+                <a:effectLst/>
+                <a:latin typeface="+mn-lt"/>
+                <a:ea typeface="+mn-ea"/>
+                <a:cs typeface="+mn-cs"/>
+              </a:rPr>
+              <a:t>if (</a:t>
+            </a:r>
+            <a:r>
+              <a:rPr lang="fr-FR" sz="1200" b="0" kern="1200" dirty="0" err="1" smtClean="0">
+                <a:solidFill>
+                  <a:schemeClr val="tx1"/>
+                </a:solidFill>
+                <a:effectLst/>
+                <a:latin typeface="+mn-lt"/>
+                <a:ea typeface="+mn-ea"/>
+                <a:cs typeface="+mn-cs"/>
+              </a:rPr>
+              <a:t>this.isProxyError</a:t>
+            </a:r>
+            <a:r>
+              <a:rPr lang="fr-FR" sz="1200" b="0" kern="1200" dirty="0" smtClean="0">
+                <a:solidFill>
+                  <a:schemeClr val="tx1"/>
+                </a:solidFill>
+                <a:effectLst/>
+                <a:latin typeface="+mn-lt"/>
+                <a:ea typeface="+mn-ea"/>
+                <a:cs typeface="+mn-cs"/>
+              </a:rPr>
+              <a:t>(</a:t>
+            </a:r>
+            <a:r>
+              <a:rPr lang="fr-FR" sz="1200" b="0" kern="1200" dirty="0" err="1" smtClean="0">
+                <a:solidFill>
+                  <a:schemeClr val="tx1"/>
+                </a:solidFill>
+                <a:effectLst/>
+                <a:latin typeface="+mn-lt"/>
+                <a:ea typeface="+mn-ea"/>
+                <a:cs typeface="+mn-cs"/>
+              </a:rPr>
+              <a:t>error</a:t>
+            </a:r>
+            <a:r>
+              <a:rPr lang="fr-FR" sz="1200" b="0" kern="1200" dirty="0" smtClean="0">
+                <a:solidFill>
+                  <a:schemeClr val="tx1"/>
+                </a:solidFill>
+                <a:effectLst/>
+                <a:latin typeface="+mn-lt"/>
+                <a:ea typeface="+mn-ea"/>
+                <a:cs typeface="+mn-cs"/>
+              </a:rPr>
+              <a:t>)) {</a:t>
+            </a:r>
+          </a:p>
+          <a:p>
+            <a:r>
+              <a:rPr lang="fr-FR" sz="1200" b="0" kern="1200" dirty="0" smtClean="0">
+                <a:solidFill>
+                  <a:schemeClr val="tx1"/>
+                </a:solidFill>
+                <a:effectLst/>
+                <a:latin typeface="+mn-lt"/>
+                <a:ea typeface="+mn-ea"/>
+                <a:cs typeface="+mn-cs"/>
+              </a:rPr>
+              <a:t>return </a:t>
+            </a:r>
+            <a:r>
+              <a:rPr lang="fr-FR" sz="1200" b="0" kern="1200" dirty="0" err="1" smtClean="0">
+                <a:solidFill>
+                  <a:schemeClr val="tx1"/>
+                </a:solidFill>
+                <a:effectLst/>
+                <a:latin typeface="+mn-lt"/>
+                <a:ea typeface="+mn-ea"/>
+                <a:cs typeface="+mn-cs"/>
+              </a:rPr>
+              <a:t>Observable.of</a:t>
+            </a:r>
+            <a:r>
+              <a:rPr lang="fr-FR" sz="1200" b="0" kern="1200" dirty="0" smtClean="0">
+                <a:solidFill>
+                  <a:schemeClr val="tx1"/>
+                </a:solidFill>
+                <a:effectLst/>
+                <a:latin typeface="+mn-lt"/>
+                <a:ea typeface="+mn-ea"/>
+                <a:cs typeface="+mn-cs"/>
+              </a:rPr>
+              <a:t>(</a:t>
+            </a:r>
+            <a:r>
+              <a:rPr lang="fr-FR" sz="1200" b="0" kern="1200" dirty="0" err="1" smtClean="0">
+                <a:solidFill>
+                  <a:schemeClr val="tx1"/>
+                </a:solidFill>
+                <a:effectLst/>
+                <a:latin typeface="+mn-lt"/>
+                <a:ea typeface="+mn-ea"/>
+                <a:cs typeface="+mn-cs"/>
+              </a:rPr>
+              <a:t>this.inFlightResponse</a:t>
+            </a:r>
+            <a:r>
+              <a:rPr lang="fr-FR" sz="1200" b="0" kern="1200" dirty="0" smtClean="0">
+                <a:solidFill>
+                  <a:schemeClr val="tx1"/>
+                </a:solidFill>
+                <a:effectLst/>
+                <a:latin typeface="+mn-lt"/>
+                <a:ea typeface="+mn-ea"/>
+                <a:cs typeface="+mn-cs"/>
+              </a:rPr>
+              <a:t>(req.url, </a:t>
+            </a:r>
+            <a:r>
+              <a:rPr lang="fr-FR" sz="1200" b="0" kern="1200" dirty="0" err="1" smtClean="0">
+                <a:solidFill>
+                  <a:schemeClr val="tx1"/>
+                </a:solidFill>
+                <a:effectLst/>
+                <a:latin typeface="+mn-lt"/>
+                <a:ea typeface="+mn-ea"/>
+                <a:cs typeface="+mn-cs"/>
+              </a:rPr>
+              <a:t>error.error</a:t>
+            </a:r>
+            <a:r>
+              <a:rPr lang="fr-FR" sz="1200" b="0" kern="1200" dirty="0" smtClean="0">
+                <a:solidFill>
+                  <a:schemeClr val="tx1"/>
+                </a:solidFill>
+                <a:effectLst/>
+                <a:latin typeface="+mn-lt"/>
+                <a:ea typeface="+mn-ea"/>
+                <a:cs typeface="+mn-cs"/>
+              </a:rPr>
+              <a:t>));</a:t>
+            </a:r>
+          </a:p>
+          <a:p>
+            <a:r>
+              <a:rPr lang="fr-FR" sz="1200" b="0" kern="1200" dirty="0" smtClean="0">
+                <a:solidFill>
+                  <a:schemeClr val="tx1"/>
+                </a:solidFill>
+                <a:effectLst/>
+                <a:latin typeface="+mn-lt"/>
+                <a:ea typeface="+mn-ea"/>
+                <a:cs typeface="+mn-cs"/>
+              </a:rPr>
+              <a:t>} </a:t>
+            </a:r>
+            <a:r>
+              <a:rPr lang="fr-FR" sz="1200" b="0" kern="1200" dirty="0" err="1" smtClean="0">
+                <a:solidFill>
+                  <a:schemeClr val="tx1"/>
+                </a:solidFill>
+                <a:effectLst/>
+                <a:latin typeface="+mn-lt"/>
+                <a:ea typeface="+mn-ea"/>
+                <a:cs typeface="+mn-cs"/>
+              </a:rPr>
+              <a:t>else</a:t>
+            </a:r>
+            <a:r>
+              <a:rPr lang="fr-FR" sz="1200" b="0" kern="1200" dirty="0" smtClean="0">
+                <a:solidFill>
+                  <a:schemeClr val="tx1"/>
+                </a:solidFill>
+                <a:effectLst/>
+                <a:latin typeface="+mn-lt"/>
+                <a:ea typeface="+mn-ea"/>
+                <a:cs typeface="+mn-cs"/>
+              </a:rPr>
+              <a:t> {</a:t>
+            </a:r>
+          </a:p>
+          <a:p>
+            <a:r>
+              <a:rPr lang="fr-FR" sz="1200" b="0" kern="1200" dirty="0" smtClean="0">
+                <a:solidFill>
+                  <a:schemeClr val="tx1"/>
+                </a:solidFill>
+                <a:effectLst/>
+                <a:latin typeface="+mn-lt"/>
+                <a:ea typeface="+mn-ea"/>
+                <a:cs typeface="+mn-cs"/>
+              </a:rPr>
+              <a:t>return </a:t>
+            </a:r>
+            <a:r>
+              <a:rPr lang="fr-FR" sz="1200" b="0" kern="1200" dirty="0" err="1" smtClean="0">
+                <a:solidFill>
+                  <a:schemeClr val="tx1"/>
+                </a:solidFill>
+                <a:effectLst/>
+                <a:latin typeface="+mn-lt"/>
+                <a:ea typeface="+mn-ea"/>
+                <a:cs typeface="+mn-cs"/>
+              </a:rPr>
+              <a:t>this.responseFromCacheOrPresentModal</a:t>
+            </a:r>
+            <a:r>
+              <a:rPr lang="fr-FR" sz="1200" b="0" kern="1200" dirty="0" smtClean="0">
+                <a:solidFill>
+                  <a:schemeClr val="tx1"/>
+                </a:solidFill>
+                <a:effectLst/>
+                <a:latin typeface="+mn-lt"/>
+                <a:ea typeface="+mn-ea"/>
+                <a:cs typeface="+mn-cs"/>
+              </a:rPr>
+              <a:t>(req.url, </a:t>
+            </a:r>
+            <a:r>
+              <a:rPr lang="fr-FR" sz="1200" b="0" kern="1200" dirty="0" err="1" smtClean="0">
+                <a:solidFill>
+                  <a:schemeClr val="tx1"/>
+                </a:solidFill>
+                <a:effectLst/>
+                <a:latin typeface="+mn-lt"/>
+                <a:ea typeface="+mn-ea"/>
+                <a:cs typeface="+mn-cs"/>
+              </a:rPr>
+              <a:t>error</a:t>
+            </a:r>
+            <a:r>
+              <a:rPr lang="fr-FR" sz="1200" b="0" kern="1200" dirty="0" smtClean="0">
+                <a:solidFill>
+                  <a:schemeClr val="tx1"/>
+                </a:solidFill>
+                <a:effectLst/>
+                <a:latin typeface="+mn-lt"/>
+                <a:ea typeface="+mn-ea"/>
+                <a:cs typeface="+mn-cs"/>
+              </a:rPr>
+              <a:t>, </a:t>
+            </a:r>
+            <a:r>
+              <a:rPr lang="fr-FR" sz="1200" b="0" kern="1200" dirty="0" err="1" smtClean="0">
+                <a:solidFill>
+                  <a:schemeClr val="tx1"/>
+                </a:solidFill>
+                <a:effectLst/>
+                <a:latin typeface="+mn-lt"/>
+                <a:ea typeface="+mn-ea"/>
+                <a:cs typeface="+mn-cs"/>
+              </a:rPr>
+              <a:t>noErrorModal</a:t>
+            </a:r>
+            <a:r>
+              <a:rPr lang="fr-FR" sz="1200" b="0" kern="1200" dirty="0" smtClean="0">
+                <a:solidFill>
+                  <a:schemeClr val="tx1"/>
+                </a:solidFill>
+                <a:effectLst/>
+                <a:latin typeface="+mn-lt"/>
+                <a:ea typeface="+mn-ea"/>
+                <a:cs typeface="+mn-cs"/>
+              </a:rPr>
+              <a:t>);</a:t>
+            </a:r>
+          </a:p>
+          <a:p>
+            <a:r>
+              <a:rPr lang="fr-FR" sz="1200" b="0" kern="1200" dirty="0" smtClean="0">
+                <a:solidFill>
+                  <a:schemeClr val="tx1"/>
+                </a:solidFill>
+                <a:effectLst/>
+                <a:latin typeface="+mn-lt"/>
+                <a:ea typeface="+mn-ea"/>
+                <a:cs typeface="+mn-cs"/>
+              </a:rPr>
+              <a:t>}</a:t>
+            </a:r>
+          </a:p>
+          <a:p>
+            <a:r>
+              <a:rPr lang="fr-FR" sz="1200" b="0" kern="1200" dirty="0" smtClean="0">
+                <a:solidFill>
+                  <a:schemeClr val="tx1"/>
+                </a:solidFill>
+                <a:effectLst/>
+                <a:latin typeface="+mn-lt"/>
+                <a:ea typeface="+mn-ea"/>
+                <a:cs typeface="+mn-cs"/>
+              </a:rPr>
+              <a:t>})</a:t>
+            </a:r>
+          </a:p>
+          <a:p>
+            <a:r>
+              <a:rPr lang="fr-FR" sz="1200" b="0" kern="1200" dirty="0" smtClean="0">
+                <a:solidFill>
+                  <a:schemeClr val="tx1"/>
+                </a:solidFill>
+                <a:effectLst/>
+                <a:latin typeface="+mn-lt"/>
+                <a:ea typeface="+mn-ea"/>
+                <a:cs typeface="+mn-cs"/>
+              </a:rPr>
+              <a:t>.do(() =&gt; </a:t>
+            </a:r>
+            <a:r>
+              <a:rPr lang="fr-FR" sz="1200" b="0" kern="1200" dirty="0" err="1" smtClean="0">
+                <a:solidFill>
+                  <a:schemeClr val="tx1"/>
+                </a:solidFill>
+                <a:effectLst/>
+                <a:latin typeface="+mn-lt"/>
+                <a:ea typeface="+mn-ea"/>
+                <a:cs typeface="+mn-cs"/>
+              </a:rPr>
+              <a:t>this.loading.pendingRequests</a:t>
+            </a:r>
+            <a:r>
+              <a:rPr lang="fr-FR" sz="1200" b="0" kern="1200" dirty="0" smtClean="0">
+                <a:solidFill>
+                  <a:schemeClr val="tx1"/>
+                </a:solidFill>
+                <a:effectLst/>
+                <a:latin typeface="+mn-lt"/>
+                <a:ea typeface="+mn-ea"/>
+                <a:cs typeface="+mn-cs"/>
+              </a:rPr>
+              <a:t>--);</a:t>
+            </a:r>
+          </a:p>
+          <a:p>
+            <a:r>
+              <a:rPr lang="fr-FR" sz="1200" b="0" kern="1200" dirty="0" smtClean="0">
+                <a:solidFill>
+                  <a:schemeClr val="tx1"/>
+                </a:solidFill>
+                <a:effectLst/>
+                <a:latin typeface="+mn-lt"/>
+                <a:ea typeface="+mn-ea"/>
+                <a:cs typeface="+mn-cs"/>
+              </a:rPr>
+              <a:t>}</a:t>
+            </a:r>
+          </a:p>
+          <a:p>
+            <a:endParaRPr lang="fr-FR" dirty="0"/>
+          </a:p>
+        </p:txBody>
+      </p:sp>
+      <p:sp>
+        <p:nvSpPr>
+          <p:cNvPr id="4" name="Espace réservé du numéro de diapositive 3"/>
+          <p:cNvSpPr>
+            <a:spLocks noGrp="1"/>
+          </p:cNvSpPr>
+          <p:nvPr>
+            <p:ph type="sldNum" sz="quarter" idx="10"/>
+          </p:nvPr>
+        </p:nvSpPr>
+        <p:spPr/>
+        <p:txBody>
+          <a:bodyPr/>
+          <a:lstStyle/>
+          <a:p>
+            <a:fld id="{FD0CA3AA-443A-466C-BF59-FB6574BB11C3}" type="slidenum">
+              <a:rPr lang="fr-FR" smtClean="0"/>
               <a:t>21</a:t>
             </a:fld>
             <a:endParaRPr lang="fr-FR"/>
@@ -2325,7 +2548,7 @@
 </p:notes>
 </file>
 
-<file path=ppt/notesSlides/notesSlide15.xml><?xml version="1.0" encoding="utf-8"?>
+<file path=ppt/notesSlides/notesSlide17.xml><?xml version="1.0" encoding="utf-8"?>
 <p:notes xmlns:a="http://schemas.openxmlformats.org/drawingml/2006/main" xmlns:r="http://schemas.openxmlformats.org/officeDocument/2006/relationships" xmlns:p="http://schemas.openxmlformats.org/presentationml/2006/main">
   <p:cSld>
     <p:spTree>
@@ -2454,12 +2677,35 @@
           <a:lstStyle/>
           <a:p>
             <a:r>
+              <a:rPr lang="fr-FR" dirty="0" smtClean="0"/>
+              <a:t>GIT</a:t>
+            </a:r>
+            <a:r>
+              <a:rPr lang="fr-FR" baseline="0" dirty="0" smtClean="0"/>
+              <a:t> : </a:t>
+            </a:r>
+            <a:r>
+              <a:rPr lang="fr-FR" dirty="0" smtClean="0"/>
+              <a:t>https://github.com/dalabord/ng-formation.git cloner et créer des branches pour</a:t>
+            </a:r>
+            <a:r>
+              <a:rPr lang="fr-FR" baseline="0" dirty="0" smtClean="0"/>
+              <a:t> tester et soumettre</a:t>
+            </a:r>
+            <a:endParaRPr lang="fr-FR" dirty="0" smtClean="0"/>
+          </a:p>
+          <a:p>
+            <a:r>
               <a:rPr lang="fr-FR" dirty="0" err="1" smtClean="0"/>
               <a:t>Nodejs</a:t>
             </a:r>
             <a:r>
               <a:rPr lang="fr-FR" dirty="0" smtClean="0"/>
-              <a:t> v8</a:t>
+              <a:t> </a:t>
+            </a:r>
+            <a:r>
+              <a:rPr lang="fr-FR" dirty="0" smtClean="0"/>
+              <a:t>v8</a:t>
             </a:r>
           </a:p>
           <a:p>
@@ -2489,6 +2735,45 @@
             <a:r>
               <a:rPr lang="fr-FR" dirty="0" err="1" smtClean="0"/>
               <a:t>npm</a:t>
+            </a:r>
+            <a:endParaRPr lang="fr-FR" dirty="0" smtClean="0"/>
+          </a:p>
+          <a:p>
+            <a:r>
+              <a:rPr lang="fr-FR" dirty="0" smtClean="0"/>
+              <a:t>Extensions </a:t>
+            </a:r>
+            <a:r>
+              <a:rPr lang="fr-FR" dirty="0" err="1" smtClean="0"/>
+              <a:t>VSCode</a:t>
+            </a:r>
+            <a:r>
+              <a:rPr lang="fr-FR" dirty="0" smtClean="0"/>
+              <a:t> : </a:t>
+            </a:r>
+            <a:r>
+              <a:rPr lang="fr-FR" dirty="0" err="1" smtClean="0"/>
+              <a:t>Snippets</a:t>
+            </a:r>
+            <a:r>
+              <a:rPr lang="fr-FR" dirty="0" smtClean="0"/>
+              <a:t> </a:t>
+            </a:r>
+            <a:r>
+              <a:rPr lang="fr-FR" dirty="0" err="1" smtClean="0"/>
+              <a:t>Angular</a:t>
+            </a:r>
+            <a:r>
+              <a:rPr lang="fr-FR" dirty="0" smtClean="0"/>
+              <a:t> 6 by John</a:t>
+            </a:r>
+            <a:r>
+              <a:rPr lang="fr-FR" baseline="0" dirty="0" smtClean="0"/>
+              <a:t> Papa &amp; </a:t>
+            </a:r>
+            <a:r>
+              <a:rPr lang="fr-FR" baseline="0" dirty="0" err="1" smtClean="0"/>
+              <a:t>Emmet</a:t>
             </a:r>
             <a:endParaRPr lang="fr-FR" dirty="0" smtClean="0"/>
           </a:p>
@@ -2582,11 +2867,21 @@
           <a:p>
             <a:r>
               <a:rPr lang="fr-FR" dirty="0" smtClean="0"/>
+              <a:t>https://tinychat.com</a:t>
+            </a:r>
+          </a:p>
+          <a:p>
+            <a:r>
+              <a:rPr lang="fr-FR" dirty="0" smtClean="0"/>
               <a:t>!</a:t>
             </a:r>
             <a:r>
               <a:rPr lang="fr-FR" baseline="0" dirty="0" smtClean="0"/>
-              <a:t> Module v4 est en erreur. Tester avec </a:t>
+              <a:t> </a:t>
+            </a:r>
+            <a:r>
+              <a:rPr lang="fr-FR" baseline="0" dirty="0" smtClean="0"/>
+              <a:t>Module v4 est en erreur. Tester avec </a:t>
             </a:r>
             <a:r>
               <a:rPr lang="fr-FR" baseline="0" dirty="0" err="1" smtClean="0"/>
@@ -4635,90 +4930,8 @@
           <a:p>
             <a:r>
               <a:rPr lang="fr-FR" dirty="0" smtClean="0"/>
-              <a:t>Étudier la racine du répertoire</a:t>
-            </a:r>
-          </a:p>
-          <a:p>
-            <a:r>
-              <a:rPr lang="fr-FR" dirty="0" err="1" smtClean="0"/>
-              <a:t>Sockjs</a:t>
-            </a:r>
-            <a:r>
-              <a:rPr lang="fr-FR" dirty="0" smtClean="0"/>
-              <a:t> =&gt; </a:t>
-            </a:r>
-            <a:r>
-              <a:rPr lang="fr-FR" dirty="0" err="1" smtClean="0"/>
-              <a:t>webpack</a:t>
-            </a:r>
-            <a:r>
-              <a:rPr lang="fr-FR" dirty="0" smtClean="0"/>
-              <a:t>-</a:t>
-            </a:r>
-            <a:r>
-              <a:rPr lang="fr-FR" dirty="0" err="1" smtClean="0"/>
-              <a:t>dev</a:t>
-            </a:r>
-            <a:r>
-              <a:rPr lang="fr-FR" dirty="0" smtClean="0"/>
-              <a:t>-server : memory-</a:t>
-            </a:r>
-            <a:r>
-              <a:rPr lang="fr-FR" dirty="0" err="1" smtClean="0"/>
-              <a:t>fs</a:t>
-            </a:r>
-            <a:r>
-              <a:rPr lang="fr-FR" dirty="0" smtClean="0"/>
-              <a:t> utiliser pour charger le projet dans objet </a:t>
-            </a:r>
-            <a:r>
-              <a:rPr lang="fr-FR" dirty="0" err="1" smtClean="0"/>
-              <a:t>js</a:t>
-            </a:r>
-            <a:r>
-              <a:rPr lang="fr-FR" dirty="0" smtClean="0"/>
-              <a:t> (pas de /</a:t>
-            </a:r>
-            <a:r>
-              <a:rPr lang="fr-FR" dirty="0" err="1" smtClean="0"/>
-              <a:t>dist</a:t>
-            </a:r>
-            <a:r>
-              <a:rPr lang="fr-FR" dirty="0" smtClean="0"/>
-              <a:t>)</a:t>
-            </a:r>
-          </a:p>
-          <a:p>
-            <a:r>
-              <a:rPr lang="fr-FR" dirty="0" err="1" smtClean="0"/>
-              <a:t>Polyfills</a:t>
-            </a:r>
-            <a:r>
-              <a:rPr lang="fr-FR" dirty="0" smtClean="0"/>
-              <a:t> : ES6 mais </a:t>
-            </a:r>
-            <a:r>
-              <a:rPr lang="fr-FR" dirty="0" err="1" smtClean="0"/>
-              <a:t>retrocompatible</a:t>
-            </a:r>
-            <a:endParaRPr lang="fr-FR" dirty="0" smtClean="0"/>
-          </a:p>
-          <a:p>
-            <a:r>
-              <a:rPr lang="fr-FR" dirty="0" smtClean="0"/>
-              <a:t>Styles.js : fonctions</a:t>
-            </a:r>
-            <a:r>
-              <a:rPr lang="fr-FR" baseline="0" dirty="0" smtClean="0"/>
-              <a:t> de traitement style &amp; </a:t>
-            </a:r>
-            <a:r>
-              <a:rPr lang="fr-FR" baseline="0" dirty="0" err="1" smtClean="0"/>
-              <a:t>css</a:t>
-            </a:r>
-            <a:endParaRPr lang="fr-FR" baseline="0" dirty="0" smtClean="0"/>
-          </a:p>
-          <a:p>
+              <a:t>https://github.com/angular/angular-cli</a:t>
+            </a:r>
             <a:endParaRPr lang="fr-FR" dirty="0"/>
           </a:p>
         </p:txBody>
@@ -4740,7 +4953,7 @@
           <a:p>
             <a:fld id="{FD0CA3AA-443A-466C-BF59-FB6574BB11C3}" type="slidenum">
               <a:rPr lang="fr-FR" smtClean="0"/>
-              <a:t>11</a:t>
+              <a:t>10</a:t>
             </a:fld>
             <a:endParaRPr lang="fr-FR"/>
           </a:p>
@@ -4749,7 +4962,7 @@
     </p:spTree>
     <p:extLst>
       <p:ext uri="{BB962C8B-B14F-4D97-AF65-F5344CB8AC3E}">
-        <p14:creationId xmlns:p14="http://schemas.microsoft.com/office/powerpoint/2010/main" val="1259930748"/>
+        <p14:creationId xmlns:p14="http://schemas.microsoft.com/office/powerpoint/2010/main" val="1065838406"/>
       </p:ext>
     </p:extLst>
   </p:cSld>
@@ -4803,27 +5016,85 @@
           <a:bodyPr/>
           <a:lstStyle/>
           <a:p>
-            <a:pPr marL="0" marR="0" indent="0" algn="l" defTabSz="914400" rtl="0" eaLnBrk="1" fontAlgn="auto" latinLnBrk="0" hangingPunct="1">
-              <a:lnSpc>
-                <a:spcPct val="100000"/>
-              </a:lnSpc>
-              <a:spcBef>
-                <a:spcPts val="0"/>
-              </a:spcBef>
-              <a:spcAft>
-                <a:spcPts val="0"/>
-              </a:spcAft>
-              <a:buClrTx/>
-              <a:buSzTx/>
-              <a:buFontTx/>
-              <a:buNone/>
-              <a:tabLst/>
-              <a:defRPr/>
-            </a:pPr>
             <a:r>
               <a:rPr lang="fr-FR" dirty="0" smtClean="0"/>
-              <a:t>Ordre de déclaration des routes crucial </a:t>
-            </a:r>
+              <a:t>Étudier la racine du répertoire</a:t>
+            </a:r>
+          </a:p>
+          <a:p>
+            <a:r>
+              <a:rPr lang="fr-FR" dirty="0" err="1" smtClean="0"/>
+              <a:t>Sockjs</a:t>
+            </a:r>
+            <a:r>
+              <a:rPr lang="fr-FR" dirty="0" smtClean="0"/>
+              <a:t> =&gt; </a:t>
+            </a:r>
+            <a:r>
+              <a:rPr lang="fr-FR" dirty="0" err="1" smtClean="0"/>
+              <a:t>webpack</a:t>
+            </a:r>
+            <a:r>
+              <a:rPr lang="fr-FR" dirty="0" smtClean="0"/>
+              <a:t>-</a:t>
+            </a:r>
+            <a:r>
+              <a:rPr lang="fr-FR" dirty="0" err="1" smtClean="0"/>
+              <a:t>dev</a:t>
+            </a:r>
+            <a:r>
+              <a:rPr lang="fr-FR" dirty="0" smtClean="0"/>
+              <a:t>-server : memory-</a:t>
+            </a:r>
+            <a:r>
+              <a:rPr lang="fr-FR" dirty="0" err="1" smtClean="0"/>
+              <a:t>fs</a:t>
+            </a:r>
+            <a:r>
+              <a:rPr lang="fr-FR" dirty="0" smtClean="0"/>
+              <a:t> utiliser pour charger le projet dans objet </a:t>
+            </a:r>
+            <a:r>
+              <a:rPr lang="fr-FR" dirty="0" err="1" smtClean="0"/>
+              <a:t>js</a:t>
+            </a:r>
+            <a:r>
+              <a:rPr lang="fr-FR" dirty="0" smtClean="0"/>
+              <a:t> (pas de /</a:t>
+            </a:r>
+            <a:r>
+              <a:rPr lang="fr-FR" dirty="0" err="1" smtClean="0"/>
+              <a:t>dist</a:t>
+            </a:r>
+            <a:r>
+              <a:rPr lang="fr-FR" dirty="0" smtClean="0"/>
+              <a:t>)</a:t>
+            </a:r>
+          </a:p>
+          <a:p>
+            <a:r>
+              <a:rPr lang="fr-FR" dirty="0" err="1" smtClean="0"/>
+              <a:t>Polyfills</a:t>
+            </a:r>
+            <a:r>
+              <a:rPr lang="fr-FR" dirty="0" smtClean="0"/>
+              <a:t> : ES6 mais retro compatible</a:t>
+            </a:r>
+          </a:p>
+          <a:p>
+            <a:r>
+              <a:rPr lang="fr-FR" dirty="0" smtClean="0"/>
+              <a:t>Styles.js : fonctions</a:t>
+            </a:r>
+            <a:r>
+              <a:rPr lang="fr-FR" baseline="0" dirty="0" smtClean="0"/>
+              <a:t> de traitement style &amp; </a:t>
+            </a:r>
+            <a:r>
+              <a:rPr lang="fr-FR" baseline="0" dirty="0" err="1" smtClean="0"/>
+              <a:t>css</a:t>
+            </a:r>
+            <a:endParaRPr lang="fr-FR" baseline="0" dirty="0" smtClean="0"/>
           </a:p>
           <a:p>
             <a:endParaRPr lang="fr-FR" dirty="0"/>
@@ -4847,7 +5118,7 @@
           <a:p>
             <a:fld id="{FD0CA3AA-443A-466C-BF59-FB6574BB11C3}" type="slidenum">
               <a:rPr lang="fr-FR" smtClean="0"/>
-              <a:t>12</a:t>
+              <a:t>11</a:t>
             </a:fld>
             <a:endParaRPr lang="fr-FR"/>
           </a:p>
@@ -4856,7 +5127,7 @@
     </p:spTree>
     <p:extLst>
       <p:ext uri="{BB962C8B-B14F-4D97-AF65-F5344CB8AC3E}">
-        <p14:creationId xmlns:p14="http://schemas.microsoft.com/office/powerpoint/2010/main" val="3388767870"/>
+        <p14:creationId xmlns:p14="http://schemas.microsoft.com/office/powerpoint/2010/main" val="1259930748"/>
       </p:ext>
     </p:extLst>
   </p:cSld>
@@ -6678,7 +6949,7 @@
           <a:p>
             <a:fld id="{58FC6F0A-3597-4ED6-9ED9-061AF1CD731E}" type="datetimeFigureOut">
               <a:rPr lang="fr-FR" smtClean="0"/>
-              <a:t>30/05/2018</a:t>
+              <a:t>31/05/2018</a:t>
             </a:fld>
             <a:endParaRPr lang="fr-FR"/>
           </a:p>
@@ -6859,7 +7130,7 @@
           <a:p>
             <a:fld id="{58FC6F0A-3597-4ED6-9ED9-061AF1CD731E}" type="datetimeFigureOut">
               <a:rPr lang="fr-FR" smtClean="0"/>
-              <a:t>30/05/2018</a:t>
+              <a:t>31/05/2018</a:t>
             </a:fld>
             <a:endParaRPr lang="fr-FR"/>
           </a:p>
@@ -7010,7 +7281,7 @@
           <a:p>
             <a:fld id="{58FC6F0A-3597-4ED6-9ED9-061AF1CD731E}" type="datetimeFigureOut">
               <a:rPr lang="fr-FR" smtClean="0"/>
-              <a:t>30/05/2018</a:t>
+              <a:t>31/05/2018</a:t>
             </a:fld>
             <a:endParaRPr lang="fr-FR"/>
           </a:p>
@@ -8836,7 +9107,7 @@
           <a:p>
             <a:fld id="{58FC6F0A-3597-4ED6-9ED9-061AF1CD731E}" type="datetimeFigureOut">
               <a:rPr lang="fr-FR" smtClean="0"/>
-              <a:t>30/05/2018</a:t>
+              <a:t>31/05/2018</a:t>
             </a:fld>
             <a:endParaRPr lang="fr-FR"/>
           </a:p>
@@ -10706,7 +10977,7 @@
           <a:p>
             <a:fld id="{58FC6F0A-3597-4ED6-9ED9-061AF1CD731E}" type="datetimeFigureOut">
               <a:rPr lang="fr-FR" smtClean="0"/>
-              <a:t>30/05/2018</a:t>
+              <a:t>31/05/2018</a:t>
             </a:fld>
             <a:endParaRPr lang="fr-FR"/>
           </a:p>
@@ -10819,7 +11090,7 @@
           <a:p>
             <a:fld id="{58FC6F0A-3597-4ED6-9ED9-061AF1CD731E}" type="datetimeFigureOut">
               <a:rPr lang="fr-FR" smtClean="0"/>
-              <a:t>30/05/2018</a:t>
+              <a:t>31/05/2018</a:t>
             </a:fld>
             <a:endParaRPr lang="fr-FR"/>
           </a:p>
@@ -11360,7 +11631,7 @@
           <a:p>
             <a:fld id="{58FC6F0A-3597-4ED6-9ED9-061AF1CD731E}" type="datetimeFigureOut">
               <a:rPr lang="fr-FR" smtClean="0"/>
-              <a:t>30/05/2018</a:t>
+              <a:t>31/05/2018</a:t>
             </a:fld>
             <a:endParaRPr lang="fr-FR"/>
           </a:p>
@@ -11473,7 +11744,7 @@
           <a:p>
             <a:fld id="{58FC6F0A-3597-4ED6-9ED9-061AF1CD731E}" type="datetimeFigureOut">
               <a:rPr lang="fr-FR" smtClean="0"/>
-              <a:t>30/05/2018</a:t>
+              <a:t>31/05/2018</a:t>
             </a:fld>
             <a:endParaRPr lang="fr-FR"/>
           </a:p>
@@ -13184,7 +13455,7 @@
           <a:p>
             <a:fld id="{58FC6F0A-3597-4ED6-9ED9-061AF1CD731E}" type="datetimeFigureOut">
               <a:rPr lang="fr-FR" smtClean="0"/>
-              <a:t>30/05/2018</a:t>
+              <a:t>31/05/2018</a:t>
             </a:fld>
             <a:endParaRPr lang="fr-FR"/>
           </a:p>
@@ -13335,7 +13606,7 @@
           <a:p>
             <a:fld id="{58FC6F0A-3597-4ED6-9ED9-061AF1CD731E}" type="datetimeFigureOut">
               <a:rPr lang="fr-FR" smtClean="0"/>
-              <a:t>30/05/2018</a:t>
+              <a:t>31/05/2018</a:t>
             </a:fld>
             <a:endParaRPr lang="fr-FR"/>
           </a:p>
@@ -16950,7 +17221,7 @@
           <a:p>
             <a:fld id="{58FC6F0A-3597-4ED6-9ED9-061AF1CD731E}" type="datetimeFigureOut">
               <a:rPr lang="fr-FR" smtClean="0"/>
-              <a:t>30/05/2018</a:t>
+              <a:t>31/05/2018</a:t>
             </a:fld>
             <a:endParaRPr lang="fr-FR"/>
           </a:p>
@@ -18809,7 +19080,7 @@
           <a:p>
             <a:fld id="{58FC6F0A-3597-4ED6-9ED9-061AF1CD731E}" type="datetimeFigureOut">
               <a:rPr lang="fr-FR" smtClean="0"/>
-              <a:t>30/05/2018</a:t>
+              <a:t>31/05/2018</a:t>
             </a:fld>
             <a:endParaRPr lang="fr-FR"/>
           </a:p>
@@ -19405,9 +19676,13 @@
           <a:p>
             <a:r>
               <a:rPr lang="fr-FR" sz="2800" dirty="0" smtClean="0"/>
-              <a:t>Architecture &amp; Modularisation</a:t>
-            </a:r>
-            <a:endParaRPr lang="fr-FR" sz="2800" dirty="0"/>
+              <a:t>Architecture &amp; </a:t>
+            </a:r>
+            <a:r>
+              <a:rPr lang="fr-FR" sz="2800" i="1" dirty="0" smtClean="0"/>
+              <a:t>Modularisation</a:t>
+            </a:r>
+            <a:endParaRPr lang="fr-FR" sz="2800" i="1" dirty="0"/>
           </a:p>
         </p:txBody>
       </p:sp>
@@ -19958,7 +20233,7 @@
         </p:spPr>
         <p:txBody>
           <a:bodyPr>
-            <a:normAutofit/>
+            <a:normAutofit fontScale="92500"/>
           </a:bodyPr>
           <a:lstStyle/>
           <a:p>
@@ -19996,8 +20271,29 @@
           <a:p>
             <a:r>
               <a:rPr lang="fr-FR" dirty="0"/>
-              <a:t>Dans la console chrome analyser les fichiers récupérés</a:t>
-            </a:r>
+              <a:t>Dans la console chrome analyser les fichiers </a:t>
+            </a:r>
+            <a:r>
+              <a:rPr lang="fr-FR" dirty="0" smtClean="0"/>
+              <a:t>récupérés</a:t>
+            </a:r>
+          </a:p>
+          <a:p>
+            <a:r>
+              <a:rPr lang="fr-FR" dirty="0" smtClean="0"/>
+              <a:t>Débogage HTML/CSS/JS</a:t>
+            </a:r>
+          </a:p>
+          <a:p>
+            <a:r>
+              <a:rPr lang="fr-FR" dirty="0" err="1" smtClean="0"/>
+              <a:t>Angular.json</a:t>
+            </a:r>
+            <a:r>
+              <a:rPr lang="fr-FR" dirty="0" smtClean="0"/>
+              <a:t> : CSS &gt; SCSS</a:t>
+            </a:r>
+            <a:endParaRPr lang="fr-FR" dirty="0"/>
           </a:p>
           <a:p>
             <a:endParaRPr lang="fr-FR" dirty="0"/>
@@ -20392,7 +20688,15 @@
           <a:p>
             <a:r>
               <a:rPr lang="fr-FR" dirty="0" smtClean="0"/>
-              <a:t>Ajouter le composant à la vue du composant </a:t>
+              <a:t>Ajouter le composant </a:t>
+            </a:r>
+            <a:r>
+              <a:rPr lang="fr-FR" dirty="0" err="1" smtClean="0"/>
+              <a:t>classroom</a:t>
+            </a:r>
+            <a:r>
+              <a:rPr lang="fr-FR" dirty="0" smtClean="0"/>
+              <a:t>-liste puis l’afficher dans la vue du composant </a:t>
             </a:r>
             <a:r>
               <a:rPr lang="fr-FR" dirty="0" err="1" smtClean="0"/>
@@ -20883,11 +21187,7 @@
             <a:pPr lvl="1"/>
             <a:r>
               <a:rPr lang="fr-FR" dirty="0" smtClean="0"/>
-              <a:t>Créer </a:t>
-            </a:r>
-            <a:r>
-              <a:rPr lang="fr-FR" dirty="0" smtClean="0"/>
-              <a:t>un pipe de tri</a:t>
+              <a:t>Créer un pipe de tri</a:t>
             </a:r>
           </a:p>
           <a:p>
@@ -20901,11 +21201,7 @@
             <a:pPr lvl="1"/>
             <a:r>
               <a:rPr lang="fr-FR" dirty="0" smtClean="0"/>
-              <a:t>Ajouter un bouton d’ordre de </a:t>
-            </a:r>
-            <a:r>
-              <a:rPr lang="fr-FR" dirty="0" smtClean="0"/>
-              <a:t>tri</a:t>
+              <a:t>Ajouter un bouton d’ordre de tri</a:t>
             </a:r>
           </a:p>
           <a:p>
@@ -21022,11 +21318,7 @@
           <a:p>
             <a:r>
               <a:rPr lang="fr-FR" dirty="0" smtClean="0"/>
-              <a:t>Programmation fonctionnelle avec </a:t>
-            </a:r>
-            <a:r>
-              <a:rPr lang="fr-FR" dirty="0" smtClean="0"/>
-              <a:t>collections</a:t>
+              <a:t>Programmation fonctionnelle avec collections</a:t>
             </a:r>
           </a:p>
           <a:p>
@@ -21052,7 +21344,6 @@
               <a:rPr lang="fr-FR" dirty="0" smtClean="0"/>
               <a:t>Depuis lav 5.5 : pipe &amp; imports simplifiés</a:t>
             </a:r>
-            <a:endParaRPr lang="fr-FR" dirty="0" smtClean="0"/>
           </a:p>
           <a:p>
             <a:endParaRPr lang="fr-FR" dirty="0" smtClean="0"/>
@@ -21201,11 +21492,7 @@
           <a:p>
             <a:r>
               <a:rPr lang="fr-FR" dirty="0" smtClean="0"/>
-              <a:t>Module de routage : Composant, directive et </a:t>
-            </a:r>
-            <a:r>
-              <a:rPr lang="fr-FR" dirty="0" smtClean="0"/>
-              <a:t>provider</a:t>
+              <a:t>Module de routage : Composant, directive et provider</a:t>
             </a:r>
           </a:p>
           <a:p>
@@ -21225,11 +21512,7 @@
           <a:p>
             <a:r>
               <a:rPr lang="fr-FR" dirty="0" smtClean="0"/>
-              <a:t>A </a:t>
-            </a:r>
-            <a:r>
-              <a:rPr lang="fr-FR" dirty="0" smtClean="0"/>
-              <a:t>chaque module son routage</a:t>
+              <a:t>A chaque module son routage</a:t>
             </a:r>
           </a:p>
           <a:p>
@@ -21317,7 +21600,9 @@
         </p:nvSpPr>
         <p:spPr/>
         <p:txBody>
-          <a:bodyPr/>
+          <a:bodyPr>
+            <a:normAutofit fontScale="92500" lnSpcReduction="10000"/>
+          </a:bodyPr>
           <a:lstStyle/>
           <a:p>
             <a:r>
@@ -21330,20 +21615,49 @@
             </a:r>
             <a:r>
               <a:rPr lang="fr-FR" dirty="0" smtClean="0"/>
-              <a:t> : trop de complexité sur de gros projets</a:t>
-            </a:r>
-          </a:p>
-          <a:p>
+              <a:t> : trop de complexité </a:t>
+            </a:r>
+            <a:endParaRPr lang="fr-FR" dirty="0" smtClean="0"/>
+          </a:p>
+          <a:p>
+            <a:pPr marL="0" indent="0">
+              <a:buNone/>
+            </a:pPr>
             <a:r>
               <a:rPr lang="fr-FR" dirty="0" smtClean="0"/>
-              <a:t>Besoin d’industrialisation:</a:t>
+              <a:t>sur </a:t>
+            </a:r>
+            <a:r>
+              <a:rPr lang="fr-FR" dirty="0" smtClean="0"/>
+              <a:t>de gros projets</a:t>
+            </a:r>
+          </a:p>
+          <a:p>
+            <a:r>
+              <a:rPr lang="fr-FR" dirty="0" smtClean="0"/>
+              <a:t>Besoin </a:t>
+            </a:r>
+            <a:r>
+              <a:rPr lang="fr-FR" dirty="0" smtClean="0"/>
+              <a:t>d’industrialisation :</a:t>
             </a:r>
           </a:p>
           <a:p>
             <a:pPr lvl="1"/>
             <a:r>
               <a:rPr lang="fr-FR" dirty="0" smtClean="0"/>
-              <a:t>Gestion des routes ;</a:t>
+              <a:t>MVC</a:t>
+            </a:r>
+          </a:p>
+          <a:p>
+            <a:pPr lvl="1"/>
+            <a:r>
+              <a:rPr lang="fr-FR" dirty="0" smtClean="0"/>
+              <a:t>Gestion </a:t>
+            </a:r>
+            <a:r>
+              <a:rPr lang="fr-FR" dirty="0" smtClean="0"/>
+              <a:t>des routes ;</a:t>
             </a:r>
           </a:p>
           <a:p>
@@ -21365,13 +21679,23 @@
               <a:rPr lang="fr-FR" dirty="0" smtClean="0"/>
               <a:t>Depuis 2010, apparition des </a:t>
             </a:r>
+            <a:endParaRPr lang="fr-FR" dirty="0" smtClean="0"/>
+          </a:p>
+          <a:p>
+            <a:pPr marL="0" indent="0">
+              <a:buNone/>
+            </a:pPr>
             <a:r>
               <a:rPr lang="fr-FR" dirty="0" err="1" smtClean="0"/>
               <a:t>frameworks</a:t>
             </a:r>
             <a:r>
               <a:rPr lang="fr-FR" dirty="0" smtClean="0"/>
-              <a:t> JS : </a:t>
+              <a:t> </a:t>
+            </a:r>
+            <a:r>
+              <a:rPr lang="fr-FR" dirty="0" smtClean="0"/>
+              <a:t>JS : </a:t>
             </a:r>
             <a:r>
               <a:rPr lang="fr-FR" dirty="0" err="1" smtClean="0"/>
@@ -21422,6 +21746,40 @@
           </a:p>
         </p:txBody>
       </p:sp>
+      <p:pic>
+        <p:nvPicPr>
+          <p:cNvPr id="5" name="Image 4"/>
+          <p:cNvPicPr>
+            <a:picLocks noChangeAspect="1"/>
+          </p:cNvPicPr>
+          <p:nvPr/>
+        </p:nvPicPr>
+        <p:blipFill>
+          <a:blip r:embed="rId3"/>
+          <a:stretch>
+            <a:fillRect/>
+          </a:stretch>
+        </p:blipFill>
+        <p:spPr>
+          <a:xfrm>
+            <a:off x="6156176" y="1603797"/>
+            <a:ext cx="2352675" cy="5038725"/>
+          </a:xfrm>
+          <a:prstGeom prst="rect">
+            <a:avLst/>
+          </a:prstGeom>
+          <a:ln>
+            <a:noFill/>
+          </a:ln>
+          <a:effectLst>
+            <a:outerShdw blurRad="190500" algn="tl" rotWithShape="0">
+              <a:srgbClr val="000000">
+                <a:alpha val="70000"/>
+              </a:srgbClr>
+            </a:outerShdw>
+          </a:effectLst>
+        </p:spPr>
+      </p:pic>
     </p:spTree>
     <p:extLst>
       <p:ext uri="{BB962C8B-B14F-4D97-AF65-F5344CB8AC3E}">
@@ -21471,16 +21829,25 @@
         </p:nvSpPr>
         <p:spPr/>
         <p:txBody>
-          <a:bodyPr/>
+          <a:bodyPr>
+            <a:normAutofit lnSpcReduction="10000"/>
+          </a:bodyPr>
           <a:lstStyle/>
           <a:p>
             <a:r>
               <a:rPr lang="fr-FR" dirty="0" smtClean="0"/>
-              <a:t>Éditer </a:t>
-            </a:r>
+              <a:t>Ajouter un composant </a:t>
+            </a:r>
+            <a:r>
+              <a:rPr lang="fr-FR" dirty="0" err="1" smtClean="0"/>
+              <a:t>classroom-detail</a:t>
+            </a:r>
+            <a:endParaRPr lang="fr-FR" dirty="0" smtClean="0"/>
+          </a:p>
+          <a:p>
             <a:r>
               <a:rPr lang="fr-FR" dirty="0" smtClean="0"/>
-              <a:t>les </a:t>
+              <a:t>Éditer les </a:t>
             </a:r>
             <a:r>
               <a:rPr lang="fr-FR" dirty="0"/>
@@ -21488,11 +21855,7 @@
             </a:r>
             <a:r>
               <a:rPr lang="fr-FR" dirty="0" smtClean="0"/>
-              <a:t>base </a:t>
-            </a:r>
-            <a:r>
-              <a:rPr lang="fr-FR" dirty="0" smtClean="0"/>
-              <a:t>du module </a:t>
+              <a:t>base du module </a:t>
             </a:r>
             <a:r>
               <a:rPr lang="fr-FR" dirty="0" err="1" smtClean="0"/>
@@ -21507,15 +21870,53 @@
             <a:pPr lvl="1"/>
             <a:r>
               <a:rPr lang="fr-FR" dirty="0" smtClean="0"/>
-              <a:t>Toute route non identifiée : **</a:t>
-            </a:r>
+              <a:t>Route </a:t>
+            </a:r>
+            <a:r>
+              <a:rPr lang="fr-FR" dirty="0" err="1" smtClean="0"/>
+              <a:t>classroom</a:t>
+            </a:r>
+            <a:endParaRPr lang="fr-FR" dirty="0" smtClean="0"/>
           </a:p>
           <a:p>
             <a:pPr lvl="1"/>
             <a:r>
               <a:rPr lang="fr-FR" dirty="0" smtClean="0"/>
-              <a:t>Route non renseignée : /</a:t>
-            </a:r>
+              <a:t>Route </a:t>
+            </a:r>
+            <a:r>
+              <a:rPr lang="fr-FR" dirty="0" err="1" smtClean="0"/>
+              <a:t>classroom</a:t>
+            </a:r>
+            <a:r>
+              <a:rPr lang="fr-FR" dirty="0" smtClean="0"/>
+              <a:t>/</a:t>
+            </a:r>
+            <a:r>
+              <a:rPr lang="fr-FR" dirty="0" err="1" smtClean="0"/>
+              <a:t>student</a:t>
+            </a:r>
+            <a:r>
+              <a:rPr lang="fr-FR" dirty="0" smtClean="0"/>
+              <a:t>/:</a:t>
+            </a:r>
+            <a:r>
+              <a:rPr lang="fr-FR" dirty="0" err="1" smtClean="0"/>
+              <a:t>name</a:t>
+            </a:r>
+            <a:endParaRPr lang="fr-FR" dirty="0" smtClean="0"/>
+          </a:p>
+          <a:p>
+            <a:pPr lvl="1"/>
+            <a:r>
+              <a:rPr lang="fr-FR" dirty="0" smtClean="0"/>
+              <a:t>Route non renseignée : / // Renvoie vers </a:t>
+            </a:r>
+            <a:r>
+              <a:rPr lang="fr-FR" dirty="0" err="1" smtClean="0"/>
+              <a:t>classroom</a:t>
+            </a:r>
+            <a:endParaRPr lang="fr-FR" dirty="0" smtClean="0"/>
           </a:p>
           <a:p>
             <a:pPr lvl="1"/>
@@ -21530,6 +21931,14 @@
             <a:r>
               <a:rPr lang="fr-FR" dirty="0" err="1" smtClean="0"/>
               <a:t>found</a:t>
+            </a:r>
+            <a:endParaRPr lang="fr-FR" dirty="0" smtClean="0"/>
+          </a:p>
+          <a:p>
+            <a:pPr lvl="1"/>
+            <a:r>
+              <a:rPr lang="fr-FR" dirty="0"/>
+              <a:t>Toute route non identifiée : **</a:t>
             </a:r>
             <a:endParaRPr lang="fr-FR" dirty="0" smtClean="0"/>
           </a:p>
@@ -21832,55 +22241,6 @@
       </p:grpSpPr>
       <p:sp>
         <p:nvSpPr>
-          <p:cNvPr id="3" name="Espace réservé du contenu 2"/>
-          <p:cNvSpPr>
-            <a:spLocks noGrp="1"/>
-          </p:cNvSpPr>
-          <p:nvPr>
-            <p:ph idx="1"/>
-          </p:nvPr>
-        </p:nvSpPr>
-        <p:spPr/>
-        <p:txBody>
-          <a:bodyPr/>
-          <a:lstStyle/>
-          <a:p>
-            <a:r>
-              <a:rPr lang="fr-FR" dirty="0" smtClean="0"/>
-              <a:t>Recommandations </a:t>
-            </a:r>
-            <a:r>
-              <a:rPr lang="fr-FR" dirty="0" err="1" smtClean="0"/>
-              <a:t>Angular</a:t>
-            </a:r>
-            <a:r>
-              <a:rPr lang="fr-FR" dirty="0"/>
-              <a:t> : </a:t>
-            </a:r>
-            <a:r>
-              <a:rPr lang="fr-FR" dirty="0">
-                <a:hlinkClick r:id="rId3"/>
-              </a:rPr>
-              <a:t>https://</a:t>
-            </a:r>
-            <a:r>
-              <a:rPr lang="fr-FR" dirty="0" smtClean="0">
-                <a:hlinkClick r:id="rId3"/>
-              </a:rPr>
-              <a:t>angular.io/guide/styleguide</a:t>
-            </a:r>
-            <a:endParaRPr lang="fr-FR" dirty="0" smtClean="0"/>
-          </a:p>
-          <a:p>
-            <a:endParaRPr lang="fr-FR" dirty="0"/>
-          </a:p>
-          <a:p>
-            <a:endParaRPr lang="fr-FR" dirty="0"/>
-          </a:p>
-        </p:txBody>
-      </p:sp>
-      <p:sp>
-        <p:nvSpPr>
           <p:cNvPr id="2" name="Titre 1"/>
           <p:cNvSpPr>
             <a:spLocks noGrp="1"/>
@@ -21896,12 +22256,431 @@
           <a:p>
             <a:r>
               <a:rPr lang="fr-FR" dirty="0" smtClean="0"/>
-              <a:t>Annexes	</a:t>
+              <a:t>Liens</a:t>
+            </a:r>
+            <a:r>
+              <a:rPr lang="fr-FR" dirty="0" smtClean="0"/>
+              <a:t>	</a:t>
             </a:r>
             <a:endParaRPr lang="fr-FR" dirty="0"/>
           </a:p>
         </p:txBody>
       </p:sp>
+      <p:graphicFrame>
+        <p:nvGraphicFramePr>
+          <p:cNvPr id="4" name="Tableau 3"/>
+          <p:cNvGraphicFramePr>
+            <a:graphicFrameLocks noGrp="1"/>
+          </p:cNvGraphicFramePr>
+          <p:nvPr>
+            <p:extLst>
+              <p:ext uri="{D42A27DB-BD31-4B8C-83A1-F6EECF244321}">
+                <p14:modId xmlns:p14="http://schemas.microsoft.com/office/powerpoint/2010/main" val="4259419249"/>
+              </p:ext>
+            </p:extLst>
+          </p:nvPr>
+        </p:nvGraphicFramePr>
+        <p:xfrm>
+          <a:off x="251520" y="1795339"/>
+          <a:ext cx="8671875" cy="4837421"/>
+        </p:xfrm>
+        <a:graphic>
+          <a:graphicData uri="http://schemas.openxmlformats.org/drawingml/2006/table">
+            <a:tbl>
+              <a:tblPr firstRow="1" bandRow="1">
+                <a:tableStyleId>{3B4B98B0-60AC-42C2-AFA5-B58CD77FA1E5}</a:tableStyleId>
+              </a:tblPr>
+              <a:tblGrid>
+                <a:gridCol w="2592288"/>
+                <a:gridCol w="6079587"/>
+              </a:tblGrid>
+              <a:tr h="843378">
+                <a:tc>
+                  <a:txBody>
+                    <a:bodyPr/>
+                    <a:lstStyle/>
+                    <a:p>
+                      <a:endParaRPr lang="fr-FR" dirty="0"/>
+                    </a:p>
+                  </a:txBody>
+                  <a:tcPr/>
+                </a:tc>
+                <a:tc>
+                  <a:txBody>
+                    <a:bodyPr/>
+                    <a:lstStyle/>
+                    <a:p>
+                      <a:endParaRPr lang="fr-FR" dirty="0"/>
+                    </a:p>
+                  </a:txBody>
+                  <a:tcPr/>
+                </a:tc>
+              </a:tr>
+              <a:tr h="430243">
+                <a:tc>
+                  <a:txBody>
+                    <a:bodyPr/>
+                    <a:lstStyle/>
+                    <a:p>
+                      <a:r>
+                        <a:rPr lang="fr-FR" dirty="0" smtClean="0"/>
+                        <a:t>Ressources de formation</a:t>
+                      </a:r>
+                      <a:endParaRPr lang="fr-FR" dirty="0"/>
+                    </a:p>
+                  </a:txBody>
+                  <a:tcPr/>
+                </a:tc>
+                <a:tc>
+                  <a:txBody>
+                    <a:bodyPr/>
+                    <a:lstStyle/>
+                    <a:p>
+                      <a:r>
+                        <a:rPr lang="fr-FR" dirty="0" smtClean="0">
+                          <a:hlinkClick r:id="rId3"/>
+                        </a:rPr>
+                        <a:t>https://github.com/dalabord/ng-formation.git</a:t>
+                      </a:r>
+                      <a:endParaRPr lang="fr-FR" dirty="0"/>
+                    </a:p>
+                  </a:txBody>
+                  <a:tcPr/>
+                </a:tc>
+              </a:tr>
+              <a:tr h="432048">
+                <a:tc>
+                  <a:txBody>
+                    <a:bodyPr/>
+                    <a:lstStyle/>
+                    <a:p>
+                      <a:pPr marL="0" marR="0" indent="0" algn="l" defTabSz="914400" rtl="0" eaLnBrk="1" fontAlgn="auto" latinLnBrk="0" hangingPunct="1">
+                        <a:lnSpc>
+                          <a:spcPct val="100000"/>
+                        </a:lnSpc>
+                        <a:spcBef>
+                          <a:spcPts val="0"/>
+                        </a:spcBef>
+                        <a:spcAft>
+                          <a:spcPts val="0"/>
+                        </a:spcAft>
+                        <a:buClrTx/>
+                        <a:buSzTx/>
+                        <a:buFontTx/>
+                        <a:buNone/>
+                        <a:tabLst/>
+                        <a:defRPr/>
+                      </a:pPr>
+                      <a:r>
+                        <a:rPr lang="fr-FR" dirty="0" err="1" smtClean="0"/>
+                        <a:t>Webpack</a:t>
+                      </a:r>
+                      <a:r>
+                        <a:rPr lang="fr-FR" dirty="0" smtClean="0"/>
+                        <a:t> loaders</a:t>
+                      </a:r>
+                    </a:p>
+                    <a:p>
+                      <a:endParaRPr lang="fr-FR" dirty="0"/>
+                    </a:p>
+                  </a:txBody>
+                  <a:tcPr/>
+                </a:tc>
+                <a:tc>
+                  <a:txBody>
+                    <a:bodyPr/>
+                    <a:lstStyle/>
+                    <a:p>
+                      <a:r>
+                        <a:rPr lang="fr-FR" dirty="0" smtClean="0">
+                          <a:hlinkClick r:id="rId4"/>
+                        </a:rPr>
+                        <a:t>https://webpack.js.org/loaders/</a:t>
+                      </a:r>
+                      <a:endParaRPr lang="fr-FR" dirty="0" smtClean="0"/>
+                    </a:p>
+                  </a:txBody>
+                  <a:tcPr/>
+                </a:tc>
+              </a:tr>
+              <a:tr h="360040">
+                <a:tc>
+                  <a:txBody>
+                    <a:bodyPr/>
+                    <a:lstStyle/>
+                    <a:p>
+                      <a:r>
+                        <a:rPr lang="fr-FR" dirty="0" smtClean="0"/>
+                        <a:t>VS Code Marketplace</a:t>
+                      </a:r>
+                      <a:endParaRPr lang="fr-FR" dirty="0"/>
+                    </a:p>
+                  </a:txBody>
+                  <a:tcPr/>
+                </a:tc>
+                <a:tc>
+                  <a:txBody>
+                    <a:bodyPr/>
+                    <a:lstStyle/>
+                    <a:p>
+                      <a:r>
+                        <a:rPr lang="fr-FR" dirty="0" smtClean="0">
+                          <a:hlinkClick r:id="rId5"/>
+                        </a:rPr>
+                        <a:t>https://marketplace.visualstudio.com/VSCode</a:t>
+                      </a:r>
+                      <a:endParaRPr lang="fr-FR" dirty="0"/>
+                    </a:p>
+                  </a:txBody>
+                  <a:tcPr/>
+                </a:tc>
+              </a:tr>
+              <a:tr h="354320">
+                <a:tc>
+                  <a:txBody>
+                    <a:bodyPr/>
+                    <a:lstStyle/>
+                    <a:p>
+                      <a:pPr marL="0" marR="0" indent="0" algn="l" defTabSz="914400" rtl="0" eaLnBrk="1" fontAlgn="auto" latinLnBrk="0" hangingPunct="1">
+                        <a:lnSpc>
+                          <a:spcPct val="100000"/>
+                        </a:lnSpc>
+                        <a:spcBef>
+                          <a:spcPts val="0"/>
+                        </a:spcBef>
+                        <a:spcAft>
+                          <a:spcPts val="0"/>
+                        </a:spcAft>
+                        <a:buClrTx/>
+                        <a:buSzTx/>
+                        <a:buFontTx/>
+                        <a:buNone/>
+                        <a:tabLst/>
+                        <a:defRPr/>
+                      </a:pPr>
+                      <a:r>
+                        <a:rPr lang="fr-FR" dirty="0" err="1" smtClean="0"/>
+                        <a:t>Typescript</a:t>
+                      </a:r>
+                      <a:endParaRPr lang="fr-FR" dirty="0" smtClean="0"/>
+                    </a:p>
+                  </a:txBody>
+                  <a:tcPr/>
+                </a:tc>
+                <a:tc>
+                  <a:txBody>
+                    <a:bodyPr/>
+                    <a:lstStyle/>
+                    <a:p>
+                      <a:pPr marL="0" marR="0" indent="0" algn="l" defTabSz="914400" rtl="0" eaLnBrk="1" fontAlgn="auto" latinLnBrk="0" hangingPunct="1">
+                        <a:lnSpc>
+                          <a:spcPct val="100000"/>
+                        </a:lnSpc>
+                        <a:spcBef>
+                          <a:spcPts val="0"/>
+                        </a:spcBef>
+                        <a:spcAft>
+                          <a:spcPts val="0"/>
+                        </a:spcAft>
+                        <a:buClrTx/>
+                        <a:buSzTx/>
+                        <a:buFontTx/>
+                        <a:buNone/>
+                        <a:tabLst/>
+                        <a:defRPr/>
+                      </a:pPr>
+                      <a:r>
+                        <a:rPr lang="fr-FR" dirty="0" smtClean="0">
+                          <a:hlinkClick r:id="rId6"/>
+                        </a:rPr>
+                        <a:t>https://www.typescriptlang.org/docs/handbook/release-notes/typescript-1-5.html</a:t>
+                      </a:r>
+                      <a:endParaRPr lang="fr-FR" dirty="0" smtClean="0"/>
+                    </a:p>
+                  </a:txBody>
+                  <a:tcPr/>
+                </a:tc>
+              </a:tr>
+              <a:tr h="420608">
+                <a:tc>
+                  <a:txBody>
+                    <a:bodyPr/>
+                    <a:lstStyle/>
+                    <a:p>
+                      <a:r>
+                        <a:rPr lang="fr-FR" dirty="0" smtClean="0"/>
+                        <a:t>VS Code</a:t>
+                      </a:r>
+                      <a:endParaRPr lang="fr-FR" dirty="0"/>
+                    </a:p>
+                  </a:txBody>
+                  <a:tcPr/>
+                </a:tc>
+                <a:tc>
+                  <a:txBody>
+                    <a:bodyPr/>
+                    <a:lstStyle/>
+                    <a:p>
+                      <a:pPr marL="0" marR="0" indent="0" algn="l" defTabSz="914400" rtl="0" eaLnBrk="1" fontAlgn="auto" latinLnBrk="0" hangingPunct="1">
+                        <a:lnSpc>
+                          <a:spcPct val="100000"/>
+                        </a:lnSpc>
+                        <a:spcBef>
+                          <a:spcPts val="0"/>
+                        </a:spcBef>
+                        <a:spcAft>
+                          <a:spcPts val="0"/>
+                        </a:spcAft>
+                        <a:buClrTx/>
+                        <a:buSzTx/>
+                        <a:buFontTx/>
+                        <a:buNone/>
+                        <a:tabLst/>
+                        <a:defRPr/>
+                      </a:pPr>
+                      <a:r>
+                        <a:rPr lang="fr-FR" dirty="0" smtClean="0">
+                          <a:hlinkClick r:id="rId7"/>
+                        </a:rPr>
+                        <a:t>https://code.visualstudio.com/download</a:t>
+                      </a:r>
+                      <a:endParaRPr lang="fr-FR" dirty="0"/>
+                    </a:p>
+                  </a:txBody>
+                  <a:tcPr/>
+                </a:tc>
+              </a:tr>
+              <a:tr h="284584">
+                <a:tc>
+                  <a:txBody>
+                    <a:bodyPr/>
+                    <a:lstStyle/>
+                    <a:p>
+                      <a:endParaRPr lang="fr-FR" dirty="0"/>
+                    </a:p>
+                  </a:txBody>
+                  <a:tcPr/>
+                </a:tc>
+                <a:tc>
+                  <a:txBody>
+                    <a:bodyPr/>
+                    <a:lstStyle/>
+                    <a:p>
+                      <a:endParaRPr lang="fr-FR" dirty="0"/>
+                    </a:p>
+                  </a:txBody>
+                  <a:tcPr/>
+                </a:tc>
+              </a:tr>
+              <a:tr h="354320">
+                <a:tc>
+                  <a:txBody>
+                    <a:bodyPr/>
+                    <a:lstStyle/>
+                    <a:p>
+                      <a:endParaRPr lang="fr-FR" dirty="0"/>
+                    </a:p>
+                  </a:txBody>
+                  <a:tcPr/>
+                </a:tc>
+                <a:tc>
+                  <a:txBody>
+                    <a:bodyPr/>
+                    <a:lstStyle/>
+                    <a:p>
+                      <a:endParaRPr lang="fr-FR" dirty="0"/>
+                    </a:p>
+                  </a:txBody>
+                  <a:tcPr/>
+                </a:tc>
+              </a:tr>
+              <a:tr h="765752">
+                <a:tc>
+                  <a:txBody>
+                    <a:bodyPr/>
+                    <a:lstStyle/>
+                    <a:p>
+                      <a:pPr marL="0" marR="0" indent="0" algn="l" defTabSz="914400" rtl="0" eaLnBrk="1" fontAlgn="auto" latinLnBrk="0" hangingPunct="1">
+                        <a:lnSpc>
+                          <a:spcPct val="100000"/>
+                        </a:lnSpc>
+                        <a:spcBef>
+                          <a:spcPts val="0"/>
+                        </a:spcBef>
+                        <a:spcAft>
+                          <a:spcPts val="0"/>
+                        </a:spcAft>
+                        <a:buClrTx/>
+                        <a:buSzTx/>
+                        <a:buFontTx/>
+                        <a:buNone/>
+                        <a:tabLst/>
+                        <a:defRPr/>
+                      </a:pPr>
+                      <a:r>
+                        <a:rPr lang="fr-FR" dirty="0" err="1" smtClean="0"/>
+                        <a:t>Reco</a:t>
+                      </a:r>
+                      <a:r>
+                        <a:rPr lang="fr-FR" dirty="0" smtClean="0"/>
+                        <a:t>. </a:t>
+                      </a:r>
+                      <a:r>
+                        <a:rPr lang="fr-FR" dirty="0" err="1" smtClean="0"/>
+                        <a:t>Angular</a:t>
+                      </a:r>
+                      <a:r>
+                        <a:rPr lang="fr-FR" dirty="0" smtClean="0"/>
+                        <a:t> </a:t>
+                      </a:r>
+                    </a:p>
+                    <a:p>
+                      <a:endParaRPr lang="fr-FR" dirty="0"/>
+                    </a:p>
+                  </a:txBody>
+                  <a:tcPr/>
+                </a:tc>
+                <a:tc>
+                  <a:txBody>
+                    <a:bodyPr/>
+                    <a:lstStyle/>
+                    <a:p>
+                      <a:pPr marL="0" marR="0" indent="0" algn="l" defTabSz="914400" rtl="0" eaLnBrk="1" fontAlgn="auto" latinLnBrk="0" hangingPunct="1">
+                        <a:lnSpc>
+                          <a:spcPct val="100000"/>
+                        </a:lnSpc>
+                        <a:spcBef>
+                          <a:spcPts val="0"/>
+                        </a:spcBef>
+                        <a:spcAft>
+                          <a:spcPts val="0"/>
+                        </a:spcAft>
+                        <a:buClrTx/>
+                        <a:buSzTx/>
+                        <a:buFontTx/>
+                        <a:buNone/>
+                        <a:tabLst/>
+                        <a:defRPr/>
+                      </a:pPr>
+                      <a:r>
+                        <a:rPr lang="fr-FR" dirty="0" smtClean="0">
+                          <a:hlinkClick r:id="rId8"/>
+                        </a:rPr>
+                        <a:t>https://angular.io/guide/styleguide</a:t>
+                      </a:r>
+                      <a:endParaRPr lang="fr-FR" dirty="0" smtClean="0"/>
+                    </a:p>
+                    <a:p>
+                      <a:endParaRPr lang="fr-FR" dirty="0"/>
+                    </a:p>
+                  </a:txBody>
+                  <a:tcPr/>
+                </a:tc>
+              </a:tr>
+            </a:tbl>
+          </a:graphicData>
+        </a:graphic>
+      </p:graphicFrame>
     </p:spTree>
     <p:extLst>
       <p:ext uri="{BB962C8B-B14F-4D97-AF65-F5344CB8AC3E}">
@@ -21956,7 +22735,9 @@
           </a:xfrm>
         </p:spPr>
         <p:txBody>
-          <a:bodyPr/>
+          <a:bodyPr>
+            <a:normAutofit lnSpcReduction="10000"/>
+          </a:bodyPr>
           <a:lstStyle/>
           <a:p>
             <a:r>
@@ -21999,8 +22780,13 @@
             </a:r>
             <a:r>
               <a:rPr lang="fr-FR" dirty="0" smtClean="0"/>
-              <a:t> Package Manager)</a:t>
-            </a:r>
+              <a:t> Package Manager</a:t>
+            </a:r>
+            <a:r>
+              <a:rPr lang="fr-FR" dirty="0" smtClean="0"/>
+              <a:t>) en local et en global :</a:t>
+            </a:r>
+            <a:endParaRPr lang="fr-FR" dirty="0" smtClean="0"/>
           </a:p>
           <a:p>
             <a:pPr lvl="1"/>
@@ -22036,8 +22822,13 @@
           <a:p>
             <a:r>
               <a:rPr lang="fr-FR" dirty="0" smtClean="0"/>
-              <a:t>VS Code</a:t>
-            </a:r>
+              <a:t>VS </a:t>
+            </a:r>
+            <a:r>
+              <a:rPr lang="fr-FR" dirty="0" smtClean="0"/>
+              <a:t>Code : Editeur léger, intuitif avec extensions (Marketplace)</a:t>
+            </a:r>
+            <a:endParaRPr lang="fr-FR" dirty="0" smtClean="0"/>
           </a:p>
           <a:p>
             <a:endParaRPr lang="fr-FR" dirty="0"/>
@@ -22141,7 +22932,7 @@
               <a:rPr lang="fr-FR" dirty="0" err="1" smtClean="0"/>
               <a:t>npm</a:t>
             </a:r>
-            <a:endParaRPr lang="fr-FR" dirty="0" smtClean="0"/>
+            <a:endParaRPr lang="fr-FR" dirty="0"/>
           </a:p>
           <a:p>
             <a:r>
@@ -22149,6 +22940,26 @@
               <a:t>Installer </a:t>
             </a:r>
             <a:r>
+              <a:rPr lang="fr-FR" dirty="0"/>
+              <a:t>des </a:t>
+            </a:r>
+            <a:r>
+              <a:rPr lang="fr-FR" dirty="0" smtClean="0"/>
+              <a:t>dépendances </a:t>
+            </a:r>
+            <a:r>
+              <a:rPr lang="fr-FR" dirty="0"/>
+              <a:t>en local et en </a:t>
+            </a:r>
+            <a:r>
+              <a:rPr lang="fr-FR" dirty="0" err="1"/>
+              <a:t>dev</a:t>
+            </a:r>
+            <a:endParaRPr lang="fr-FR" dirty="0" smtClean="0"/>
+          </a:p>
+          <a:p>
+            <a:pPr lvl="1"/>
+            <a:r>
               <a:rPr lang="fr-FR" dirty="0" err="1" smtClean="0"/>
               <a:t>webpack</a:t>
             </a:r>
@@ -22156,33 +22967,40 @@
               <a:rPr lang="fr-FR" dirty="0" smtClean="0"/>
               <a:t>, </a:t>
             </a:r>
+            <a:endParaRPr lang="fr-FR" dirty="0" smtClean="0"/>
+          </a:p>
+          <a:p>
+            <a:pPr lvl="1"/>
             <a:r>
               <a:rPr lang="fr-FR" dirty="0" err="1" smtClean="0"/>
               <a:t>webpack</a:t>
             </a:r>
             <a:r>
               <a:rPr lang="fr-FR" dirty="0" smtClean="0"/>
-              <a:t>-cli, </a:t>
-            </a:r>
+              <a:t>-cli</a:t>
+            </a:r>
+            <a:r>
+              <a:rPr lang="fr-FR" dirty="0" smtClean="0"/>
+              <a:t>, </a:t>
+            </a:r>
+            <a:endParaRPr lang="fr-FR" dirty="0" smtClean="0"/>
+          </a:p>
+          <a:p>
+            <a:pPr lvl="1"/>
             <a:r>
               <a:rPr lang="fr-FR" dirty="0" err="1" smtClean="0"/>
               <a:t>ts</a:t>
             </a:r>
             <a:r>
               <a:rPr lang="fr-FR" dirty="0" smtClean="0"/>
-              <a:t>-loader &amp; </a:t>
-            </a:r>
+              <a:t>-loader</a:t>
+            </a:r>
+          </a:p>
+          <a:p>
+            <a:pPr lvl="1"/>
             <a:r>
               <a:rPr lang="fr-FR" dirty="0" err="1" smtClean="0"/>
               <a:t>typescript</a:t>
-            </a:r>
-            <a:r>
-              <a:rPr lang="fr-FR" dirty="0" smtClean="0"/>
-              <a:t> en local et en </a:t>
-            </a:r>
-            <a:r>
-              <a:rPr lang="fr-FR" dirty="0" err="1" smtClean="0"/>
-              <a:t>dev</a:t>
             </a:r>
             <a:endParaRPr lang="fr-FR" dirty="0" smtClean="0"/>
           </a:p>
@@ -22258,7 +23076,12 @@
             <p:ph idx="1"/>
           </p:nvPr>
         </p:nvSpPr>
-        <p:spPr/>
+        <p:spPr>
+          <a:xfrm>
+            <a:off x="442888" y="2636912"/>
+            <a:ext cx="7408333" cy="3450696"/>
+          </a:xfrm>
+        </p:spPr>
         <p:txBody>
           <a:bodyPr>
             <a:normAutofit/>
@@ -22667,16 +23490,6 @@
                 </a:solidFill>
               </a14:hiddenFill>
             </a:ext>
-            <a:ext uri="{91240B29-F687-4F45-9708-019B960494DF}">
-              <a14:hiddenLine xmlns:a14="http://schemas.microsoft.com/office/drawing/2010/main" w="9525">
-                <a:solidFill>
-                  <a:schemeClr val="tx1"/>
-                </a:solidFill>
-                <a:miter lim="800000"/>
-                <a:headEnd/>
-                <a:tailEnd/>
-              </a14:hiddenLine>
-            </a:ext>
           </a:extLst>
         </p:spPr>
       </p:pic>
@@ -23002,16 +23815,6 @@
                   <a:schemeClr val="accent1"/>
                 </a:solidFill>
               </a14:hiddenFill>
-            </a:ext>
-            <a:ext uri="{91240B29-F687-4F45-9708-019B960494DF}">
-              <a14:hiddenLine xmlns:a14="http://schemas.microsoft.com/office/drawing/2010/main" w="9525">
-                <a:solidFill>
-                  <a:schemeClr val="tx1"/>
-                </a:solidFill>
-                <a:miter lim="800000"/>
-                <a:headEnd/>
-                <a:tailEnd/>
-              </a14:hiddenLine>
             </a:ext>
           </a:extLst>
         </p:spPr>
@@ -23144,11 +23947,7 @@
             </a:r>
             <a:r>
               <a:rPr lang="fr-FR" dirty="0" smtClean="0"/>
-              <a:t> </a:t>
-            </a:r>
-            <a:r>
-              <a:rPr lang="fr-FR" dirty="0" smtClean="0"/>
-              <a:t>local au </a:t>
+              <a:t> local au </a:t>
             </a:r>
             <a:r>
               <a:rPr lang="fr-FR" dirty="0" err="1" smtClean="0"/>
@@ -23159,19 +23958,7 @@
           <a:p>
             <a:r>
               <a:rPr lang="fr-FR" dirty="0" smtClean="0"/>
-              <a:t>Compiler puis </a:t>
-            </a:r>
-            <a:r>
-              <a:rPr lang="fr-FR" dirty="0" smtClean="0"/>
-              <a:t>ouvrir </a:t>
-            </a:r>
-            <a:r>
-              <a:rPr lang="fr-FR" dirty="0" smtClean="0"/>
-              <a:t>le fichier </a:t>
-            </a:r>
-            <a:r>
-              <a:rPr lang="fr-FR" dirty="0" smtClean="0"/>
-              <a:t>bundle.js</a:t>
+              <a:t>Compiler puis ouvrir le fichier bundle.js</a:t>
             </a:r>
           </a:p>
         </p:txBody>

</xml_diff>

<commit_message>
Composant Détail de classroom
</commit_message>
<xml_diff>
--- a/formation_Angular.pptx
+++ b/formation_Angular.pptx
@@ -2701,11 +2701,7 @@
             </a:r>
             <a:r>
               <a:rPr lang="fr-FR" dirty="0" smtClean="0"/>
-              <a:t> </a:t>
-            </a:r>
-            <a:r>
-              <a:rPr lang="fr-FR" dirty="0" smtClean="0"/>
-              <a:t>v8</a:t>
+              <a:t> v8</a:t>
             </a:r>
           </a:p>
           <a:p>
@@ -2877,11 +2873,7 @@
             </a:r>
             <a:r>
               <a:rPr lang="fr-FR" baseline="0" dirty="0" smtClean="0"/>
-              <a:t> </a:t>
-            </a:r>
-            <a:r>
-              <a:rPr lang="fr-FR" baseline="0" dirty="0" smtClean="0"/>
-              <a:t>Module v4 est en erreur. Tester avec </a:t>
+              <a:t> Module v4 est en erreur. Tester avec </a:t>
             </a:r>
             <a:r>
               <a:rPr lang="fr-FR" baseline="0" dirty="0" err="1" smtClean="0"/>
@@ -3097,8 +3089,45 @@
             </a:r>
             <a:r>
               <a:rPr lang="fr-FR" dirty="0" smtClean="0"/>
-              <a:t>http://es6-features.org/#Constants</a:t>
-            </a:r>
+              <a:t>http://es6-features.org</a:t>
+            </a:r>
+            <a:r>
+              <a:rPr lang="fr-FR" smtClean="0"/>
+              <a:t>/#</a:t>
+            </a:r>
+            <a:r>
+              <a:rPr lang="fr-FR" smtClean="0"/>
+              <a:t>Constants</a:t>
+            </a:r>
+          </a:p>
+          <a:p>
+            <a:endParaRPr lang="fr-FR" dirty="0" smtClean="0"/>
+          </a:p>
+          <a:p>
+            <a:pPr marL="0" marR="0" indent="0" algn="l" defTabSz="914400" rtl="0" eaLnBrk="1" fontAlgn="auto" latinLnBrk="0" hangingPunct="1">
+              <a:lnSpc>
+                <a:spcPct val="100000"/>
+              </a:lnSpc>
+              <a:spcBef>
+                <a:spcPts val="0"/>
+              </a:spcBef>
+              <a:spcAft>
+                <a:spcPts val="0"/>
+              </a:spcAft>
+              <a:buClrTx/>
+              <a:buSzTx/>
+              <a:buFontTx/>
+              <a:buNone/>
+              <a:tabLst/>
+              <a:defRPr/>
+            </a:pPr>
+            <a:r>
+              <a:rPr lang="fr-FR" dirty="0" smtClean="0">
+                <a:hlinkClick r:id="rId3"/>
+              </a:rPr>
+              <a:t>https://dzone.com/articles/learn-different-about-angular-1-angular-2-amp-angu</a:t>
+            </a:r>
+            <a:endParaRPr lang="fr-FR" dirty="0" smtClean="0"/>
           </a:p>
           <a:p>
             <a:endParaRPr lang="fr-FR" dirty="0" smtClean="0"/>
@@ -4758,8 +4787,47 @@
           <a:p>
             <a:r>
               <a:rPr lang="fr-FR" dirty="0" smtClean="0"/>
-              <a:t>Dans le répertorie initié lors du TP Environnement</a:t>
-            </a:r>
+              <a:t>Dans le répertorie initié lors du TP </a:t>
+            </a:r>
+            <a:r>
+              <a:rPr lang="fr-FR" dirty="0" smtClean="0"/>
+              <a:t>Environnement</a:t>
+            </a:r>
+          </a:p>
+          <a:p>
+            <a:pPr marL="0" marR="0" indent="0" algn="l" defTabSz="914400" rtl="0" eaLnBrk="1" fontAlgn="auto" latinLnBrk="0" hangingPunct="1">
+              <a:lnSpc>
+                <a:spcPct val="100000"/>
+              </a:lnSpc>
+              <a:spcBef>
+                <a:spcPts val="0"/>
+              </a:spcBef>
+              <a:spcAft>
+                <a:spcPts val="0"/>
+              </a:spcAft>
+              <a:buClrTx/>
+              <a:buSzTx/>
+              <a:buFontTx/>
+              <a:buNone/>
+              <a:tabLst/>
+              <a:defRPr/>
+            </a:pPr>
+            <a:r>
+              <a:rPr lang="fr-FR" dirty="0" smtClean="0">
+                <a:solidFill>
+                  <a:schemeClr val="bg1"/>
+                </a:solidFill>
+                <a:hlinkClick r:id="rId3"/>
+              </a:rPr>
+              <a:t>https://www.typescriptlang.org/docs/handbook/release-notes/typescript-1-4.html</a:t>
+            </a:r>
+            <a:endParaRPr lang="fr-FR" dirty="0" smtClean="0">
+              <a:solidFill>
+                <a:schemeClr val="bg1"/>
+              </a:solidFill>
+            </a:endParaRPr>
+          </a:p>
+          <a:p>
             <a:endParaRPr lang="fr-FR" dirty="0"/>
           </a:p>
         </p:txBody>
@@ -21617,7 +21685,6 @@
               <a:rPr lang="fr-FR" dirty="0" smtClean="0"/>
               <a:t> : trop de complexité </a:t>
             </a:r>
-            <a:endParaRPr lang="fr-FR" dirty="0" smtClean="0"/>
           </a:p>
           <a:p>
             <a:pPr marL="0" indent="0">
@@ -21625,21 +21692,13 @@
             </a:pPr>
             <a:r>
               <a:rPr lang="fr-FR" dirty="0" smtClean="0"/>
-              <a:t>sur </a:t>
-            </a:r>
+              <a:t>sur de gros projets</a:t>
+            </a:r>
+          </a:p>
+          <a:p>
             <a:r>
               <a:rPr lang="fr-FR" dirty="0" smtClean="0"/>
-              <a:t>de gros projets</a:t>
-            </a:r>
-          </a:p>
-          <a:p>
-            <a:r>
-              <a:rPr lang="fr-FR" dirty="0" smtClean="0"/>
-              <a:t>Besoin </a:t>
-            </a:r>
-            <a:r>
-              <a:rPr lang="fr-FR" dirty="0" smtClean="0"/>
-              <a:t>d’industrialisation :</a:t>
+              <a:t>Besoin d’industrialisation :</a:t>
             </a:r>
           </a:p>
           <a:p>
@@ -21653,11 +21712,7 @@
             <a:pPr lvl="1"/>
             <a:r>
               <a:rPr lang="fr-FR" dirty="0" smtClean="0"/>
-              <a:t>Gestion </a:t>
-            </a:r>
-            <a:r>
-              <a:rPr lang="fr-FR" dirty="0" smtClean="0"/>
-              <a:t>des routes ;</a:t>
+              <a:t>Gestion des routes ;</a:t>
             </a:r>
           </a:p>
           <a:p>
@@ -21679,7 +21734,6 @@
               <a:rPr lang="fr-FR" dirty="0" smtClean="0"/>
               <a:t>Depuis 2010, apparition des </a:t>
             </a:r>
-            <a:endParaRPr lang="fr-FR" dirty="0" smtClean="0"/>
           </a:p>
           <a:p>
             <a:pPr marL="0" indent="0">
@@ -21691,11 +21745,7 @@
             </a:r>
             <a:r>
               <a:rPr lang="fr-FR" dirty="0" smtClean="0"/>
-              <a:t> </a:t>
-            </a:r>
-            <a:r>
-              <a:rPr lang="fr-FR" dirty="0" smtClean="0"/>
-              <a:t>JS : </a:t>
+              <a:t> JS : </a:t>
             </a:r>
             <a:r>
               <a:rPr lang="fr-FR" dirty="0" err="1" smtClean="0"/>
@@ -22256,11 +22306,7 @@
           <a:p>
             <a:r>
               <a:rPr lang="fr-FR" dirty="0" smtClean="0"/>
-              <a:t>Liens</a:t>
-            </a:r>
-            <a:r>
-              <a:rPr lang="fr-FR" dirty="0" smtClean="0"/>
-              <a:t>	</a:t>
+              <a:t>Liens	</a:t>
             </a:r>
             <a:endParaRPr lang="fr-FR" dirty="0"/>
           </a:p>
@@ -22275,14 +22321,14 @@
           <p:nvPr>
             <p:extLst>
               <p:ext uri="{D42A27DB-BD31-4B8C-83A1-F6EECF244321}">
-                <p14:modId xmlns:p14="http://schemas.microsoft.com/office/powerpoint/2010/main" val="4259419249"/>
+                <p14:modId xmlns:p14="http://schemas.microsoft.com/office/powerpoint/2010/main" val="1382987481"/>
               </p:ext>
             </p:extLst>
           </p:nvPr>
         </p:nvGraphicFramePr>
         <p:xfrm>
-          <a:off x="251520" y="1795339"/>
-          <a:ext cx="8671875" cy="4837421"/>
+          <a:off x="251520" y="1682526"/>
+          <a:ext cx="8671875" cy="4986834"/>
         </p:xfrm>
         <a:graphic>
           <a:graphicData uri="http://schemas.openxmlformats.org/drawingml/2006/table">
@@ -22294,7 +22340,7 @@
                 <a:gridCol w="2592288"/>
                 <a:gridCol w="6079587"/>
               </a:tblGrid>
-              <a:tr h="843378">
+              <a:tr h="808432">
                 <a:tc>
                   <a:txBody>
                     <a:bodyPr/>
@@ -22316,7 +22362,7 @@
                   <a:tcPr/>
                 </a:tc>
               </a:tr>
-              <a:tr h="430243">
+              <a:tr h="412415">
                 <a:tc>
                   <a:txBody>
                     <a:bodyPr/>
@@ -22348,7 +22394,7 @@
                   <a:tcPr/>
                 </a:tc>
               </a:tr>
-              <a:tr h="432048">
+              <a:tr h="613558">
                 <a:tc>
                   <a:txBody>
                     <a:bodyPr/>
@@ -22403,7 +22449,7 @@
                   <a:tcPr/>
                 </a:tc>
               </a:tr>
-              <a:tr h="360040">
+              <a:tr h="350604">
                 <a:tc>
                   <a:txBody>
                     <a:bodyPr/>
@@ -22435,7 +22481,7 @@
                   <a:tcPr/>
                 </a:tc>
               </a:tr>
-              <a:tr h="354320">
+              <a:tr h="613558">
                 <a:tc>
                   <a:txBody>
                     <a:bodyPr/>
@@ -22501,7 +22547,7 @@
                   <a:tcPr/>
                 </a:tc>
               </a:tr>
-              <a:tr h="420608">
+              <a:tr h="403180">
                 <a:tc>
                   <a:txBody>
                     <a:bodyPr/>
@@ -22550,12 +22596,24 @@
                   <a:tcPr/>
                 </a:tc>
               </a:tr>
-              <a:tr h="284584">
+              <a:tr h="711047">
                 <a:tc>
                   <a:txBody>
                     <a:bodyPr/>
                     <a:lstStyle/>
                     <a:p>
+                      <a:r>
+                        <a:rPr lang="fr-FR" dirty="0" err="1" smtClean="0"/>
+                        <a:t>AngularJS</a:t>
+                      </a:r>
+                      <a:r>
+                        <a:rPr lang="fr-FR" baseline="0" dirty="0" smtClean="0"/>
+                        <a:t> &gt; </a:t>
+                      </a:r>
+                      <a:r>
+                        <a:rPr lang="fr-FR" baseline="0" dirty="0" err="1" smtClean="0"/>
+                        <a:t>Angular</a:t>
+                      </a:r>
                       <a:endParaRPr lang="fr-FR" dirty="0"/>
                     </a:p>
                   </a:txBody>
@@ -22566,18 +22624,32 @@
                     <a:bodyPr/>
                     <a:lstStyle/>
                     <a:p>
+                      <a:r>
+                        <a:rPr lang="fr-FR" dirty="0" smtClean="0">
+                          <a:hlinkClick r:id="rId8"/>
+                        </a:rPr>
+                        <a:t>https://dzone.com/articles/learn-different-about-angular-1-angular-2-amp-angu</a:t>
+                      </a:r>
                       <a:endParaRPr lang="fr-FR" dirty="0"/>
                     </a:p>
                   </a:txBody>
                   <a:tcPr/>
                 </a:tc>
               </a:tr>
-              <a:tr h="354320">
+              <a:tr h="350604">
                 <a:tc>
                   <a:txBody>
                     <a:bodyPr/>
                     <a:lstStyle/>
                     <a:p>
+                      <a:r>
+                        <a:rPr lang="fr-FR" dirty="0" err="1" smtClean="0"/>
+                        <a:t>Angular</a:t>
+                      </a:r>
+                      <a:r>
+                        <a:rPr lang="fr-FR" dirty="0" smtClean="0"/>
+                        <a:t> sur Medium</a:t>
+                      </a:r>
                       <a:endParaRPr lang="fr-FR" dirty="0"/>
                     </a:p>
                   </a:txBody>
@@ -22588,13 +22660,19 @@
                     <a:bodyPr/>
                     <a:lstStyle/>
                     <a:p>
+                      <a:r>
+                        <a:rPr lang="fr-FR" dirty="0" smtClean="0">
+                          <a:hlinkClick r:id="rId9"/>
+                        </a:rPr>
+                        <a:t>https://blog.angular.io/</a:t>
+                      </a:r>
                       <a:endParaRPr lang="fr-FR" dirty="0"/>
                     </a:p>
                   </a:txBody>
                   <a:tcPr/>
                 </a:tc>
               </a:tr>
-              <a:tr h="765752">
+              <a:tr h="506651">
                 <a:tc>
                   <a:txBody>
                     <a:bodyPr/>
@@ -22664,13 +22742,16 @@
                       </a:pPr>
                       <a:r>
                         <a:rPr lang="fr-FR" dirty="0" smtClean="0">
-                          <a:hlinkClick r:id="rId8"/>
+                          <a:hlinkClick r:id="rId10"/>
                         </a:rPr>
-                        <a:t>https://angular.io/guide/styleguide</a:t>
+                        <a:t>https://</a:t>
                       </a:r>
-                      <a:endParaRPr lang="fr-FR" dirty="0" smtClean="0"/>
-                    </a:p>
-                    <a:p>
+                      <a:r>
+                        <a:rPr lang="fr-FR" dirty="0" smtClean="0">
+                          <a:hlinkClick r:id="rId10"/>
+                        </a:rPr>
+                        <a:t>angular.io/guide/styleguide</a:t>
+                      </a:r>
                       <a:endParaRPr lang="fr-FR" dirty="0"/>
                     </a:p>
                   </a:txBody>
@@ -22780,13 +22861,8 @@
             </a:r>
             <a:r>
               <a:rPr lang="fr-FR" dirty="0" smtClean="0"/>
-              <a:t> Package Manager</a:t>
-            </a:r>
-            <a:r>
-              <a:rPr lang="fr-FR" dirty="0" smtClean="0"/>
-              <a:t>) en local et en global :</a:t>
-            </a:r>
-            <a:endParaRPr lang="fr-FR" dirty="0" smtClean="0"/>
+              <a:t> Package Manager) en local et en global :</a:t>
+            </a:r>
           </a:p>
           <a:p>
             <a:pPr lvl="1"/>
@@ -22822,13 +22898,8 @@
           <a:p>
             <a:r>
               <a:rPr lang="fr-FR" dirty="0" smtClean="0"/>
-              <a:t>VS </a:t>
-            </a:r>
-            <a:r>
-              <a:rPr lang="fr-FR" dirty="0" smtClean="0"/>
-              <a:t>Code : Editeur léger, intuitif avec extensions (Marketplace)</a:t>
-            </a:r>
-            <a:endParaRPr lang="fr-FR" dirty="0" smtClean="0"/>
+              <a:t>VS Code : Editeur léger, intuitif avec extensions (Marketplace)</a:t>
+            </a:r>
           </a:p>
           <a:p>
             <a:endParaRPr lang="fr-FR" dirty="0"/>
@@ -22967,7 +23038,6 @@
               <a:rPr lang="fr-FR" dirty="0" smtClean="0"/>
               <a:t>, </a:t>
             </a:r>
-            <a:endParaRPr lang="fr-FR" dirty="0" smtClean="0"/>
           </a:p>
           <a:p>
             <a:pPr lvl="1"/>
@@ -22977,13 +23047,8 @@
             </a:r>
             <a:r>
               <a:rPr lang="fr-FR" dirty="0" smtClean="0"/>
-              <a:t>-cli</a:t>
-            </a:r>
-            <a:r>
-              <a:rPr lang="fr-FR" dirty="0" smtClean="0"/>
-              <a:t>, </a:t>
-            </a:r>
-            <a:endParaRPr lang="fr-FR" dirty="0" smtClean="0"/>
+              <a:t>-cli, </a:t>
+            </a:r>
           </a:p>
           <a:p>
             <a:pPr lvl="1"/>

</xml_diff>